<commit_message>
added class magic not done yet
</commit_message>
<xml_diff>
--- a/paper/figures.pptx
+++ b/paper/figures.pptx
@@ -8,6 +8,10 @@
     <p:sldId id="256" r:id="rId2"/>
     <p:sldId id="257" r:id="rId3"/>
     <p:sldId id="258" r:id="rId4"/>
+    <p:sldId id="259" r:id="rId5"/>
+    <p:sldId id="260" r:id="rId6"/>
+    <p:sldId id="261" r:id="rId7"/>
+    <p:sldId id="262" r:id="rId8"/>
   </p:sldIdLst>
   <p:sldSz cx="12192000" cy="6858000"/>
   <p:notesSz cx="6858000" cy="9144000"/>
@@ -4413,7 +4417,7 @@
         <p:spPr>
           <a:xfrm>
             <a:off x="1020733" y="1425337"/>
-            <a:ext cx="2335426" cy="1123712"/>
+            <a:ext cx="2335426" cy="1055608"/>
           </a:xfrm>
           <a:prstGeom prst="roundRect">
             <a:avLst/>
@@ -4440,7 +4444,7 @@
           <a:lstStyle/>
           <a:p>
             <a:r>
-              <a:rPr lang="en-US" sz="1400" dirty="0"/>
+              <a:rPr lang="en-US" sz="1200" dirty="0"/>
               <a:t>1. Random Boolean Function Generators</a:t>
             </a:r>
           </a:p>
@@ -4505,7 +4509,7 @@
         <p:spPr>
           <a:xfrm>
             <a:off x="1020732" y="2974417"/>
-            <a:ext cx="2335426" cy="1259919"/>
+            <a:ext cx="2335426" cy="987504"/>
           </a:xfrm>
           <a:prstGeom prst="roundRect">
             <a:avLst/>
@@ -4532,7 +4536,7 @@
           <a:lstStyle/>
           <a:p>
             <a:r>
-              <a:rPr lang="en-US" sz="1400" dirty="0"/>
+              <a:rPr lang="en-US" sz="1200" dirty="0"/>
               <a:t>3. Boolean Function Analysis</a:t>
             </a:r>
           </a:p>
@@ -4630,8 +4634,8 @@
         </p:nvSpPr>
         <p:spPr>
           <a:xfrm>
-            <a:off x="3913359" y="2986325"/>
-            <a:ext cx="2335426" cy="1259919"/>
+            <a:off x="3913359" y="2974417"/>
+            <a:ext cx="2335426" cy="987504"/>
           </a:xfrm>
           <a:prstGeom prst="roundRect">
             <a:avLst/>
@@ -4658,7 +4662,7 @@
           <a:lstStyle/>
           <a:p>
             <a:r>
-              <a:rPr lang="en-US" sz="1400" dirty="0"/>
+              <a:rPr lang="en-US" sz="1200" dirty="0"/>
               <a:t>4. Boolean Network Analysis</a:t>
             </a:r>
           </a:p>
@@ -4721,7 +4725,7 @@
         <p:spPr>
           <a:xfrm>
             <a:off x="3913359" y="1425337"/>
-            <a:ext cx="2335426" cy="1123712"/>
+            <a:ext cx="2335426" cy="1055608"/>
           </a:xfrm>
           <a:prstGeom prst="roundRect">
             <a:avLst/>
@@ -4748,7 +4752,7 @@
           <a:lstStyle/>
           <a:p>
             <a:r>
-              <a:rPr lang="en-US" sz="1400" dirty="0"/>
+              <a:rPr lang="en-US" sz="1200" dirty="0"/>
               <a:t>2. Random Boolean Network Generators</a:t>
             </a:r>
           </a:p>
@@ -4829,8 +4833,8 @@
         </p:nvCxnSpPr>
         <p:spPr>
           <a:xfrm flipH="1">
-            <a:off x="2188445" y="2549049"/>
-            <a:ext cx="1" cy="425368"/>
+            <a:off x="2188445" y="2480945"/>
+            <a:ext cx="1" cy="493472"/>
           </a:xfrm>
           <a:prstGeom prst="straightConnector1">
             <a:avLst/>
@@ -4872,8 +4876,8 @@
         </p:nvCxnSpPr>
         <p:spPr>
           <a:xfrm>
-            <a:off x="5081072" y="2549049"/>
-            <a:ext cx="0" cy="437276"/>
+            <a:off x="5081072" y="2480945"/>
+            <a:ext cx="0" cy="493472"/>
           </a:xfrm>
           <a:prstGeom prst="straightConnector1">
             <a:avLst/>
@@ -4915,8 +4919,8 @@
         </p:nvCxnSpPr>
         <p:spPr>
           <a:xfrm>
-            <a:off x="6248785" y="1987193"/>
-            <a:ext cx="2695399" cy="709226"/>
+            <a:off x="6248785" y="1953141"/>
+            <a:ext cx="2695399" cy="743278"/>
           </a:xfrm>
           <a:prstGeom prst="straightConnector1">
             <a:avLst/>
@@ -4959,7 +4963,7 @@
         <p:spPr>
           <a:xfrm flipV="1">
             <a:off x="6248785" y="3105042"/>
-            <a:ext cx="2695399" cy="511243"/>
+            <a:ext cx="2695399" cy="363127"/>
           </a:xfrm>
           <a:prstGeom prst="straightConnector1">
             <a:avLst/>
@@ -5001,7 +5005,7 @@
         </p:nvCxnSpPr>
         <p:spPr>
           <a:xfrm>
-            <a:off x="3356159" y="1987193"/>
+            <a:off x="3356159" y="1953141"/>
             <a:ext cx="557200" cy="0"/>
           </a:xfrm>
           <a:prstGeom prst="straightConnector1">
@@ -5044,8 +5048,8 @@
         </p:nvCxnSpPr>
         <p:spPr>
           <a:xfrm>
-            <a:off x="3356158" y="3604377"/>
-            <a:ext cx="557201" cy="11908"/>
+            <a:off x="3356158" y="3468169"/>
+            <a:ext cx="557201" cy="0"/>
           </a:xfrm>
           <a:prstGeom prst="straightConnector1">
             <a:avLst/>
@@ -5073,6 +5077,4029 @@
     <p:extLst>
       <p:ext uri="{BB962C8B-B14F-4D97-AF65-F5344CB8AC3E}">
         <p14:creationId xmlns:p14="http://schemas.microsoft.com/office/powerpoint/2010/main" val="633140368"/>
+      </p:ext>
+    </p:extLst>
+  </p:cSld>
+  <p:clrMapOvr>
+    <a:masterClrMapping/>
+  </p:clrMapOvr>
+</p:sld>
+</file>
+
+<file path=ppt/slides/slide4.xml><?xml version="1.0" encoding="utf-8"?>
+<p:sld xmlns:a="http://schemas.openxmlformats.org/drawingml/2006/main" xmlns:r="http://schemas.openxmlformats.org/officeDocument/2006/relationships" xmlns:p="http://schemas.openxmlformats.org/presentationml/2006/main">
+  <p:cSld>
+    <p:spTree>
+      <p:nvGrpSpPr>
+        <p:cNvPr id="1" name="">
+          <a:extLst>
+            <a:ext uri="{FF2B5EF4-FFF2-40B4-BE49-F238E27FC236}">
+              <a16:creationId xmlns:a16="http://schemas.microsoft.com/office/drawing/2014/main" id="{DC5637A3-34E2-43B1-9D68-D771416A4F9D}"/>
+            </a:ext>
+          </a:extLst>
+        </p:cNvPr>
+        <p:cNvGrpSpPr/>
+        <p:nvPr/>
+      </p:nvGrpSpPr>
+      <p:grpSpPr>
+        <a:xfrm>
+          <a:off x="0" y="0"/>
+          <a:ext cx="0" cy="0"/>
+          <a:chOff x="0" y="0"/>
+          <a:chExt cx="0" cy="0"/>
+        </a:xfrm>
+      </p:grpSpPr>
+      <p:sp>
+        <p:nvSpPr>
+          <p:cNvPr id="4" name="TextBox 3">
+            <a:extLst>
+              <a:ext uri="{FF2B5EF4-FFF2-40B4-BE49-F238E27FC236}">
+                <a16:creationId xmlns:a16="http://schemas.microsoft.com/office/drawing/2014/main" id="{3300FF43-72FE-28C1-358F-28114D19422D}"/>
+              </a:ext>
+            </a:extLst>
+          </p:cNvPr>
+          <p:cNvSpPr txBox="1"/>
+          <p:nvPr/>
+        </p:nvSpPr>
+        <p:spPr>
+          <a:xfrm>
+            <a:off x="715477" y="1425337"/>
+            <a:ext cx="2335426" cy="1055608"/>
+          </a:xfrm>
+          <a:prstGeom prst="roundRect">
+            <a:avLst/>
+          </a:prstGeom>
+        </p:spPr>
+        <p:style>
+          <a:lnRef idx="2">
+            <a:schemeClr val="accent1"/>
+          </a:lnRef>
+          <a:fillRef idx="1">
+            <a:schemeClr val="lt1"/>
+          </a:fillRef>
+          <a:effectRef idx="0">
+            <a:schemeClr val="accent1"/>
+          </a:effectRef>
+          <a:fontRef idx="minor">
+            <a:schemeClr val="dk1"/>
+          </a:fontRef>
+        </p:style>
+        <p:txBody>
+          <a:bodyPr wrap="square" rtlCol="0">
+            <a:spAutoFit/>
+          </a:bodyPr>
+          <a:lstStyle/>
+          <a:p>
+            <a:r>
+              <a:rPr lang="en-US" sz="1200" dirty="0"/>
+              <a:t>1. Random Boolean Function Generators</a:t>
+            </a:r>
+          </a:p>
+          <a:p>
+            <a:r>
+              <a:rPr lang="en-US" sz="800" dirty="0" err="1"/>
+              <a:t>random_non_degenerated_function</a:t>
+            </a:r>
+            <a:r>
+              <a:rPr lang="en-US" sz="800" dirty="0"/>
+              <a:t>(n)</a:t>
+            </a:r>
+          </a:p>
+          <a:p>
+            <a:r>
+              <a:rPr lang="en-US" sz="800" dirty="0" err="1"/>
+              <a:t>random_k_canalizing_function</a:t>
+            </a:r>
+            <a:r>
+              <a:rPr lang="en-US" sz="800" dirty="0"/>
+              <a:t>(n, k)</a:t>
+            </a:r>
+          </a:p>
+          <a:p>
+            <a:r>
+              <a:rPr lang="en-US" sz="800" dirty="0" err="1"/>
+              <a:t>random_NCF</a:t>
+            </a:r>
+            <a:r>
+              <a:rPr lang="en-US" sz="800" dirty="0"/>
+              <a:t>(n, </a:t>
+            </a:r>
+            <a:r>
+              <a:rPr lang="en-US" sz="800" dirty="0" err="1"/>
+              <a:t>layer_structure</a:t>
+            </a:r>
+            <a:r>
+              <a:rPr lang="en-US" sz="800" dirty="0"/>
+              <a:t>)</a:t>
+            </a:r>
+          </a:p>
+          <a:p>
+            <a:r>
+              <a:rPr lang="en-US" sz="800" dirty="0"/>
+              <a:t>…</a:t>
+            </a:r>
+          </a:p>
+        </p:txBody>
+      </p:sp>
+      <p:sp>
+        <p:nvSpPr>
+          <p:cNvPr id="5" name="TextBox 4">
+            <a:extLst>
+              <a:ext uri="{FF2B5EF4-FFF2-40B4-BE49-F238E27FC236}">
+                <a16:creationId xmlns:a16="http://schemas.microsoft.com/office/drawing/2014/main" id="{F6E5F3F5-C06E-ED90-17CA-872855B3CEC7}"/>
+              </a:ext>
+            </a:extLst>
+          </p:cNvPr>
+          <p:cNvSpPr txBox="1"/>
+          <p:nvPr/>
+        </p:nvSpPr>
+        <p:spPr>
+          <a:xfrm>
+            <a:off x="715477" y="3633311"/>
+            <a:ext cx="2335426" cy="987504"/>
+          </a:xfrm>
+          <a:prstGeom prst="roundRect">
+            <a:avLst/>
+          </a:prstGeom>
+        </p:spPr>
+        <p:style>
+          <a:lnRef idx="2">
+            <a:schemeClr val="accent1"/>
+          </a:lnRef>
+          <a:fillRef idx="1">
+            <a:schemeClr val="lt1"/>
+          </a:fillRef>
+          <a:effectRef idx="0">
+            <a:schemeClr val="accent1"/>
+          </a:effectRef>
+          <a:fontRef idx="minor">
+            <a:schemeClr val="dk1"/>
+          </a:fontRef>
+        </p:style>
+        <p:txBody>
+          <a:bodyPr wrap="square" rtlCol="0">
+            <a:spAutoFit/>
+          </a:bodyPr>
+          <a:lstStyle/>
+          <a:p>
+            <a:r>
+              <a:rPr lang="en-US" sz="1200" dirty="0"/>
+              <a:t>3. Boolean Function Analysis</a:t>
+            </a:r>
+          </a:p>
+          <a:p>
+            <a:r>
+              <a:rPr lang="en-US" sz="800" dirty="0" err="1"/>
+              <a:t>is_monotonic</a:t>
+            </a:r>
+            <a:r>
+              <a:rPr lang="en-US" sz="800" dirty="0"/>
+              <a:t>()	</a:t>
+            </a:r>
+            <a:r>
+              <a:rPr lang="en-US" sz="800" dirty="0" err="1"/>
+              <a:t>get_symmetry_groups</a:t>
+            </a:r>
+            <a:r>
+              <a:rPr lang="en-US" sz="800" dirty="0"/>
+              <a:t>()</a:t>
+            </a:r>
+          </a:p>
+          <a:p>
+            <a:r>
+              <a:rPr lang="en-US" sz="800" dirty="0" err="1"/>
+              <a:t>is_degenerated</a:t>
+            </a:r>
+            <a:r>
+              <a:rPr lang="en-US" sz="800" dirty="0"/>
+              <a:t>()	</a:t>
+            </a:r>
+            <a:r>
+              <a:rPr lang="en-US" sz="800" dirty="0" err="1"/>
+              <a:t>get_sensitivity</a:t>
+            </a:r>
+            <a:r>
+              <a:rPr lang="en-US" sz="800" dirty="0"/>
+              <a:t>()</a:t>
+            </a:r>
+          </a:p>
+          <a:p>
+            <a:r>
+              <a:rPr lang="en-US" sz="800" dirty="0" err="1"/>
+              <a:t>Is_k_canalizing</a:t>
+            </a:r>
+            <a:r>
+              <a:rPr lang="en-US" sz="800" dirty="0"/>
+              <a:t>()	</a:t>
+            </a:r>
+            <a:r>
+              <a:rPr lang="en-US" sz="800" dirty="0" err="1"/>
+              <a:t>get_layer_structure</a:t>
+            </a:r>
+            <a:r>
+              <a:rPr lang="en-US" sz="800" dirty="0"/>
+              <a:t>()</a:t>
+            </a:r>
+          </a:p>
+          <a:p>
+            <a:r>
+              <a:rPr lang="en-US" sz="800" dirty="0" err="1"/>
+              <a:t>Is_kset_canalizing</a:t>
+            </a:r>
+            <a:r>
+              <a:rPr lang="en-US" sz="800" dirty="0"/>
+              <a:t>()	</a:t>
+            </a:r>
+            <a:r>
+              <a:rPr lang="en-US" sz="800" dirty="0" err="1"/>
+              <a:t>get_canalizing_strength</a:t>
+            </a:r>
+            <a:r>
+              <a:rPr lang="en-US" sz="800" dirty="0"/>
+              <a:t>()</a:t>
+            </a:r>
+          </a:p>
+          <a:p>
+            <a:r>
+              <a:rPr lang="en-US" sz="800" dirty="0"/>
+              <a:t>…</a:t>
+            </a:r>
+          </a:p>
+        </p:txBody>
+      </p:sp>
+      <p:sp>
+        <p:nvSpPr>
+          <p:cNvPr id="6" name="TextBox 5">
+            <a:extLst>
+              <a:ext uri="{FF2B5EF4-FFF2-40B4-BE49-F238E27FC236}">
+                <a16:creationId xmlns:a16="http://schemas.microsoft.com/office/drawing/2014/main" id="{0F86872E-3AF2-4CAC-DC44-0891850B84CD}"/>
+              </a:ext>
+            </a:extLst>
+          </p:cNvPr>
+          <p:cNvSpPr txBox="1"/>
+          <p:nvPr/>
+        </p:nvSpPr>
+        <p:spPr>
+          <a:xfrm>
+            <a:off x="3913359" y="3633311"/>
+            <a:ext cx="2335426" cy="987504"/>
+          </a:xfrm>
+          <a:prstGeom prst="roundRect">
+            <a:avLst/>
+          </a:prstGeom>
+        </p:spPr>
+        <p:style>
+          <a:lnRef idx="2">
+            <a:schemeClr val="accent1"/>
+          </a:lnRef>
+          <a:fillRef idx="1">
+            <a:schemeClr val="lt1"/>
+          </a:fillRef>
+          <a:effectRef idx="0">
+            <a:schemeClr val="accent1"/>
+          </a:effectRef>
+          <a:fontRef idx="minor">
+            <a:schemeClr val="dk1"/>
+          </a:fontRef>
+        </p:style>
+        <p:txBody>
+          <a:bodyPr wrap="square" rtlCol="0">
+            <a:spAutoFit/>
+          </a:bodyPr>
+          <a:lstStyle/>
+          <a:p>
+            <a:r>
+              <a:rPr lang="en-US" sz="1200" dirty="0"/>
+              <a:t>4. Boolean Network Analysis</a:t>
+            </a:r>
+          </a:p>
+          <a:p>
+            <a:r>
+              <a:rPr lang="en-US" sz="800" dirty="0" err="1"/>
+              <a:t>get_steady_states_asynchronous</a:t>
+            </a:r>
+            <a:r>
+              <a:rPr lang="en-US" sz="800" dirty="0"/>
+              <a:t>()</a:t>
+            </a:r>
+          </a:p>
+          <a:p>
+            <a:r>
+              <a:rPr lang="en-US" sz="800" dirty="0" err="1"/>
+              <a:t>get_Derrida_values</a:t>
+            </a:r>
+            <a:r>
+              <a:rPr lang="en-US" sz="800" dirty="0"/>
+              <a:t>()</a:t>
+            </a:r>
+          </a:p>
+          <a:p>
+            <a:r>
+              <a:rPr lang="en-US" sz="800" dirty="0" err="1"/>
+              <a:t>get_attractors_and_robustness_measures</a:t>
+            </a:r>
+            <a:r>
+              <a:rPr lang="en-US" sz="800" dirty="0"/>
+              <a:t>_</a:t>
+            </a:r>
+          </a:p>
+          <a:p>
+            <a:r>
+              <a:rPr lang="en-US" sz="800" dirty="0"/>
+              <a:t>synchronous()</a:t>
+            </a:r>
+          </a:p>
+          <a:p>
+            <a:r>
+              <a:rPr lang="en-US" sz="800" dirty="0"/>
+              <a:t>…</a:t>
+            </a:r>
+          </a:p>
+        </p:txBody>
+      </p:sp>
+      <p:sp>
+        <p:nvSpPr>
+          <p:cNvPr id="7" name="TextBox 6">
+            <a:extLst>
+              <a:ext uri="{FF2B5EF4-FFF2-40B4-BE49-F238E27FC236}">
+                <a16:creationId xmlns:a16="http://schemas.microsoft.com/office/drawing/2014/main" id="{F8774C9D-442F-A561-BCA2-D603A4036B17}"/>
+              </a:ext>
+            </a:extLst>
+          </p:cNvPr>
+          <p:cNvSpPr txBox="1"/>
+          <p:nvPr/>
+        </p:nvSpPr>
+        <p:spPr>
+          <a:xfrm>
+            <a:off x="3913359" y="1425337"/>
+            <a:ext cx="2335426" cy="1055608"/>
+          </a:xfrm>
+          <a:prstGeom prst="roundRect">
+            <a:avLst/>
+          </a:prstGeom>
+        </p:spPr>
+        <p:style>
+          <a:lnRef idx="2">
+            <a:schemeClr val="accent1"/>
+          </a:lnRef>
+          <a:fillRef idx="1">
+            <a:schemeClr val="lt1"/>
+          </a:fillRef>
+          <a:effectRef idx="0">
+            <a:schemeClr val="accent1"/>
+          </a:effectRef>
+          <a:fontRef idx="minor">
+            <a:schemeClr val="dk1"/>
+          </a:fontRef>
+        </p:style>
+        <p:txBody>
+          <a:bodyPr wrap="square" rtlCol="0">
+            <a:spAutoFit/>
+          </a:bodyPr>
+          <a:lstStyle/>
+          <a:p>
+            <a:r>
+              <a:rPr lang="en-US" sz="1200" dirty="0"/>
+              <a:t>2. Random Boolean Network Generators</a:t>
+            </a:r>
+          </a:p>
+          <a:p>
+            <a:r>
+              <a:rPr lang="en-US" sz="800" dirty="0"/>
+              <a:t>Generate random Boolean networks of defined size, degree distribution, canalizing depth or layer structure, bias, …</a:t>
+            </a:r>
+          </a:p>
+          <a:p>
+            <a:endParaRPr lang="en-US" sz="800" dirty="0"/>
+          </a:p>
+        </p:txBody>
+      </p:sp>
+      <p:sp>
+        <p:nvSpPr>
+          <p:cNvPr id="8" name="TextBox 7">
+            <a:extLst>
+              <a:ext uri="{FF2B5EF4-FFF2-40B4-BE49-F238E27FC236}">
+                <a16:creationId xmlns:a16="http://schemas.microsoft.com/office/drawing/2014/main" id="{DDF17099-C86C-BC57-9FA6-D7ABE3B28120}"/>
+              </a:ext>
+            </a:extLst>
+          </p:cNvPr>
+          <p:cNvSpPr txBox="1"/>
+          <p:nvPr/>
+        </p:nvSpPr>
+        <p:spPr>
+          <a:xfrm>
+            <a:off x="2212899" y="2699583"/>
+            <a:ext cx="2538465" cy="715089"/>
+          </a:xfrm>
+          <a:prstGeom prst="roundRect">
+            <a:avLst/>
+          </a:prstGeom>
+        </p:spPr>
+        <p:style>
+          <a:lnRef idx="2">
+            <a:schemeClr val="accent1"/>
+          </a:lnRef>
+          <a:fillRef idx="1">
+            <a:schemeClr val="lt1"/>
+          </a:fillRef>
+          <a:effectRef idx="0">
+            <a:schemeClr val="accent1"/>
+          </a:effectRef>
+          <a:fontRef idx="minor">
+            <a:schemeClr val="dk1"/>
+          </a:fontRef>
+        </p:style>
+        <p:txBody>
+          <a:bodyPr wrap="square" rtlCol="0">
+            <a:spAutoFit/>
+          </a:bodyPr>
+          <a:lstStyle/>
+          <a:p>
+            <a:r>
+              <a:rPr lang="en-US" sz="1200" dirty="0"/>
+              <a:t>5. Ensemble experiments</a:t>
+            </a:r>
+          </a:p>
+          <a:p>
+            <a:r>
+              <a:rPr lang="en-US" sz="800" dirty="0"/>
+              <a:t>Build reproducible pipelines for systematic studies</a:t>
+            </a:r>
+          </a:p>
+          <a:p>
+            <a:r>
+              <a:rPr lang="en-US" sz="800" dirty="0"/>
+              <a:t>Systematically vary parameters and study network properties across ensembles</a:t>
+            </a:r>
+          </a:p>
+        </p:txBody>
+      </p:sp>
+      <p:cxnSp>
+        <p:nvCxnSpPr>
+          <p:cNvPr id="11" name="Straight Arrow Connector 10">
+            <a:extLst>
+              <a:ext uri="{FF2B5EF4-FFF2-40B4-BE49-F238E27FC236}">
+                <a16:creationId xmlns:a16="http://schemas.microsoft.com/office/drawing/2014/main" id="{FDBDCD35-6B7E-127C-055B-7D5992528DDD}"/>
+              </a:ext>
+            </a:extLst>
+          </p:cNvPr>
+          <p:cNvCxnSpPr>
+            <a:cxnSpLocks/>
+            <a:stCxn id="4" idx="2"/>
+            <a:endCxn id="5" idx="0"/>
+          </p:cNvCxnSpPr>
+          <p:nvPr/>
+        </p:nvCxnSpPr>
+        <p:spPr>
+          <a:xfrm>
+            <a:off x="1883190" y="2480945"/>
+            <a:ext cx="0" cy="1152366"/>
+          </a:xfrm>
+          <a:prstGeom prst="straightConnector1">
+            <a:avLst/>
+          </a:prstGeom>
+          <a:ln>
+            <a:tailEnd type="triangle" w="lg" len="lg"/>
+          </a:ln>
+        </p:spPr>
+        <p:style>
+          <a:lnRef idx="2">
+            <a:schemeClr val="accent1"/>
+          </a:lnRef>
+          <a:fillRef idx="0">
+            <a:schemeClr val="accent1"/>
+          </a:fillRef>
+          <a:effectRef idx="1">
+            <a:schemeClr val="accent1"/>
+          </a:effectRef>
+          <a:fontRef idx="minor">
+            <a:schemeClr val="tx1"/>
+          </a:fontRef>
+        </p:style>
+      </p:cxnSp>
+      <p:cxnSp>
+        <p:nvCxnSpPr>
+          <p:cNvPr id="12" name="Straight Arrow Connector 11">
+            <a:extLst>
+              <a:ext uri="{FF2B5EF4-FFF2-40B4-BE49-F238E27FC236}">
+                <a16:creationId xmlns:a16="http://schemas.microsoft.com/office/drawing/2014/main" id="{D99D6680-0CF5-B87D-6F9E-95C2C3019A52}"/>
+              </a:ext>
+            </a:extLst>
+          </p:cNvPr>
+          <p:cNvCxnSpPr>
+            <a:cxnSpLocks/>
+            <a:stCxn id="7" idx="2"/>
+            <a:endCxn id="6" idx="0"/>
+          </p:cNvCxnSpPr>
+          <p:nvPr/>
+        </p:nvCxnSpPr>
+        <p:spPr>
+          <a:xfrm>
+            <a:off x="5081072" y="2480945"/>
+            <a:ext cx="0" cy="1152366"/>
+          </a:xfrm>
+          <a:prstGeom prst="straightConnector1">
+            <a:avLst/>
+          </a:prstGeom>
+          <a:ln>
+            <a:tailEnd type="triangle" w="lg" len="lg"/>
+          </a:ln>
+        </p:spPr>
+        <p:style>
+          <a:lnRef idx="2">
+            <a:schemeClr val="accent1"/>
+          </a:lnRef>
+          <a:fillRef idx="0">
+            <a:schemeClr val="accent1"/>
+          </a:fillRef>
+          <a:effectRef idx="1">
+            <a:schemeClr val="accent1"/>
+          </a:effectRef>
+          <a:fontRef idx="minor">
+            <a:schemeClr val="tx1"/>
+          </a:fontRef>
+        </p:style>
+      </p:cxnSp>
+      <p:cxnSp>
+        <p:nvCxnSpPr>
+          <p:cNvPr id="22" name="Straight Arrow Connector 21">
+            <a:extLst>
+              <a:ext uri="{FF2B5EF4-FFF2-40B4-BE49-F238E27FC236}">
+                <a16:creationId xmlns:a16="http://schemas.microsoft.com/office/drawing/2014/main" id="{FDAAFB58-CBF5-F4EC-6E1D-40FD5D6AB196}"/>
+              </a:ext>
+            </a:extLst>
+          </p:cNvPr>
+          <p:cNvCxnSpPr>
+            <a:cxnSpLocks/>
+            <a:stCxn id="4" idx="3"/>
+            <a:endCxn id="7" idx="1"/>
+          </p:cNvCxnSpPr>
+          <p:nvPr/>
+        </p:nvCxnSpPr>
+        <p:spPr>
+          <a:xfrm>
+            <a:off x="3050903" y="1953141"/>
+            <a:ext cx="862456" cy="0"/>
+          </a:xfrm>
+          <a:prstGeom prst="straightConnector1">
+            <a:avLst/>
+          </a:prstGeom>
+          <a:ln>
+            <a:tailEnd type="triangle" w="lg" len="lg"/>
+          </a:ln>
+        </p:spPr>
+        <p:style>
+          <a:lnRef idx="2">
+            <a:schemeClr val="accent1"/>
+          </a:lnRef>
+          <a:fillRef idx="0">
+            <a:schemeClr val="accent1"/>
+          </a:fillRef>
+          <a:effectRef idx="1">
+            <a:schemeClr val="accent1"/>
+          </a:effectRef>
+          <a:fontRef idx="minor">
+            <a:schemeClr val="tx1"/>
+          </a:fontRef>
+        </p:style>
+      </p:cxnSp>
+      <p:cxnSp>
+        <p:nvCxnSpPr>
+          <p:cNvPr id="25" name="Straight Arrow Connector 24">
+            <a:extLst>
+              <a:ext uri="{FF2B5EF4-FFF2-40B4-BE49-F238E27FC236}">
+                <a16:creationId xmlns:a16="http://schemas.microsoft.com/office/drawing/2014/main" id="{CF55827E-B68F-BB95-10B5-46819856295D}"/>
+              </a:ext>
+            </a:extLst>
+          </p:cNvPr>
+          <p:cNvCxnSpPr>
+            <a:cxnSpLocks/>
+            <a:stCxn id="5" idx="3"/>
+            <a:endCxn id="6" idx="1"/>
+          </p:cNvCxnSpPr>
+          <p:nvPr/>
+        </p:nvCxnSpPr>
+        <p:spPr>
+          <a:xfrm>
+            <a:off x="3050903" y="4127063"/>
+            <a:ext cx="862456" cy="0"/>
+          </a:xfrm>
+          <a:prstGeom prst="straightConnector1">
+            <a:avLst/>
+          </a:prstGeom>
+          <a:ln>
+            <a:tailEnd type="triangle" w="lg" len="lg"/>
+          </a:ln>
+        </p:spPr>
+        <p:style>
+          <a:lnRef idx="2">
+            <a:schemeClr val="accent1"/>
+          </a:lnRef>
+          <a:fillRef idx="0">
+            <a:schemeClr val="accent1"/>
+          </a:fillRef>
+          <a:effectRef idx="1">
+            <a:schemeClr val="accent1"/>
+          </a:effectRef>
+          <a:fontRef idx="minor">
+            <a:schemeClr val="tx1"/>
+          </a:fontRef>
+        </p:style>
+      </p:cxnSp>
+      <p:cxnSp>
+        <p:nvCxnSpPr>
+          <p:cNvPr id="27" name="Straight Arrow Connector 26">
+            <a:extLst>
+              <a:ext uri="{FF2B5EF4-FFF2-40B4-BE49-F238E27FC236}">
+                <a16:creationId xmlns:a16="http://schemas.microsoft.com/office/drawing/2014/main" id="{F8CD18FD-B643-9A76-951A-F9ED6B7CF340}"/>
+              </a:ext>
+            </a:extLst>
+          </p:cNvPr>
+          <p:cNvCxnSpPr>
+            <a:cxnSpLocks/>
+            <a:stCxn id="4" idx="2"/>
+          </p:cNvCxnSpPr>
+          <p:nvPr/>
+        </p:nvCxnSpPr>
+        <p:spPr>
+          <a:xfrm>
+            <a:off x="1883190" y="2480945"/>
+            <a:ext cx="355028" cy="262136"/>
+          </a:xfrm>
+          <a:prstGeom prst="straightConnector1">
+            <a:avLst/>
+          </a:prstGeom>
+          <a:ln>
+            <a:tailEnd type="triangle" w="lg" len="lg"/>
+          </a:ln>
+        </p:spPr>
+        <p:style>
+          <a:lnRef idx="2">
+            <a:schemeClr val="accent1"/>
+          </a:lnRef>
+          <a:fillRef idx="0">
+            <a:schemeClr val="accent1"/>
+          </a:fillRef>
+          <a:effectRef idx="1">
+            <a:schemeClr val="accent1"/>
+          </a:effectRef>
+          <a:fontRef idx="minor">
+            <a:schemeClr val="tx1"/>
+          </a:fontRef>
+        </p:style>
+      </p:cxnSp>
+      <p:cxnSp>
+        <p:nvCxnSpPr>
+          <p:cNvPr id="30" name="Straight Arrow Connector 29">
+            <a:extLst>
+              <a:ext uri="{FF2B5EF4-FFF2-40B4-BE49-F238E27FC236}">
+                <a16:creationId xmlns:a16="http://schemas.microsoft.com/office/drawing/2014/main" id="{563F5C5D-7F44-FD93-8CDF-1127C07507DB}"/>
+              </a:ext>
+            </a:extLst>
+          </p:cNvPr>
+          <p:cNvCxnSpPr>
+            <a:cxnSpLocks/>
+            <a:stCxn id="5" idx="0"/>
+          </p:cNvCxnSpPr>
+          <p:nvPr/>
+        </p:nvCxnSpPr>
+        <p:spPr>
+          <a:xfrm flipV="1">
+            <a:off x="1883190" y="3380204"/>
+            <a:ext cx="355028" cy="253107"/>
+          </a:xfrm>
+          <a:prstGeom prst="straightConnector1">
+            <a:avLst/>
+          </a:prstGeom>
+          <a:ln>
+            <a:tailEnd type="triangle" w="lg" len="lg"/>
+          </a:ln>
+        </p:spPr>
+        <p:style>
+          <a:lnRef idx="2">
+            <a:schemeClr val="accent1"/>
+          </a:lnRef>
+          <a:fillRef idx="0">
+            <a:schemeClr val="accent1"/>
+          </a:fillRef>
+          <a:effectRef idx="1">
+            <a:schemeClr val="accent1"/>
+          </a:effectRef>
+          <a:fontRef idx="minor">
+            <a:schemeClr val="tx1"/>
+          </a:fontRef>
+        </p:style>
+      </p:cxnSp>
+      <p:cxnSp>
+        <p:nvCxnSpPr>
+          <p:cNvPr id="34" name="Straight Arrow Connector 33">
+            <a:extLst>
+              <a:ext uri="{FF2B5EF4-FFF2-40B4-BE49-F238E27FC236}">
+                <a16:creationId xmlns:a16="http://schemas.microsoft.com/office/drawing/2014/main" id="{56941659-3284-CFEA-035A-A76C7FA4D85F}"/>
+              </a:ext>
+            </a:extLst>
+          </p:cNvPr>
+          <p:cNvCxnSpPr>
+            <a:cxnSpLocks/>
+            <a:stCxn id="6" idx="0"/>
+          </p:cNvCxnSpPr>
+          <p:nvPr/>
+        </p:nvCxnSpPr>
+        <p:spPr>
+          <a:xfrm flipH="1" flipV="1">
+            <a:off x="4751364" y="3380204"/>
+            <a:ext cx="329708" cy="253107"/>
+          </a:xfrm>
+          <a:prstGeom prst="straightConnector1">
+            <a:avLst/>
+          </a:prstGeom>
+          <a:ln>
+            <a:tailEnd type="triangle" w="lg" len="lg"/>
+          </a:ln>
+        </p:spPr>
+        <p:style>
+          <a:lnRef idx="2">
+            <a:schemeClr val="accent1"/>
+          </a:lnRef>
+          <a:fillRef idx="0">
+            <a:schemeClr val="accent1"/>
+          </a:fillRef>
+          <a:effectRef idx="1">
+            <a:schemeClr val="accent1"/>
+          </a:effectRef>
+          <a:fontRef idx="minor">
+            <a:schemeClr val="tx1"/>
+          </a:fontRef>
+        </p:style>
+      </p:cxnSp>
+      <p:cxnSp>
+        <p:nvCxnSpPr>
+          <p:cNvPr id="38" name="Straight Arrow Connector 37">
+            <a:extLst>
+              <a:ext uri="{FF2B5EF4-FFF2-40B4-BE49-F238E27FC236}">
+                <a16:creationId xmlns:a16="http://schemas.microsoft.com/office/drawing/2014/main" id="{B74CBBBA-2AA1-F473-5560-BC1DCE72EF33}"/>
+              </a:ext>
+            </a:extLst>
+          </p:cNvPr>
+          <p:cNvCxnSpPr>
+            <a:cxnSpLocks/>
+            <a:stCxn id="7" idx="2"/>
+          </p:cNvCxnSpPr>
+          <p:nvPr/>
+        </p:nvCxnSpPr>
+        <p:spPr>
+          <a:xfrm flipH="1">
+            <a:off x="4751363" y="2480945"/>
+            <a:ext cx="329709" cy="253107"/>
+          </a:xfrm>
+          <a:prstGeom prst="straightConnector1">
+            <a:avLst/>
+          </a:prstGeom>
+          <a:ln>
+            <a:tailEnd type="triangle" w="lg" len="lg"/>
+          </a:ln>
+        </p:spPr>
+        <p:style>
+          <a:lnRef idx="2">
+            <a:schemeClr val="accent1"/>
+          </a:lnRef>
+          <a:fillRef idx="0">
+            <a:schemeClr val="accent1"/>
+          </a:fillRef>
+          <a:effectRef idx="1">
+            <a:schemeClr val="accent1"/>
+          </a:effectRef>
+          <a:fontRef idx="minor">
+            <a:schemeClr val="tx1"/>
+          </a:fontRef>
+        </p:style>
+      </p:cxnSp>
+    </p:spTree>
+    <p:extLst>
+      <p:ext uri="{BB962C8B-B14F-4D97-AF65-F5344CB8AC3E}">
+        <p14:creationId xmlns:p14="http://schemas.microsoft.com/office/powerpoint/2010/main" val="3201668699"/>
+      </p:ext>
+    </p:extLst>
+  </p:cSld>
+  <p:clrMapOvr>
+    <a:masterClrMapping/>
+  </p:clrMapOvr>
+</p:sld>
+</file>
+
+<file path=ppt/slides/slide5.xml><?xml version="1.0" encoding="utf-8"?>
+<p:sld xmlns:a="http://schemas.openxmlformats.org/drawingml/2006/main" xmlns:r="http://schemas.openxmlformats.org/officeDocument/2006/relationships" xmlns:p="http://schemas.openxmlformats.org/presentationml/2006/main">
+  <p:cSld>
+    <p:spTree>
+      <p:nvGrpSpPr>
+        <p:cNvPr id="1" name="">
+          <a:extLst>
+            <a:ext uri="{FF2B5EF4-FFF2-40B4-BE49-F238E27FC236}">
+              <a16:creationId xmlns:a16="http://schemas.microsoft.com/office/drawing/2014/main" id="{E5248351-0DF7-98DA-19AF-16F1D64C1BBC}"/>
+            </a:ext>
+          </a:extLst>
+        </p:cNvPr>
+        <p:cNvGrpSpPr/>
+        <p:nvPr/>
+      </p:nvGrpSpPr>
+      <p:grpSpPr>
+        <a:xfrm>
+          <a:off x="0" y="0"/>
+          <a:ext cx="0" cy="0"/>
+          <a:chOff x="0" y="0"/>
+          <a:chExt cx="0" cy="0"/>
+        </a:xfrm>
+      </p:grpSpPr>
+      <p:sp>
+        <p:nvSpPr>
+          <p:cNvPr id="4" name="TextBox 3">
+            <a:extLst>
+              <a:ext uri="{FF2B5EF4-FFF2-40B4-BE49-F238E27FC236}">
+                <a16:creationId xmlns:a16="http://schemas.microsoft.com/office/drawing/2014/main" id="{4BE950E5-4062-BF9A-1E00-CF0AFEC38A9B}"/>
+              </a:ext>
+            </a:extLst>
+          </p:cNvPr>
+          <p:cNvSpPr txBox="1"/>
+          <p:nvPr/>
+        </p:nvSpPr>
+        <p:spPr>
+          <a:xfrm>
+            <a:off x="715477" y="1425337"/>
+            <a:ext cx="2335426" cy="1055608"/>
+          </a:xfrm>
+          <a:prstGeom prst="roundRect">
+            <a:avLst/>
+          </a:prstGeom>
+        </p:spPr>
+        <p:style>
+          <a:lnRef idx="2">
+            <a:schemeClr val="accent1"/>
+          </a:lnRef>
+          <a:fillRef idx="1">
+            <a:schemeClr val="lt1"/>
+          </a:fillRef>
+          <a:effectRef idx="0">
+            <a:schemeClr val="accent1"/>
+          </a:effectRef>
+          <a:fontRef idx="minor">
+            <a:schemeClr val="dk1"/>
+          </a:fontRef>
+        </p:style>
+        <p:txBody>
+          <a:bodyPr wrap="square" rtlCol="0">
+            <a:spAutoFit/>
+          </a:bodyPr>
+          <a:lstStyle/>
+          <a:p>
+            <a:r>
+              <a:rPr lang="en-US" sz="1200" dirty="0"/>
+              <a:t>1. Random Boolean Function Generators</a:t>
+            </a:r>
+          </a:p>
+          <a:p>
+            <a:r>
+              <a:rPr lang="en-US" sz="800" dirty="0" err="1"/>
+              <a:t>random_non_degenerated_function</a:t>
+            </a:r>
+            <a:r>
+              <a:rPr lang="en-US" sz="800" dirty="0"/>
+              <a:t>(n)</a:t>
+            </a:r>
+          </a:p>
+          <a:p>
+            <a:r>
+              <a:rPr lang="en-US" sz="800" dirty="0" err="1"/>
+              <a:t>random_k_canalizing_function</a:t>
+            </a:r>
+            <a:r>
+              <a:rPr lang="en-US" sz="800" dirty="0"/>
+              <a:t>(n, k)</a:t>
+            </a:r>
+          </a:p>
+          <a:p>
+            <a:r>
+              <a:rPr lang="en-US" sz="800" dirty="0" err="1"/>
+              <a:t>random_NCF</a:t>
+            </a:r>
+            <a:r>
+              <a:rPr lang="en-US" sz="800" dirty="0"/>
+              <a:t>(n, </a:t>
+            </a:r>
+            <a:r>
+              <a:rPr lang="en-US" sz="800" dirty="0" err="1"/>
+              <a:t>layer_structure</a:t>
+            </a:r>
+            <a:r>
+              <a:rPr lang="en-US" sz="800" dirty="0"/>
+              <a:t>)</a:t>
+            </a:r>
+          </a:p>
+          <a:p>
+            <a:r>
+              <a:rPr lang="en-US" sz="800" dirty="0"/>
+              <a:t>…</a:t>
+            </a:r>
+          </a:p>
+        </p:txBody>
+      </p:sp>
+      <p:sp>
+        <p:nvSpPr>
+          <p:cNvPr id="5" name="TextBox 4">
+            <a:extLst>
+              <a:ext uri="{FF2B5EF4-FFF2-40B4-BE49-F238E27FC236}">
+                <a16:creationId xmlns:a16="http://schemas.microsoft.com/office/drawing/2014/main" id="{E5AD405A-703B-81BD-DA2A-4A84AED98E9B}"/>
+              </a:ext>
+            </a:extLst>
+          </p:cNvPr>
+          <p:cNvSpPr txBox="1"/>
+          <p:nvPr/>
+        </p:nvSpPr>
+        <p:spPr>
+          <a:xfrm>
+            <a:off x="715477" y="3633311"/>
+            <a:ext cx="2335426" cy="987504"/>
+          </a:xfrm>
+          <a:prstGeom prst="roundRect">
+            <a:avLst/>
+          </a:prstGeom>
+        </p:spPr>
+        <p:style>
+          <a:lnRef idx="2">
+            <a:schemeClr val="accent1"/>
+          </a:lnRef>
+          <a:fillRef idx="1">
+            <a:schemeClr val="lt1"/>
+          </a:fillRef>
+          <a:effectRef idx="0">
+            <a:schemeClr val="accent1"/>
+          </a:effectRef>
+          <a:fontRef idx="minor">
+            <a:schemeClr val="dk1"/>
+          </a:fontRef>
+        </p:style>
+        <p:txBody>
+          <a:bodyPr wrap="square" rtlCol="0">
+            <a:spAutoFit/>
+          </a:bodyPr>
+          <a:lstStyle/>
+          <a:p>
+            <a:r>
+              <a:rPr lang="en-US" sz="1200" dirty="0"/>
+              <a:t>3. Boolean Function Analysis</a:t>
+            </a:r>
+          </a:p>
+          <a:p>
+            <a:r>
+              <a:rPr lang="en-US" sz="800" dirty="0" err="1"/>
+              <a:t>is_monotonic</a:t>
+            </a:r>
+            <a:r>
+              <a:rPr lang="en-US" sz="800" dirty="0"/>
+              <a:t>()	</a:t>
+            </a:r>
+            <a:r>
+              <a:rPr lang="en-US" sz="800" dirty="0" err="1"/>
+              <a:t>get_symmetry_groups</a:t>
+            </a:r>
+            <a:r>
+              <a:rPr lang="en-US" sz="800" dirty="0"/>
+              <a:t>()</a:t>
+            </a:r>
+          </a:p>
+          <a:p>
+            <a:r>
+              <a:rPr lang="en-US" sz="800" dirty="0" err="1"/>
+              <a:t>is_degenerated</a:t>
+            </a:r>
+            <a:r>
+              <a:rPr lang="en-US" sz="800" dirty="0"/>
+              <a:t>()	</a:t>
+            </a:r>
+            <a:r>
+              <a:rPr lang="en-US" sz="800" dirty="0" err="1"/>
+              <a:t>get_sensitivity</a:t>
+            </a:r>
+            <a:r>
+              <a:rPr lang="en-US" sz="800" dirty="0"/>
+              <a:t>()</a:t>
+            </a:r>
+          </a:p>
+          <a:p>
+            <a:r>
+              <a:rPr lang="en-US" sz="800" dirty="0" err="1"/>
+              <a:t>Is_k_canalizing</a:t>
+            </a:r>
+            <a:r>
+              <a:rPr lang="en-US" sz="800" dirty="0"/>
+              <a:t>()	</a:t>
+            </a:r>
+            <a:r>
+              <a:rPr lang="en-US" sz="800" dirty="0" err="1"/>
+              <a:t>get_layer_structure</a:t>
+            </a:r>
+            <a:r>
+              <a:rPr lang="en-US" sz="800" dirty="0"/>
+              <a:t>()</a:t>
+            </a:r>
+          </a:p>
+          <a:p>
+            <a:r>
+              <a:rPr lang="en-US" sz="800" dirty="0" err="1"/>
+              <a:t>Is_kset_canalizing</a:t>
+            </a:r>
+            <a:r>
+              <a:rPr lang="en-US" sz="800" dirty="0"/>
+              <a:t>()	</a:t>
+            </a:r>
+            <a:r>
+              <a:rPr lang="en-US" sz="800" dirty="0" err="1"/>
+              <a:t>get_canalizing_strength</a:t>
+            </a:r>
+            <a:r>
+              <a:rPr lang="en-US" sz="800" dirty="0"/>
+              <a:t>()</a:t>
+            </a:r>
+          </a:p>
+          <a:p>
+            <a:r>
+              <a:rPr lang="en-US" sz="800" dirty="0"/>
+              <a:t>…</a:t>
+            </a:r>
+          </a:p>
+        </p:txBody>
+      </p:sp>
+      <p:sp>
+        <p:nvSpPr>
+          <p:cNvPr id="6" name="TextBox 5">
+            <a:extLst>
+              <a:ext uri="{FF2B5EF4-FFF2-40B4-BE49-F238E27FC236}">
+                <a16:creationId xmlns:a16="http://schemas.microsoft.com/office/drawing/2014/main" id="{0D3972F6-8C12-E375-58CF-524228A5B119}"/>
+              </a:ext>
+            </a:extLst>
+          </p:cNvPr>
+          <p:cNvSpPr txBox="1"/>
+          <p:nvPr/>
+        </p:nvSpPr>
+        <p:spPr>
+          <a:xfrm>
+            <a:off x="3913359" y="3633311"/>
+            <a:ext cx="2335426" cy="987504"/>
+          </a:xfrm>
+          <a:prstGeom prst="roundRect">
+            <a:avLst/>
+          </a:prstGeom>
+        </p:spPr>
+        <p:style>
+          <a:lnRef idx="2">
+            <a:schemeClr val="accent1"/>
+          </a:lnRef>
+          <a:fillRef idx="1">
+            <a:schemeClr val="lt1"/>
+          </a:fillRef>
+          <a:effectRef idx="0">
+            <a:schemeClr val="accent1"/>
+          </a:effectRef>
+          <a:fontRef idx="minor">
+            <a:schemeClr val="dk1"/>
+          </a:fontRef>
+        </p:style>
+        <p:txBody>
+          <a:bodyPr wrap="square" rtlCol="0">
+            <a:spAutoFit/>
+          </a:bodyPr>
+          <a:lstStyle/>
+          <a:p>
+            <a:r>
+              <a:rPr lang="en-US" sz="1200" dirty="0"/>
+              <a:t>4. Boolean Network Analysis</a:t>
+            </a:r>
+          </a:p>
+          <a:p>
+            <a:r>
+              <a:rPr lang="en-US" sz="800" dirty="0" err="1"/>
+              <a:t>get_steady_states_asynchronous</a:t>
+            </a:r>
+            <a:r>
+              <a:rPr lang="en-US" sz="800" dirty="0"/>
+              <a:t>()</a:t>
+            </a:r>
+          </a:p>
+          <a:p>
+            <a:r>
+              <a:rPr lang="en-US" sz="800" dirty="0" err="1"/>
+              <a:t>get_Derrida_values</a:t>
+            </a:r>
+            <a:r>
+              <a:rPr lang="en-US" sz="800" dirty="0"/>
+              <a:t>()</a:t>
+            </a:r>
+          </a:p>
+          <a:p>
+            <a:r>
+              <a:rPr lang="en-US" sz="800" dirty="0" err="1"/>
+              <a:t>get_attractors_and_robustness_measures</a:t>
+            </a:r>
+            <a:r>
+              <a:rPr lang="en-US" sz="800" dirty="0"/>
+              <a:t>_</a:t>
+            </a:r>
+          </a:p>
+          <a:p>
+            <a:r>
+              <a:rPr lang="en-US" sz="800" dirty="0"/>
+              <a:t>synchronous()</a:t>
+            </a:r>
+          </a:p>
+          <a:p>
+            <a:r>
+              <a:rPr lang="en-US" sz="800" dirty="0"/>
+              <a:t>…</a:t>
+            </a:r>
+          </a:p>
+        </p:txBody>
+      </p:sp>
+      <p:sp>
+        <p:nvSpPr>
+          <p:cNvPr id="7" name="TextBox 6">
+            <a:extLst>
+              <a:ext uri="{FF2B5EF4-FFF2-40B4-BE49-F238E27FC236}">
+                <a16:creationId xmlns:a16="http://schemas.microsoft.com/office/drawing/2014/main" id="{36C6BAB6-5CB9-4604-8CD8-E496DEC7206E}"/>
+              </a:ext>
+            </a:extLst>
+          </p:cNvPr>
+          <p:cNvSpPr txBox="1"/>
+          <p:nvPr/>
+        </p:nvSpPr>
+        <p:spPr>
+          <a:xfrm>
+            <a:off x="3913359" y="1425337"/>
+            <a:ext cx="2335426" cy="1055608"/>
+          </a:xfrm>
+          <a:prstGeom prst="roundRect">
+            <a:avLst/>
+          </a:prstGeom>
+        </p:spPr>
+        <p:style>
+          <a:lnRef idx="2">
+            <a:schemeClr val="accent1"/>
+          </a:lnRef>
+          <a:fillRef idx="1">
+            <a:schemeClr val="lt1"/>
+          </a:fillRef>
+          <a:effectRef idx="0">
+            <a:schemeClr val="accent1"/>
+          </a:effectRef>
+          <a:fontRef idx="minor">
+            <a:schemeClr val="dk1"/>
+          </a:fontRef>
+        </p:style>
+        <p:txBody>
+          <a:bodyPr wrap="square" rtlCol="0">
+            <a:spAutoFit/>
+          </a:bodyPr>
+          <a:lstStyle/>
+          <a:p>
+            <a:r>
+              <a:rPr lang="en-US" sz="1200" dirty="0"/>
+              <a:t>2. Random Boolean Network Generators</a:t>
+            </a:r>
+          </a:p>
+          <a:p>
+            <a:r>
+              <a:rPr lang="en-US" sz="800" dirty="0"/>
+              <a:t>Generate random Boolean networks of defined size, degree distribution, canalizing depth or layer structure, bias, …</a:t>
+            </a:r>
+          </a:p>
+          <a:p>
+            <a:endParaRPr lang="en-US" sz="800" dirty="0"/>
+          </a:p>
+        </p:txBody>
+      </p:sp>
+      <p:sp>
+        <p:nvSpPr>
+          <p:cNvPr id="8" name="TextBox 7">
+            <a:extLst>
+              <a:ext uri="{FF2B5EF4-FFF2-40B4-BE49-F238E27FC236}">
+                <a16:creationId xmlns:a16="http://schemas.microsoft.com/office/drawing/2014/main" id="{CD9E3303-F139-DA18-E558-754BD02C67F6}"/>
+              </a:ext>
+            </a:extLst>
+          </p:cNvPr>
+          <p:cNvSpPr txBox="1"/>
+          <p:nvPr/>
+        </p:nvSpPr>
+        <p:spPr>
+          <a:xfrm>
+            <a:off x="2212899" y="2699583"/>
+            <a:ext cx="2538465" cy="715089"/>
+          </a:xfrm>
+          <a:prstGeom prst="roundRect">
+            <a:avLst/>
+          </a:prstGeom>
+        </p:spPr>
+        <p:style>
+          <a:lnRef idx="2">
+            <a:schemeClr val="accent1"/>
+          </a:lnRef>
+          <a:fillRef idx="1">
+            <a:schemeClr val="lt1"/>
+          </a:fillRef>
+          <a:effectRef idx="0">
+            <a:schemeClr val="accent1"/>
+          </a:effectRef>
+          <a:fontRef idx="minor">
+            <a:schemeClr val="dk1"/>
+          </a:fontRef>
+        </p:style>
+        <p:txBody>
+          <a:bodyPr wrap="square" rtlCol="0">
+            <a:spAutoFit/>
+          </a:bodyPr>
+          <a:lstStyle/>
+          <a:p>
+            <a:r>
+              <a:rPr lang="en-US" sz="1200" dirty="0"/>
+              <a:t>5. Ensemble experiments</a:t>
+            </a:r>
+          </a:p>
+          <a:p>
+            <a:r>
+              <a:rPr lang="en-US" sz="800" dirty="0"/>
+              <a:t>Build reproducible pipelines for systematic studies:</a:t>
+            </a:r>
+          </a:p>
+          <a:p>
+            <a:r>
+              <a:rPr lang="en-US" sz="800" dirty="0"/>
+              <a:t>vary parameters and study network properties across ensembles</a:t>
+            </a:r>
+          </a:p>
+        </p:txBody>
+      </p:sp>
+      <p:cxnSp>
+        <p:nvCxnSpPr>
+          <p:cNvPr id="11" name="Straight Arrow Connector 10">
+            <a:extLst>
+              <a:ext uri="{FF2B5EF4-FFF2-40B4-BE49-F238E27FC236}">
+                <a16:creationId xmlns:a16="http://schemas.microsoft.com/office/drawing/2014/main" id="{FE321F01-1A0F-F0EB-0A7F-73C66D74219E}"/>
+              </a:ext>
+            </a:extLst>
+          </p:cNvPr>
+          <p:cNvCxnSpPr>
+            <a:cxnSpLocks/>
+            <a:stCxn id="4" idx="2"/>
+            <a:endCxn id="5" idx="0"/>
+          </p:cNvCxnSpPr>
+          <p:nvPr/>
+        </p:nvCxnSpPr>
+        <p:spPr>
+          <a:xfrm>
+            <a:off x="1883190" y="2480945"/>
+            <a:ext cx="0" cy="1152366"/>
+          </a:xfrm>
+          <a:prstGeom prst="straightConnector1">
+            <a:avLst/>
+          </a:prstGeom>
+          <a:ln>
+            <a:tailEnd type="triangle" w="lg" len="lg"/>
+          </a:ln>
+        </p:spPr>
+        <p:style>
+          <a:lnRef idx="2">
+            <a:schemeClr val="accent1"/>
+          </a:lnRef>
+          <a:fillRef idx="0">
+            <a:schemeClr val="accent1"/>
+          </a:fillRef>
+          <a:effectRef idx="1">
+            <a:schemeClr val="accent1"/>
+          </a:effectRef>
+          <a:fontRef idx="minor">
+            <a:schemeClr val="tx1"/>
+          </a:fontRef>
+        </p:style>
+      </p:cxnSp>
+      <p:cxnSp>
+        <p:nvCxnSpPr>
+          <p:cNvPr id="12" name="Straight Arrow Connector 11">
+            <a:extLst>
+              <a:ext uri="{FF2B5EF4-FFF2-40B4-BE49-F238E27FC236}">
+                <a16:creationId xmlns:a16="http://schemas.microsoft.com/office/drawing/2014/main" id="{16F1CC3F-B47E-AD2F-E70A-8E70AFA55EE7}"/>
+              </a:ext>
+            </a:extLst>
+          </p:cNvPr>
+          <p:cNvCxnSpPr>
+            <a:cxnSpLocks/>
+            <a:stCxn id="7" idx="2"/>
+            <a:endCxn id="6" idx="0"/>
+          </p:cNvCxnSpPr>
+          <p:nvPr/>
+        </p:nvCxnSpPr>
+        <p:spPr>
+          <a:xfrm>
+            <a:off x="5081072" y="2480945"/>
+            <a:ext cx="0" cy="1152366"/>
+          </a:xfrm>
+          <a:prstGeom prst="straightConnector1">
+            <a:avLst/>
+          </a:prstGeom>
+          <a:ln>
+            <a:tailEnd type="triangle" w="lg" len="lg"/>
+          </a:ln>
+        </p:spPr>
+        <p:style>
+          <a:lnRef idx="2">
+            <a:schemeClr val="accent1"/>
+          </a:lnRef>
+          <a:fillRef idx="0">
+            <a:schemeClr val="accent1"/>
+          </a:fillRef>
+          <a:effectRef idx="1">
+            <a:schemeClr val="accent1"/>
+          </a:effectRef>
+          <a:fontRef idx="minor">
+            <a:schemeClr val="tx1"/>
+          </a:fontRef>
+        </p:style>
+      </p:cxnSp>
+      <p:cxnSp>
+        <p:nvCxnSpPr>
+          <p:cNvPr id="22" name="Straight Arrow Connector 21">
+            <a:extLst>
+              <a:ext uri="{FF2B5EF4-FFF2-40B4-BE49-F238E27FC236}">
+                <a16:creationId xmlns:a16="http://schemas.microsoft.com/office/drawing/2014/main" id="{DD92C94E-597B-A22B-F357-D1D2054FF6A9}"/>
+              </a:ext>
+            </a:extLst>
+          </p:cNvPr>
+          <p:cNvCxnSpPr>
+            <a:cxnSpLocks/>
+            <a:stCxn id="4" idx="3"/>
+            <a:endCxn id="7" idx="1"/>
+          </p:cNvCxnSpPr>
+          <p:nvPr/>
+        </p:nvCxnSpPr>
+        <p:spPr>
+          <a:xfrm>
+            <a:off x="3050903" y="1953141"/>
+            <a:ext cx="862456" cy="0"/>
+          </a:xfrm>
+          <a:prstGeom prst="straightConnector1">
+            <a:avLst/>
+          </a:prstGeom>
+          <a:ln>
+            <a:tailEnd type="triangle" w="lg" len="lg"/>
+          </a:ln>
+        </p:spPr>
+        <p:style>
+          <a:lnRef idx="2">
+            <a:schemeClr val="accent1"/>
+          </a:lnRef>
+          <a:fillRef idx="0">
+            <a:schemeClr val="accent1"/>
+          </a:fillRef>
+          <a:effectRef idx="1">
+            <a:schemeClr val="accent1"/>
+          </a:effectRef>
+          <a:fontRef idx="minor">
+            <a:schemeClr val="tx1"/>
+          </a:fontRef>
+        </p:style>
+      </p:cxnSp>
+      <p:cxnSp>
+        <p:nvCxnSpPr>
+          <p:cNvPr id="25" name="Straight Arrow Connector 24">
+            <a:extLst>
+              <a:ext uri="{FF2B5EF4-FFF2-40B4-BE49-F238E27FC236}">
+                <a16:creationId xmlns:a16="http://schemas.microsoft.com/office/drawing/2014/main" id="{3E3CCA0C-FF24-CB22-58D2-FEC9E9674EAC}"/>
+              </a:ext>
+            </a:extLst>
+          </p:cNvPr>
+          <p:cNvCxnSpPr>
+            <a:cxnSpLocks/>
+            <a:stCxn id="5" idx="3"/>
+            <a:endCxn id="6" idx="1"/>
+          </p:cNvCxnSpPr>
+          <p:nvPr/>
+        </p:nvCxnSpPr>
+        <p:spPr>
+          <a:xfrm>
+            <a:off x="3050903" y="4127063"/>
+            <a:ext cx="862456" cy="0"/>
+          </a:xfrm>
+          <a:prstGeom prst="straightConnector1">
+            <a:avLst/>
+          </a:prstGeom>
+          <a:ln>
+            <a:tailEnd type="triangle" w="lg" len="lg"/>
+          </a:ln>
+        </p:spPr>
+        <p:style>
+          <a:lnRef idx="2">
+            <a:schemeClr val="accent1"/>
+          </a:lnRef>
+          <a:fillRef idx="0">
+            <a:schemeClr val="accent1"/>
+          </a:fillRef>
+          <a:effectRef idx="1">
+            <a:schemeClr val="accent1"/>
+          </a:effectRef>
+          <a:fontRef idx="minor">
+            <a:schemeClr val="tx1"/>
+          </a:fontRef>
+        </p:style>
+      </p:cxnSp>
+      <p:cxnSp>
+        <p:nvCxnSpPr>
+          <p:cNvPr id="27" name="Straight Arrow Connector 26">
+            <a:extLst>
+              <a:ext uri="{FF2B5EF4-FFF2-40B4-BE49-F238E27FC236}">
+                <a16:creationId xmlns:a16="http://schemas.microsoft.com/office/drawing/2014/main" id="{08C87C70-90B7-665C-0D00-B6C018883FD5}"/>
+              </a:ext>
+            </a:extLst>
+          </p:cNvPr>
+          <p:cNvCxnSpPr>
+            <a:cxnSpLocks/>
+            <a:stCxn id="4" idx="2"/>
+          </p:cNvCxnSpPr>
+          <p:nvPr/>
+        </p:nvCxnSpPr>
+        <p:spPr>
+          <a:xfrm>
+            <a:off x="1883190" y="2480945"/>
+            <a:ext cx="355028" cy="262136"/>
+          </a:xfrm>
+          <a:prstGeom prst="straightConnector1">
+            <a:avLst/>
+          </a:prstGeom>
+          <a:ln>
+            <a:tailEnd type="triangle" w="lg" len="lg"/>
+          </a:ln>
+        </p:spPr>
+        <p:style>
+          <a:lnRef idx="2">
+            <a:schemeClr val="accent1"/>
+          </a:lnRef>
+          <a:fillRef idx="0">
+            <a:schemeClr val="accent1"/>
+          </a:fillRef>
+          <a:effectRef idx="1">
+            <a:schemeClr val="accent1"/>
+          </a:effectRef>
+          <a:fontRef idx="minor">
+            <a:schemeClr val="tx1"/>
+          </a:fontRef>
+        </p:style>
+      </p:cxnSp>
+      <p:cxnSp>
+        <p:nvCxnSpPr>
+          <p:cNvPr id="30" name="Straight Arrow Connector 29">
+            <a:extLst>
+              <a:ext uri="{FF2B5EF4-FFF2-40B4-BE49-F238E27FC236}">
+                <a16:creationId xmlns:a16="http://schemas.microsoft.com/office/drawing/2014/main" id="{6C2172A1-DFBE-5820-D4CA-A9465C1D6799}"/>
+              </a:ext>
+            </a:extLst>
+          </p:cNvPr>
+          <p:cNvCxnSpPr>
+            <a:cxnSpLocks/>
+            <a:stCxn id="5" idx="0"/>
+          </p:cNvCxnSpPr>
+          <p:nvPr/>
+        </p:nvCxnSpPr>
+        <p:spPr>
+          <a:xfrm flipV="1">
+            <a:off x="1883190" y="3380204"/>
+            <a:ext cx="355028" cy="253107"/>
+          </a:xfrm>
+          <a:prstGeom prst="straightConnector1">
+            <a:avLst/>
+          </a:prstGeom>
+          <a:ln>
+            <a:tailEnd type="triangle" w="lg" len="lg"/>
+          </a:ln>
+        </p:spPr>
+        <p:style>
+          <a:lnRef idx="2">
+            <a:schemeClr val="accent1"/>
+          </a:lnRef>
+          <a:fillRef idx="0">
+            <a:schemeClr val="accent1"/>
+          </a:fillRef>
+          <a:effectRef idx="1">
+            <a:schemeClr val="accent1"/>
+          </a:effectRef>
+          <a:fontRef idx="minor">
+            <a:schemeClr val="tx1"/>
+          </a:fontRef>
+        </p:style>
+      </p:cxnSp>
+      <p:cxnSp>
+        <p:nvCxnSpPr>
+          <p:cNvPr id="34" name="Straight Arrow Connector 33">
+            <a:extLst>
+              <a:ext uri="{FF2B5EF4-FFF2-40B4-BE49-F238E27FC236}">
+                <a16:creationId xmlns:a16="http://schemas.microsoft.com/office/drawing/2014/main" id="{EDA9EFFE-49F3-CA2A-0059-BE3772483990}"/>
+              </a:ext>
+            </a:extLst>
+          </p:cNvPr>
+          <p:cNvCxnSpPr>
+            <a:cxnSpLocks/>
+            <a:stCxn id="6" idx="0"/>
+          </p:cNvCxnSpPr>
+          <p:nvPr/>
+        </p:nvCxnSpPr>
+        <p:spPr>
+          <a:xfrm flipH="1" flipV="1">
+            <a:off x="4751364" y="3380204"/>
+            <a:ext cx="329708" cy="253107"/>
+          </a:xfrm>
+          <a:prstGeom prst="straightConnector1">
+            <a:avLst/>
+          </a:prstGeom>
+          <a:ln>
+            <a:tailEnd type="triangle" w="lg" len="lg"/>
+          </a:ln>
+        </p:spPr>
+        <p:style>
+          <a:lnRef idx="2">
+            <a:schemeClr val="accent1"/>
+          </a:lnRef>
+          <a:fillRef idx="0">
+            <a:schemeClr val="accent1"/>
+          </a:fillRef>
+          <a:effectRef idx="1">
+            <a:schemeClr val="accent1"/>
+          </a:effectRef>
+          <a:fontRef idx="minor">
+            <a:schemeClr val="tx1"/>
+          </a:fontRef>
+        </p:style>
+      </p:cxnSp>
+      <p:cxnSp>
+        <p:nvCxnSpPr>
+          <p:cNvPr id="38" name="Straight Arrow Connector 37">
+            <a:extLst>
+              <a:ext uri="{FF2B5EF4-FFF2-40B4-BE49-F238E27FC236}">
+                <a16:creationId xmlns:a16="http://schemas.microsoft.com/office/drawing/2014/main" id="{117A4252-8BAC-ADC8-E265-B1AFB881A510}"/>
+              </a:ext>
+            </a:extLst>
+          </p:cNvPr>
+          <p:cNvCxnSpPr>
+            <a:cxnSpLocks/>
+            <a:stCxn id="7" idx="2"/>
+          </p:cNvCxnSpPr>
+          <p:nvPr/>
+        </p:nvCxnSpPr>
+        <p:spPr>
+          <a:xfrm flipH="1">
+            <a:off x="4751363" y="2480945"/>
+            <a:ext cx="329709" cy="253107"/>
+          </a:xfrm>
+          <a:prstGeom prst="straightConnector1">
+            <a:avLst/>
+          </a:prstGeom>
+          <a:ln>
+            <a:tailEnd type="triangle" w="lg" len="lg"/>
+          </a:ln>
+        </p:spPr>
+        <p:style>
+          <a:lnRef idx="2">
+            <a:schemeClr val="accent1"/>
+          </a:lnRef>
+          <a:fillRef idx="0">
+            <a:schemeClr val="accent1"/>
+          </a:fillRef>
+          <a:effectRef idx="1">
+            <a:schemeClr val="accent1"/>
+          </a:effectRef>
+          <a:fontRef idx="minor">
+            <a:schemeClr val="tx1"/>
+          </a:fontRef>
+        </p:style>
+      </p:cxnSp>
+      <p:sp>
+        <p:nvSpPr>
+          <p:cNvPr id="2" name="TextBox 1">
+            <a:extLst>
+              <a:ext uri="{FF2B5EF4-FFF2-40B4-BE49-F238E27FC236}">
+                <a16:creationId xmlns:a16="http://schemas.microsoft.com/office/drawing/2014/main" id="{4D8FFC44-D612-A1FB-DD19-19CCD2EDA170}"/>
+              </a:ext>
+            </a:extLst>
+          </p:cNvPr>
+          <p:cNvSpPr txBox="1"/>
+          <p:nvPr/>
+        </p:nvSpPr>
+        <p:spPr>
+          <a:xfrm>
+            <a:off x="5410780" y="2507803"/>
+            <a:ext cx="1612396" cy="1031915"/>
+          </a:xfrm>
+          <a:prstGeom prst="hexagon">
+            <a:avLst>
+              <a:gd name="adj" fmla="val 6992"/>
+              <a:gd name="vf" fmla="val 115470"/>
+            </a:avLst>
+          </a:prstGeom>
+        </p:spPr>
+        <p:style>
+          <a:lnRef idx="2">
+            <a:schemeClr val="accent1"/>
+          </a:lnRef>
+          <a:fillRef idx="1">
+            <a:schemeClr val="lt1"/>
+          </a:fillRef>
+          <a:effectRef idx="0">
+            <a:schemeClr val="accent1"/>
+          </a:effectRef>
+          <a:fontRef idx="minor">
+            <a:schemeClr val="dk1"/>
+          </a:fontRef>
+        </p:style>
+        <p:txBody>
+          <a:bodyPr wrap="square" rtlCol="0">
+            <a:spAutoFit/>
+          </a:bodyPr>
+          <a:lstStyle/>
+          <a:p>
+            <a:r>
+              <a:rPr lang="en-US" sz="1200" dirty="0"/>
+              <a:t>class </a:t>
+            </a:r>
+            <a:r>
+              <a:rPr lang="en-US" sz="1200" dirty="0" err="1"/>
+              <a:t>BooleanNetwork</a:t>
+            </a:r>
+            <a:endParaRPr lang="en-US" sz="1200" dirty="0"/>
+          </a:p>
+          <a:p>
+            <a:r>
+              <a:rPr lang="en-US" sz="800" dirty="0"/>
+              <a:t>Interoperable with </a:t>
+            </a:r>
+            <a:r>
+              <a:rPr lang="en-US" sz="800" dirty="0" err="1"/>
+              <a:t>PyBoolNet</a:t>
+            </a:r>
+            <a:r>
+              <a:rPr lang="en-US" sz="800" dirty="0"/>
+              <a:t>, CANA</a:t>
+            </a:r>
+          </a:p>
+          <a:p>
+            <a:endParaRPr lang="en-US" sz="800" dirty="0"/>
+          </a:p>
+        </p:txBody>
+      </p:sp>
+    </p:spTree>
+    <p:extLst>
+      <p:ext uri="{BB962C8B-B14F-4D97-AF65-F5344CB8AC3E}">
+        <p14:creationId xmlns:p14="http://schemas.microsoft.com/office/powerpoint/2010/main" val="1096074743"/>
+      </p:ext>
+    </p:extLst>
+  </p:cSld>
+  <p:clrMapOvr>
+    <a:masterClrMapping/>
+  </p:clrMapOvr>
+</p:sld>
+</file>
+
+<file path=ppt/slides/slide6.xml><?xml version="1.0" encoding="utf-8"?>
+<p:sld xmlns:a="http://schemas.openxmlformats.org/drawingml/2006/main" xmlns:r="http://schemas.openxmlformats.org/officeDocument/2006/relationships" xmlns:p="http://schemas.openxmlformats.org/presentationml/2006/main">
+  <p:cSld>
+    <p:spTree>
+      <p:nvGrpSpPr>
+        <p:cNvPr id="1" name="">
+          <a:extLst>
+            <a:ext uri="{FF2B5EF4-FFF2-40B4-BE49-F238E27FC236}">
+              <a16:creationId xmlns:a16="http://schemas.microsoft.com/office/drawing/2014/main" id="{ACB20BAD-0DE0-C471-51F0-F6B73098D163}"/>
+            </a:ext>
+          </a:extLst>
+        </p:cNvPr>
+        <p:cNvGrpSpPr/>
+        <p:nvPr/>
+      </p:nvGrpSpPr>
+      <p:grpSpPr>
+        <a:xfrm>
+          <a:off x="0" y="0"/>
+          <a:ext cx="0" cy="0"/>
+          <a:chOff x="0" y="0"/>
+          <a:chExt cx="0" cy="0"/>
+        </a:xfrm>
+      </p:grpSpPr>
+      <p:sp>
+        <p:nvSpPr>
+          <p:cNvPr id="13" name="Rounded Rectangle 12">
+            <a:extLst>
+              <a:ext uri="{FF2B5EF4-FFF2-40B4-BE49-F238E27FC236}">
+                <a16:creationId xmlns:a16="http://schemas.microsoft.com/office/drawing/2014/main" id="{30E8E869-8CD1-325D-B8AD-CE1DFCDFE559}"/>
+              </a:ext>
+            </a:extLst>
+          </p:cNvPr>
+          <p:cNvSpPr/>
+          <p:nvPr/>
+        </p:nvSpPr>
+        <p:spPr>
+          <a:xfrm>
+            <a:off x="3703101" y="944880"/>
+            <a:ext cx="2982179" cy="3992880"/>
+          </a:xfrm>
+          <a:prstGeom prst="roundRect">
+            <a:avLst>
+              <a:gd name="adj" fmla="val 20354"/>
+            </a:avLst>
+          </a:prstGeom>
+          <a:solidFill>
+            <a:schemeClr val="accent2">
+              <a:lumMod val="20000"/>
+              <a:lumOff val="80000"/>
+              <a:alpha val="34000"/>
+            </a:schemeClr>
+          </a:solidFill>
+          <a:ln>
+            <a:noFill/>
+          </a:ln>
+        </p:spPr>
+        <p:style>
+          <a:lnRef idx="2">
+            <a:schemeClr val="accent1">
+              <a:shade val="15000"/>
+            </a:schemeClr>
+          </a:lnRef>
+          <a:fillRef idx="1">
+            <a:schemeClr val="accent1"/>
+          </a:fillRef>
+          <a:effectRef idx="0">
+            <a:schemeClr val="accent1"/>
+          </a:effectRef>
+          <a:fontRef idx="minor">
+            <a:schemeClr val="lt1"/>
+          </a:fontRef>
+        </p:style>
+        <p:txBody>
+          <a:bodyPr rtlCol="0" anchor="ctr"/>
+          <a:lstStyle/>
+          <a:p>
+            <a:pPr algn="ctr"/>
+            <a:endParaRPr lang="en-US"/>
+          </a:p>
+        </p:txBody>
+      </p:sp>
+      <p:sp>
+        <p:nvSpPr>
+          <p:cNvPr id="10" name="Rounded Rectangle 9">
+            <a:extLst>
+              <a:ext uri="{FF2B5EF4-FFF2-40B4-BE49-F238E27FC236}">
+                <a16:creationId xmlns:a16="http://schemas.microsoft.com/office/drawing/2014/main" id="{07C609A5-672E-3A7E-2435-4831FA0C9A53}"/>
+              </a:ext>
+            </a:extLst>
+          </p:cNvPr>
+          <p:cNvSpPr/>
+          <p:nvPr/>
+        </p:nvSpPr>
+        <p:spPr>
+          <a:xfrm>
+            <a:off x="525739" y="944880"/>
+            <a:ext cx="2755941" cy="3992880"/>
+          </a:xfrm>
+          <a:prstGeom prst="roundRect">
+            <a:avLst>
+              <a:gd name="adj" fmla="val 20354"/>
+            </a:avLst>
+          </a:prstGeom>
+          <a:solidFill>
+            <a:schemeClr val="accent2">
+              <a:lumMod val="20000"/>
+              <a:lumOff val="80000"/>
+              <a:alpha val="34000"/>
+            </a:schemeClr>
+          </a:solidFill>
+          <a:ln>
+            <a:noFill/>
+          </a:ln>
+        </p:spPr>
+        <p:style>
+          <a:lnRef idx="2">
+            <a:schemeClr val="accent1">
+              <a:shade val="15000"/>
+            </a:schemeClr>
+          </a:lnRef>
+          <a:fillRef idx="1">
+            <a:schemeClr val="accent1"/>
+          </a:fillRef>
+          <a:effectRef idx="0">
+            <a:schemeClr val="accent1"/>
+          </a:effectRef>
+          <a:fontRef idx="minor">
+            <a:schemeClr val="lt1"/>
+          </a:fontRef>
+        </p:style>
+        <p:txBody>
+          <a:bodyPr rtlCol="0" anchor="ctr"/>
+          <a:lstStyle/>
+          <a:p>
+            <a:pPr algn="ctr"/>
+            <a:endParaRPr lang="en-US"/>
+          </a:p>
+        </p:txBody>
+      </p:sp>
+      <p:sp>
+        <p:nvSpPr>
+          <p:cNvPr id="4" name="TextBox 3">
+            <a:extLst>
+              <a:ext uri="{FF2B5EF4-FFF2-40B4-BE49-F238E27FC236}">
+                <a16:creationId xmlns:a16="http://schemas.microsoft.com/office/drawing/2014/main" id="{7C30C0AD-E2BB-DCBD-8C86-A5C6F2BCA3EF}"/>
+              </a:ext>
+            </a:extLst>
+          </p:cNvPr>
+          <p:cNvSpPr txBox="1"/>
+          <p:nvPr/>
+        </p:nvSpPr>
+        <p:spPr>
+          <a:xfrm>
+            <a:off x="715477" y="1425337"/>
+            <a:ext cx="2335426" cy="1055608"/>
+          </a:xfrm>
+          <a:prstGeom prst="roundRect">
+            <a:avLst/>
+          </a:prstGeom>
+        </p:spPr>
+        <p:style>
+          <a:lnRef idx="2">
+            <a:schemeClr val="accent1"/>
+          </a:lnRef>
+          <a:fillRef idx="1">
+            <a:schemeClr val="lt1"/>
+          </a:fillRef>
+          <a:effectRef idx="0">
+            <a:schemeClr val="accent1"/>
+          </a:effectRef>
+          <a:fontRef idx="minor">
+            <a:schemeClr val="dk1"/>
+          </a:fontRef>
+        </p:style>
+        <p:txBody>
+          <a:bodyPr wrap="square" rtlCol="0">
+            <a:spAutoFit/>
+          </a:bodyPr>
+          <a:lstStyle/>
+          <a:p>
+            <a:r>
+              <a:rPr lang="en-US" sz="1200" dirty="0"/>
+              <a:t>1. Random Boolean Function Generators</a:t>
+            </a:r>
+          </a:p>
+          <a:p>
+            <a:r>
+              <a:rPr lang="en-US" sz="800" dirty="0" err="1"/>
+              <a:t>random_non_degenerated_function</a:t>
+            </a:r>
+            <a:r>
+              <a:rPr lang="en-US" sz="800" dirty="0"/>
+              <a:t>(n, bias)</a:t>
+            </a:r>
+          </a:p>
+          <a:p>
+            <a:r>
+              <a:rPr lang="en-US" sz="800" dirty="0" err="1"/>
+              <a:t>random_k_canalizing_function</a:t>
+            </a:r>
+            <a:r>
+              <a:rPr lang="en-US" sz="800" dirty="0"/>
+              <a:t>(n, k)</a:t>
+            </a:r>
+          </a:p>
+          <a:p>
+            <a:r>
+              <a:rPr lang="en-US" sz="800" dirty="0" err="1"/>
+              <a:t>random_NCF</a:t>
+            </a:r>
+            <a:r>
+              <a:rPr lang="en-US" sz="800" dirty="0"/>
+              <a:t>(n, </a:t>
+            </a:r>
+            <a:r>
+              <a:rPr lang="en-US" sz="800" dirty="0" err="1"/>
+              <a:t>layer_structure</a:t>
+            </a:r>
+            <a:r>
+              <a:rPr lang="en-US" sz="800" dirty="0"/>
+              <a:t>)</a:t>
+            </a:r>
+          </a:p>
+          <a:p>
+            <a:r>
+              <a:rPr lang="en-US" sz="800" dirty="0"/>
+              <a:t>…</a:t>
+            </a:r>
+          </a:p>
+        </p:txBody>
+      </p:sp>
+      <p:sp>
+        <p:nvSpPr>
+          <p:cNvPr id="5" name="TextBox 4">
+            <a:extLst>
+              <a:ext uri="{FF2B5EF4-FFF2-40B4-BE49-F238E27FC236}">
+                <a16:creationId xmlns:a16="http://schemas.microsoft.com/office/drawing/2014/main" id="{7D65A8E1-BCC5-C492-2CD7-8C1540562120}"/>
+              </a:ext>
+            </a:extLst>
+          </p:cNvPr>
+          <p:cNvSpPr txBox="1"/>
+          <p:nvPr/>
+        </p:nvSpPr>
+        <p:spPr>
+          <a:xfrm>
+            <a:off x="715477" y="3633311"/>
+            <a:ext cx="2335426" cy="987504"/>
+          </a:xfrm>
+          <a:prstGeom prst="roundRect">
+            <a:avLst/>
+          </a:prstGeom>
+        </p:spPr>
+        <p:style>
+          <a:lnRef idx="2">
+            <a:schemeClr val="accent1"/>
+          </a:lnRef>
+          <a:fillRef idx="1">
+            <a:schemeClr val="lt1"/>
+          </a:fillRef>
+          <a:effectRef idx="0">
+            <a:schemeClr val="accent1"/>
+          </a:effectRef>
+          <a:fontRef idx="minor">
+            <a:schemeClr val="dk1"/>
+          </a:fontRef>
+        </p:style>
+        <p:txBody>
+          <a:bodyPr wrap="square" rtlCol="0">
+            <a:spAutoFit/>
+          </a:bodyPr>
+          <a:lstStyle/>
+          <a:p>
+            <a:r>
+              <a:rPr lang="en-US" sz="1200" dirty="0"/>
+              <a:t>3. Boolean Function Analysis</a:t>
+            </a:r>
+          </a:p>
+          <a:p>
+            <a:r>
+              <a:rPr lang="en-US" sz="800" dirty="0" err="1"/>
+              <a:t>is_monotonic</a:t>
+            </a:r>
+            <a:r>
+              <a:rPr lang="en-US" sz="800" dirty="0"/>
+              <a:t>()	</a:t>
+            </a:r>
+            <a:r>
+              <a:rPr lang="en-US" sz="800" dirty="0" err="1"/>
+              <a:t>get_symmetry_groups</a:t>
+            </a:r>
+            <a:r>
+              <a:rPr lang="en-US" sz="800" dirty="0"/>
+              <a:t>()</a:t>
+            </a:r>
+          </a:p>
+          <a:p>
+            <a:r>
+              <a:rPr lang="en-US" sz="800" dirty="0" err="1"/>
+              <a:t>is_degenerated</a:t>
+            </a:r>
+            <a:r>
+              <a:rPr lang="en-US" sz="800" dirty="0"/>
+              <a:t>()	</a:t>
+            </a:r>
+            <a:r>
+              <a:rPr lang="en-US" sz="800" dirty="0" err="1"/>
+              <a:t>get_sensitivity</a:t>
+            </a:r>
+            <a:r>
+              <a:rPr lang="en-US" sz="800" dirty="0"/>
+              <a:t>()</a:t>
+            </a:r>
+          </a:p>
+          <a:p>
+            <a:r>
+              <a:rPr lang="en-US" sz="800" dirty="0" err="1"/>
+              <a:t>Is_k_canalizing</a:t>
+            </a:r>
+            <a:r>
+              <a:rPr lang="en-US" sz="800" dirty="0"/>
+              <a:t>()	</a:t>
+            </a:r>
+            <a:r>
+              <a:rPr lang="en-US" sz="800" dirty="0" err="1"/>
+              <a:t>get_layer_structure</a:t>
+            </a:r>
+            <a:r>
+              <a:rPr lang="en-US" sz="800" dirty="0"/>
+              <a:t>()</a:t>
+            </a:r>
+          </a:p>
+          <a:p>
+            <a:r>
+              <a:rPr lang="en-US" sz="800" dirty="0" err="1"/>
+              <a:t>Is_kset_canalizing</a:t>
+            </a:r>
+            <a:r>
+              <a:rPr lang="en-US" sz="800" dirty="0"/>
+              <a:t>()	</a:t>
+            </a:r>
+            <a:r>
+              <a:rPr lang="en-US" sz="800" dirty="0" err="1"/>
+              <a:t>get_canalizing_strength</a:t>
+            </a:r>
+            <a:r>
+              <a:rPr lang="en-US" sz="800" dirty="0"/>
+              <a:t>()</a:t>
+            </a:r>
+          </a:p>
+          <a:p>
+            <a:r>
+              <a:rPr lang="en-US" sz="800" dirty="0"/>
+              <a:t>…</a:t>
+            </a:r>
+          </a:p>
+        </p:txBody>
+      </p:sp>
+      <p:sp>
+        <p:nvSpPr>
+          <p:cNvPr id="6" name="TextBox 5">
+            <a:extLst>
+              <a:ext uri="{FF2B5EF4-FFF2-40B4-BE49-F238E27FC236}">
+                <a16:creationId xmlns:a16="http://schemas.microsoft.com/office/drawing/2014/main" id="{0AE93D43-9F6D-C312-57FA-EFF5AAFBDD1E}"/>
+              </a:ext>
+            </a:extLst>
+          </p:cNvPr>
+          <p:cNvSpPr txBox="1"/>
+          <p:nvPr/>
+        </p:nvSpPr>
+        <p:spPr>
+          <a:xfrm>
+            <a:off x="3913359" y="3633311"/>
+            <a:ext cx="2690640" cy="987504"/>
+          </a:xfrm>
+          <a:prstGeom prst="roundRect">
+            <a:avLst/>
+          </a:prstGeom>
+        </p:spPr>
+        <p:style>
+          <a:lnRef idx="2">
+            <a:schemeClr val="accent1"/>
+          </a:lnRef>
+          <a:fillRef idx="1">
+            <a:schemeClr val="lt1"/>
+          </a:fillRef>
+          <a:effectRef idx="0">
+            <a:schemeClr val="accent1"/>
+          </a:effectRef>
+          <a:fontRef idx="minor">
+            <a:schemeClr val="dk1"/>
+          </a:fontRef>
+        </p:style>
+        <p:txBody>
+          <a:bodyPr wrap="square" rtlCol="0">
+            <a:spAutoFit/>
+          </a:bodyPr>
+          <a:lstStyle/>
+          <a:p>
+            <a:r>
+              <a:rPr lang="en-US" sz="1200" dirty="0"/>
+              <a:t>4. Boolean Network Analysis</a:t>
+            </a:r>
+          </a:p>
+          <a:p>
+            <a:r>
+              <a:rPr lang="en-US" sz="800" dirty="0" err="1"/>
+              <a:t>get_steady_states_asynchronous</a:t>
+            </a:r>
+            <a:r>
+              <a:rPr lang="en-US" sz="800" dirty="0"/>
+              <a:t>()</a:t>
+            </a:r>
+          </a:p>
+          <a:p>
+            <a:r>
+              <a:rPr lang="en-US" sz="800" dirty="0" err="1"/>
+              <a:t>get_Derrida_values</a:t>
+            </a:r>
+            <a:r>
+              <a:rPr lang="en-US" sz="800" dirty="0"/>
+              <a:t>()</a:t>
+            </a:r>
+          </a:p>
+          <a:p>
+            <a:r>
+              <a:rPr lang="en-US" sz="800" dirty="0" err="1"/>
+              <a:t>get_attractors_and_robustness_measures</a:t>
+            </a:r>
+            <a:r>
+              <a:rPr lang="en-US" sz="800" dirty="0"/>
+              <a:t>_</a:t>
+            </a:r>
+          </a:p>
+          <a:p>
+            <a:r>
+              <a:rPr lang="en-US" sz="800" dirty="0"/>
+              <a:t>synchronous()</a:t>
+            </a:r>
+          </a:p>
+          <a:p>
+            <a:r>
+              <a:rPr lang="en-US" sz="800" dirty="0"/>
+              <a:t>…</a:t>
+            </a:r>
+          </a:p>
+        </p:txBody>
+      </p:sp>
+      <p:sp>
+        <p:nvSpPr>
+          <p:cNvPr id="7" name="TextBox 6">
+            <a:extLst>
+              <a:ext uri="{FF2B5EF4-FFF2-40B4-BE49-F238E27FC236}">
+                <a16:creationId xmlns:a16="http://schemas.microsoft.com/office/drawing/2014/main" id="{9946DDB8-E72E-6A34-BFFB-F00834FF9274}"/>
+              </a:ext>
+            </a:extLst>
+          </p:cNvPr>
+          <p:cNvSpPr txBox="1"/>
+          <p:nvPr/>
+        </p:nvSpPr>
+        <p:spPr>
+          <a:xfrm>
+            <a:off x="3913359" y="1425337"/>
+            <a:ext cx="2690640" cy="1055608"/>
+          </a:xfrm>
+          <a:prstGeom prst="roundRect">
+            <a:avLst/>
+          </a:prstGeom>
+        </p:spPr>
+        <p:style>
+          <a:lnRef idx="2">
+            <a:schemeClr val="accent1"/>
+          </a:lnRef>
+          <a:fillRef idx="1">
+            <a:schemeClr val="lt1"/>
+          </a:fillRef>
+          <a:effectRef idx="0">
+            <a:schemeClr val="accent1"/>
+          </a:effectRef>
+          <a:fontRef idx="minor">
+            <a:schemeClr val="dk1"/>
+          </a:fontRef>
+        </p:style>
+        <p:txBody>
+          <a:bodyPr wrap="square" rtlCol="0">
+            <a:spAutoFit/>
+          </a:bodyPr>
+          <a:lstStyle/>
+          <a:p>
+            <a:r>
+              <a:rPr lang="en-US" sz="1200" dirty="0"/>
+              <a:t>2. Random Boolean Network Generators</a:t>
+            </a:r>
+          </a:p>
+          <a:p>
+            <a:r>
+              <a:rPr lang="en-US" sz="800" dirty="0"/>
+              <a:t>Generate random Boolean networks of defined size, degree distribution, canalizing depth or layer structure, bias, …</a:t>
+            </a:r>
+          </a:p>
+          <a:p>
+            <a:endParaRPr lang="en-US" sz="800" dirty="0"/>
+          </a:p>
+        </p:txBody>
+      </p:sp>
+      <p:sp>
+        <p:nvSpPr>
+          <p:cNvPr id="8" name="TextBox 7">
+            <a:extLst>
+              <a:ext uri="{FF2B5EF4-FFF2-40B4-BE49-F238E27FC236}">
+                <a16:creationId xmlns:a16="http://schemas.microsoft.com/office/drawing/2014/main" id="{B80A1176-6492-53E4-830D-2FDA82078130}"/>
+              </a:ext>
+            </a:extLst>
+          </p:cNvPr>
+          <p:cNvSpPr txBox="1"/>
+          <p:nvPr/>
+        </p:nvSpPr>
+        <p:spPr>
+          <a:xfrm>
+            <a:off x="2212899" y="2699583"/>
+            <a:ext cx="2538465" cy="715089"/>
+          </a:xfrm>
+          <a:prstGeom prst="roundRect">
+            <a:avLst/>
+          </a:prstGeom>
+        </p:spPr>
+        <p:style>
+          <a:lnRef idx="2">
+            <a:schemeClr val="accent1"/>
+          </a:lnRef>
+          <a:fillRef idx="1">
+            <a:schemeClr val="lt1"/>
+          </a:fillRef>
+          <a:effectRef idx="0">
+            <a:schemeClr val="accent1"/>
+          </a:effectRef>
+          <a:fontRef idx="minor">
+            <a:schemeClr val="dk1"/>
+          </a:fontRef>
+        </p:style>
+        <p:txBody>
+          <a:bodyPr wrap="square" rtlCol="0">
+            <a:spAutoFit/>
+          </a:bodyPr>
+          <a:lstStyle/>
+          <a:p>
+            <a:r>
+              <a:rPr lang="en-US" sz="1200" dirty="0"/>
+              <a:t>5. Ensemble experiments</a:t>
+            </a:r>
+          </a:p>
+          <a:p>
+            <a:r>
+              <a:rPr lang="en-US" sz="800" dirty="0"/>
+              <a:t>Build reproducible pipelines for systematic studies:</a:t>
+            </a:r>
+          </a:p>
+          <a:p>
+            <a:r>
+              <a:rPr lang="en-US" sz="800" dirty="0"/>
+              <a:t>vary parameters and study function and network properties across ensembles</a:t>
+            </a:r>
+          </a:p>
+        </p:txBody>
+      </p:sp>
+      <p:cxnSp>
+        <p:nvCxnSpPr>
+          <p:cNvPr id="11" name="Straight Arrow Connector 10">
+            <a:extLst>
+              <a:ext uri="{FF2B5EF4-FFF2-40B4-BE49-F238E27FC236}">
+                <a16:creationId xmlns:a16="http://schemas.microsoft.com/office/drawing/2014/main" id="{F9403B9B-A14C-B3EB-CDB0-124300457DBA}"/>
+              </a:ext>
+            </a:extLst>
+          </p:cNvPr>
+          <p:cNvCxnSpPr>
+            <a:cxnSpLocks/>
+            <a:stCxn id="4" idx="2"/>
+            <a:endCxn id="5" idx="0"/>
+          </p:cNvCxnSpPr>
+          <p:nvPr/>
+        </p:nvCxnSpPr>
+        <p:spPr>
+          <a:xfrm>
+            <a:off x="1883190" y="2480945"/>
+            <a:ext cx="0" cy="1152366"/>
+          </a:xfrm>
+          <a:prstGeom prst="straightConnector1">
+            <a:avLst/>
+          </a:prstGeom>
+          <a:ln>
+            <a:tailEnd type="triangle" w="lg" len="lg"/>
+          </a:ln>
+        </p:spPr>
+        <p:style>
+          <a:lnRef idx="2">
+            <a:schemeClr val="accent1"/>
+          </a:lnRef>
+          <a:fillRef idx="0">
+            <a:schemeClr val="accent1"/>
+          </a:fillRef>
+          <a:effectRef idx="1">
+            <a:schemeClr val="accent1"/>
+          </a:effectRef>
+          <a:fontRef idx="minor">
+            <a:schemeClr val="tx1"/>
+          </a:fontRef>
+        </p:style>
+      </p:cxnSp>
+      <p:cxnSp>
+        <p:nvCxnSpPr>
+          <p:cNvPr id="12" name="Straight Arrow Connector 11">
+            <a:extLst>
+              <a:ext uri="{FF2B5EF4-FFF2-40B4-BE49-F238E27FC236}">
+                <a16:creationId xmlns:a16="http://schemas.microsoft.com/office/drawing/2014/main" id="{EDDC3916-02BD-2CD6-14BA-30313AB1033E}"/>
+              </a:ext>
+            </a:extLst>
+          </p:cNvPr>
+          <p:cNvCxnSpPr>
+            <a:cxnSpLocks/>
+          </p:cNvCxnSpPr>
+          <p:nvPr/>
+        </p:nvCxnSpPr>
+        <p:spPr>
+          <a:xfrm>
+            <a:off x="5069840" y="2480945"/>
+            <a:ext cx="11232" cy="1152366"/>
+          </a:xfrm>
+          <a:prstGeom prst="straightConnector1">
+            <a:avLst/>
+          </a:prstGeom>
+          <a:ln>
+            <a:tailEnd type="triangle" w="lg" len="lg"/>
+          </a:ln>
+        </p:spPr>
+        <p:style>
+          <a:lnRef idx="2">
+            <a:schemeClr val="accent1"/>
+          </a:lnRef>
+          <a:fillRef idx="0">
+            <a:schemeClr val="accent1"/>
+          </a:fillRef>
+          <a:effectRef idx="1">
+            <a:schemeClr val="accent1"/>
+          </a:effectRef>
+          <a:fontRef idx="minor">
+            <a:schemeClr val="tx1"/>
+          </a:fontRef>
+        </p:style>
+      </p:cxnSp>
+      <p:cxnSp>
+        <p:nvCxnSpPr>
+          <p:cNvPr id="22" name="Straight Arrow Connector 21">
+            <a:extLst>
+              <a:ext uri="{FF2B5EF4-FFF2-40B4-BE49-F238E27FC236}">
+                <a16:creationId xmlns:a16="http://schemas.microsoft.com/office/drawing/2014/main" id="{062C4D76-47CE-5E07-763C-C74A4F3A6D8F}"/>
+              </a:ext>
+            </a:extLst>
+          </p:cNvPr>
+          <p:cNvCxnSpPr>
+            <a:cxnSpLocks/>
+            <a:stCxn id="4" idx="3"/>
+            <a:endCxn id="7" idx="1"/>
+          </p:cNvCxnSpPr>
+          <p:nvPr/>
+        </p:nvCxnSpPr>
+        <p:spPr>
+          <a:xfrm>
+            <a:off x="3050903" y="1953141"/>
+            <a:ext cx="862456" cy="0"/>
+          </a:xfrm>
+          <a:prstGeom prst="straightConnector1">
+            <a:avLst/>
+          </a:prstGeom>
+          <a:ln>
+            <a:tailEnd type="triangle" w="lg" len="lg"/>
+          </a:ln>
+        </p:spPr>
+        <p:style>
+          <a:lnRef idx="2">
+            <a:schemeClr val="accent1"/>
+          </a:lnRef>
+          <a:fillRef idx="0">
+            <a:schemeClr val="accent1"/>
+          </a:fillRef>
+          <a:effectRef idx="1">
+            <a:schemeClr val="accent1"/>
+          </a:effectRef>
+          <a:fontRef idx="minor">
+            <a:schemeClr val="tx1"/>
+          </a:fontRef>
+        </p:style>
+      </p:cxnSp>
+      <p:cxnSp>
+        <p:nvCxnSpPr>
+          <p:cNvPr id="25" name="Straight Arrow Connector 24">
+            <a:extLst>
+              <a:ext uri="{FF2B5EF4-FFF2-40B4-BE49-F238E27FC236}">
+                <a16:creationId xmlns:a16="http://schemas.microsoft.com/office/drawing/2014/main" id="{60D959E0-D9BB-67A9-4ACF-14BF2229DF2F}"/>
+              </a:ext>
+            </a:extLst>
+          </p:cNvPr>
+          <p:cNvCxnSpPr>
+            <a:cxnSpLocks/>
+            <a:stCxn id="5" idx="3"/>
+            <a:endCxn id="6" idx="1"/>
+          </p:cNvCxnSpPr>
+          <p:nvPr/>
+        </p:nvCxnSpPr>
+        <p:spPr>
+          <a:xfrm>
+            <a:off x="3050903" y="4127063"/>
+            <a:ext cx="862456" cy="0"/>
+          </a:xfrm>
+          <a:prstGeom prst="straightConnector1">
+            <a:avLst/>
+          </a:prstGeom>
+          <a:ln>
+            <a:tailEnd type="triangle" w="lg" len="lg"/>
+          </a:ln>
+        </p:spPr>
+        <p:style>
+          <a:lnRef idx="2">
+            <a:schemeClr val="accent1"/>
+          </a:lnRef>
+          <a:fillRef idx="0">
+            <a:schemeClr val="accent1"/>
+          </a:fillRef>
+          <a:effectRef idx="1">
+            <a:schemeClr val="accent1"/>
+          </a:effectRef>
+          <a:fontRef idx="minor">
+            <a:schemeClr val="tx1"/>
+          </a:fontRef>
+        </p:style>
+      </p:cxnSp>
+      <p:cxnSp>
+        <p:nvCxnSpPr>
+          <p:cNvPr id="27" name="Straight Arrow Connector 26">
+            <a:extLst>
+              <a:ext uri="{FF2B5EF4-FFF2-40B4-BE49-F238E27FC236}">
+                <a16:creationId xmlns:a16="http://schemas.microsoft.com/office/drawing/2014/main" id="{91C43C74-F79F-9BD9-4B0D-C86AD3D8FF02}"/>
+              </a:ext>
+            </a:extLst>
+          </p:cNvPr>
+          <p:cNvCxnSpPr>
+            <a:cxnSpLocks/>
+            <a:stCxn id="4" idx="2"/>
+          </p:cNvCxnSpPr>
+          <p:nvPr/>
+        </p:nvCxnSpPr>
+        <p:spPr>
+          <a:xfrm>
+            <a:off x="1883190" y="2480945"/>
+            <a:ext cx="355028" cy="262136"/>
+          </a:xfrm>
+          <a:prstGeom prst="straightConnector1">
+            <a:avLst/>
+          </a:prstGeom>
+          <a:ln>
+            <a:tailEnd type="triangle" w="lg" len="lg"/>
+          </a:ln>
+        </p:spPr>
+        <p:style>
+          <a:lnRef idx="2">
+            <a:schemeClr val="accent1"/>
+          </a:lnRef>
+          <a:fillRef idx="0">
+            <a:schemeClr val="accent1"/>
+          </a:fillRef>
+          <a:effectRef idx="1">
+            <a:schemeClr val="accent1"/>
+          </a:effectRef>
+          <a:fontRef idx="minor">
+            <a:schemeClr val="tx1"/>
+          </a:fontRef>
+        </p:style>
+      </p:cxnSp>
+      <p:cxnSp>
+        <p:nvCxnSpPr>
+          <p:cNvPr id="30" name="Straight Arrow Connector 29">
+            <a:extLst>
+              <a:ext uri="{FF2B5EF4-FFF2-40B4-BE49-F238E27FC236}">
+                <a16:creationId xmlns:a16="http://schemas.microsoft.com/office/drawing/2014/main" id="{33CD7593-046B-3A4C-0B6F-B7EACAC98FEB}"/>
+              </a:ext>
+            </a:extLst>
+          </p:cNvPr>
+          <p:cNvCxnSpPr>
+            <a:cxnSpLocks/>
+            <a:stCxn id="5" idx="0"/>
+          </p:cNvCxnSpPr>
+          <p:nvPr/>
+        </p:nvCxnSpPr>
+        <p:spPr>
+          <a:xfrm flipV="1">
+            <a:off x="1883190" y="3380204"/>
+            <a:ext cx="355028" cy="253107"/>
+          </a:xfrm>
+          <a:prstGeom prst="straightConnector1">
+            <a:avLst/>
+          </a:prstGeom>
+          <a:ln>
+            <a:tailEnd type="triangle" w="lg" len="lg"/>
+          </a:ln>
+        </p:spPr>
+        <p:style>
+          <a:lnRef idx="2">
+            <a:schemeClr val="accent1"/>
+          </a:lnRef>
+          <a:fillRef idx="0">
+            <a:schemeClr val="accent1"/>
+          </a:fillRef>
+          <a:effectRef idx="1">
+            <a:schemeClr val="accent1"/>
+          </a:effectRef>
+          <a:fontRef idx="minor">
+            <a:schemeClr val="tx1"/>
+          </a:fontRef>
+        </p:style>
+      </p:cxnSp>
+      <p:cxnSp>
+        <p:nvCxnSpPr>
+          <p:cNvPr id="34" name="Straight Arrow Connector 33">
+            <a:extLst>
+              <a:ext uri="{FF2B5EF4-FFF2-40B4-BE49-F238E27FC236}">
+                <a16:creationId xmlns:a16="http://schemas.microsoft.com/office/drawing/2014/main" id="{2D9B5C6A-FE9E-E2AF-DB34-3817E4ACE0B9}"/>
+              </a:ext>
+            </a:extLst>
+          </p:cNvPr>
+          <p:cNvCxnSpPr>
+            <a:cxnSpLocks/>
+          </p:cNvCxnSpPr>
+          <p:nvPr/>
+        </p:nvCxnSpPr>
+        <p:spPr>
+          <a:xfrm flipH="1" flipV="1">
+            <a:off x="4751364" y="3380204"/>
+            <a:ext cx="318476" cy="253107"/>
+          </a:xfrm>
+          <a:prstGeom prst="straightConnector1">
+            <a:avLst/>
+          </a:prstGeom>
+          <a:ln>
+            <a:tailEnd type="triangle" w="lg" len="lg"/>
+          </a:ln>
+        </p:spPr>
+        <p:style>
+          <a:lnRef idx="2">
+            <a:schemeClr val="accent1"/>
+          </a:lnRef>
+          <a:fillRef idx="0">
+            <a:schemeClr val="accent1"/>
+          </a:fillRef>
+          <a:effectRef idx="1">
+            <a:schemeClr val="accent1"/>
+          </a:effectRef>
+          <a:fontRef idx="minor">
+            <a:schemeClr val="tx1"/>
+          </a:fontRef>
+        </p:style>
+      </p:cxnSp>
+      <p:cxnSp>
+        <p:nvCxnSpPr>
+          <p:cNvPr id="38" name="Straight Arrow Connector 37">
+            <a:extLst>
+              <a:ext uri="{FF2B5EF4-FFF2-40B4-BE49-F238E27FC236}">
+                <a16:creationId xmlns:a16="http://schemas.microsoft.com/office/drawing/2014/main" id="{82108598-656A-FF35-DE1F-BC0E925D3133}"/>
+              </a:ext>
+            </a:extLst>
+          </p:cNvPr>
+          <p:cNvCxnSpPr>
+            <a:cxnSpLocks/>
+          </p:cNvCxnSpPr>
+          <p:nvPr/>
+        </p:nvCxnSpPr>
+        <p:spPr>
+          <a:xfrm flipH="1">
+            <a:off x="4751363" y="2480945"/>
+            <a:ext cx="318476" cy="253107"/>
+          </a:xfrm>
+          <a:prstGeom prst="straightConnector1">
+            <a:avLst/>
+          </a:prstGeom>
+          <a:ln>
+            <a:tailEnd type="triangle" w="lg" len="lg"/>
+          </a:ln>
+        </p:spPr>
+        <p:style>
+          <a:lnRef idx="2">
+            <a:schemeClr val="accent1"/>
+          </a:lnRef>
+          <a:fillRef idx="0">
+            <a:schemeClr val="accent1"/>
+          </a:fillRef>
+          <a:effectRef idx="1">
+            <a:schemeClr val="accent1"/>
+          </a:effectRef>
+          <a:fontRef idx="minor">
+            <a:schemeClr val="tx1"/>
+          </a:fontRef>
+        </p:style>
+      </p:cxnSp>
+      <p:sp>
+        <p:nvSpPr>
+          <p:cNvPr id="3" name="TextBox 2">
+            <a:extLst>
+              <a:ext uri="{FF2B5EF4-FFF2-40B4-BE49-F238E27FC236}">
+                <a16:creationId xmlns:a16="http://schemas.microsoft.com/office/drawing/2014/main" id="{86E474E2-B899-5D6A-9107-9532F2ABFAA9}"/>
+              </a:ext>
+            </a:extLst>
+          </p:cNvPr>
+          <p:cNvSpPr txBox="1"/>
+          <p:nvPr/>
+        </p:nvSpPr>
+        <p:spPr>
+          <a:xfrm>
+            <a:off x="3869202" y="1029990"/>
+            <a:ext cx="1681999" cy="276999"/>
+          </a:xfrm>
+          <a:prstGeom prst="rect">
+            <a:avLst/>
+          </a:prstGeom>
+          <a:noFill/>
+        </p:spPr>
+        <p:txBody>
+          <a:bodyPr wrap="none" rtlCol="0">
+            <a:spAutoFit/>
+          </a:bodyPr>
+          <a:lstStyle/>
+          <a:p>
+            <a:r>
+              <a:rPr lang="en-US" sz="1200" dirty="0"/>
+              <a:t>class </a:t>
+            </a:r>
+            <a:r>
+              <a:rPr lang="en-US" sz="1200" dirty="0" err="1"/>
+              <a:t>BooleanNetwork</a:t>
+            </a:r>
+            <a:endParaRPr lang="en-US" sz="1200" dirty="0"/>
+          </a:p>
+        </p:txBody>
+      </p:sp>
+      <p:sp>
+        <p:nvSpPr>
+          <p:cNvPr id="9" name="TextBox 8">
+            <a:extLst>
+              <a:ext uri="{FF2B5EF4-FFF2-40B4-BE49-F238E27FC236}">
+                <a16:creationId xmlns:a16="http://schemas.microsoft.com/office/drawing/2014/main" id="{3FFBCD24-2AB5-DC48-3C85-7CAA41A6D546}"/>
+              </a:ext>
+            </a:extLst>
+          </p:cNvPr>
+          <p:cNvSpPr txBox="1"/>
+          <p:nvPr/>
+        </p:nvSpPr>
+        <p:spPr>
+          <a:xfrm>
+            <a:off x="715477" y="1046609"/>
+            <a:ext cx="1708353" cy="276999"/>
+          </a:xfrm>
+          <a:prstGeom prst="rect">
+            <a:avLst/>
+          </a:prstGeom>
+          <a:noFill/>
+        </p:spPr>
+        <p:txBody>
+          <a:bodyPr wrap="none" rtlCol="0">
+            <a:spAutoFit/>
+          </a:bodyPr>
+          <a:lstStyle/>
+          <a:p>
+            <a:r>
+              <a:rPr lang="en-US" sz="1200" dirty="0"/>
+              <a:t>class </a:t>
+            </a:r>
+            <a:r>
+              <a:rPr lang="en-US" sz="1200" dirty="0" err="1"/>
+              <a:t>BooleanFunction</a:t>
+            </a:r>
+            <a:endParaRPr lang="en-US" sz="1200" dirty="0"/>
+          </a:p>
+        </p:txBody>
+      </p:sp>
+      <p:sp>
+        <p:nvSpPr>
+          <p:cNvPr id="14" name="TextBox 13">
+            <a:extLst>
+              <a:ext uri="{FF2B5EF4-FFF2-40B4-BE49-F238E27FC236}">
+                <a16:creationId xmlns:a16="http://schemas.microsoft.com/office/drawing/2014/main" id="{BCA94C1F-2208-F6C3-1A03-DC0692915494}"/>
+              </a:ext>
+            </a:extLst>
+          </p:cNvPr>
+          <p:cNvSpPr txBox="1"/>
+          <p:nvPr/>
+        </p:nvSpPr>
+        <p:spPr>
+          <a:xfrm>
+            <a:off x="5172785" y="2767687"/>
+            <a:ext cx="1431214" cy="578882"/>
+          </a:xfrm>
+          <a:prstGeom prst="roundRect">
+            <a:avLst/>
+          </a:prstGeom>
+        </p:spPr>
+        <p:style>
+          <a:lnRef idx="2">
+            <a:schemeClr val="accent1"/>
+          </a:lnRef>
+          <a:fillRef idx="1">
+            <a:schemeClr val="lt1"/>
+          </a:fillRef>
+          <a:effectRef idx="0">
+            <a:schemeClr val="accent1"/>
+          </a:effectRef>
+          <a:fontRef idx="minor">
+            <a:schemeClr val="dk1"/>
+          </a:fontRef>
+        </p:style>
+        <p:txBody>
+          <a:bodyPr wrap="square" rtlCol="0">
+            <a:spAutoFit/>
+          </a:bodyPr>
+          <a:lstStyle/>
+          <a:p>
+            <a:r>
+              <a:rPr lang="en-US" sz="1200" dirty="0"/>
+              <a:t>6. Interoperability</a:t>
+            </a:r>
+          </a:p>
+          <a:p>
+            <a:r>
+              <a:rPr lang="en-US" sz="800" dirty="0"/>
+              <a:t>Export/Import </a:t>
+            </a:r>
+            <a:r>
+              <a:rPr lang="en-US" sz="800" dirty="0">
+                <a:sym typeface="Wingdings" pitchFamily="2" charset="2"/>
+              </a:rPr>
+              <a:t></a:t>
+            </a:r>
+            <a:br>
+              <a:rPr lang="en-US" sz="800" dirty="0">
+                <a:sym typeface="Wingdings" pitchFamily="2" charset="2"/>
+              </a:rPr>
+            </a:br>
+            <a:r>
+              <a:rPr lang="en-US" sz="800" dirty="0">
+                <a:sym typeface="Wingdings" pitchFamily="2" charset="2"/>
+              </a:rPr>
+              <a:t>CANA, </a:t>
+            </a:r>
+            <a:r>
+              <a:rPr lang="en-US" sz="800" dirty="0" err="1">
+                <a:sym typeface="Wingdings" pitchFamily="2" charset="2"/>
+              </a:rPr>
+              <a:t>PyBoolNet</a:t>
+            </a:r>
+            <a:r>
+              <a:rPr lang="en-US" sz="800" dirty="0">
+                <a:sym typeface="Wingdings" pitchFamily="2" charset="2"/>
+              </a:rPr>
+              <a:t>, …</a:t>
+            </a:r>
+            <a:endParaRPr lang="en-US" sz="800" dirty="0"/>
+          </a:p>
+        </p:txBody>
+      </p:sp>
+      <p:cxnSp>
+        <p:nvCxnSpPr>
+          <p:cNvPr id="15" name="Straight Arrow Connector 14">
+            <a:extLst>
+              <a:ext uri="{FF2B5EF4-FFF2-40B4-BE49-F238E27FC236}">
+                <a16:creationId xmlns:a16="http://schemas.microsoft.com/office/drawing/2014/main" id="{07FA7003-1E13-5AD6-BA51-7E9E3239DF79}"/>
+              </a:ext>
+            </a:extLst>
+          </p:cNvPr>
+          <p:cNvCxnSpPr>
+            <a:cxnSpLocks/>
+            <a:endCxn id="14" idx="0"/>
+          </p:cNvCxnSpPr>
+          <p:nvPr/>
+        </p:nvCxnSpPr>
+        <p:spPr>
+          <a:xfrm>
+            <a:off x="5888392" y="2480945"/>
+            <a:ext cx="0" cy="286742"/>
+          </a:xfrm>
+          <a:prstGeom prst="straightConnector1">
+            <a:avLst/>
+          </a:prstGeom>
+          <a:ln>
+            <a:tailEnd type="triangle" w="lg" len="lg"/>
+          </a:ln>
+        </p:spPr>
+        <p:style>
+          <a:lnRef idx="2">
+            <a:schemeClr val="accent1"/>
+          </a:lnRef>
+          <a:fillRef idx="0">
+            <a:schemeClr val="accent1"/>
+          </a:fillRef>
+          <a:effectRef idx="1">
+            <a:schemeClr val="accent1"/>
+          </a:effectRef>
+          <a:fontRef idx="minor">
+            <a:schemeClr val="tx1"/>
+          </a:fontRef>
+        </p:style>
+      </p:cxnSp>
+      <p:cxnSp>
+        <p:nvCxnSpPr>
+          <p:cNvPr id="18" name="Straight Arrow Connector 17">
+            <a:extLst>
+              <a:ext uri="{FF2B5EF4-FFF2-40B4-BE49-F238E27FC236}">
+                <a16:creationId xmlns:a16="http://schemas.microsoft.com/office/drawing/2014/main" id="{A82489BA-5D53-F025-080D-AC348AA85041}"/>
+              </a:ext>
+            </a:extLst>
+          </p:cNvPr>
+          <p:cNvCxnSpPr>
+            <a:cxnSpLocks/>
+          </p:cNvCxnSpPr>
+          <p:nvPr/>
+        </p:nvCxnSpPr>
+        <p:spPr>
+          <a:xfrm>
+            <a:off x="5888392" y="3346569"/>
+            <a:ext cx="0" cy="286742"/>
+          </a:xfrm>
+          <a:prstGeom prst="straightConnector1">
+            <a:avLst/>
+          </a:prstGeom>
+          <a:ln>
+            <a:tailEnd type="triangle" w="lg" len="lg"/>
+          </a:ln>
+        </p:spPr>
+        <p:style>
+          <a:lnRef idx="2">
+            <a:schemeClr val="accent1"/>
+          </a:lnRef>
+          <a:fillRef idx="0">
+            <a:schemeClr val="accent1"/>
+          </a:fillRef>
+          <a:effectRef idx="1">
+            <a:schemeClr val="accent1"/>
+          </a:effectRef>
+          <a:fontRef idx="minor">
+            <a:schemeClr val="tx1"/>
+          </a:fontRef>
+        </p:style>
+      </p:cxnSp>
+    </p:spTree>
+    <p:extLst>
+      <p:ext uri="{BB962C8B-B14F-4D97-AF65-F5344CB8AC3E}">
+        <p14:creationId xmlns:p14="http://schemas.microsoft.com/office/powerpoint/2010/main" val="593904460"/>
+      </p:ext>
+    </p:extLst>
+  </p:cSld>
+  <p:clrMapOvr>
+    <a:masterClrMapping/>
+  </p:clrMapOvr>
+</p:sld>
+</file>
+
+<file path=ppt/slides/slide7.xml><?xml version="1.0" encoding="utf-8"?>
+<p:sld xmlns:a="http://schemas.openxmlformats.org/drawingml/2006/main" xmlns:r="http://schemas.openxmlformats.org/officeDocument/2006/relationships" xmlns:p="http://schemas.openxmlformats.org/presentationml/2006/main">
+  <p:cSld>
+    <p:spTree>
+      <p:nvGrpSpPr>
+        <p:cNvPr id="1" name="">
+          <a:extLst>
+            <a:ext uri="{FF2B5EF4-FFF2-40B4-BE49-F238E27FC236}">
+              <a16:creationId xmlns:a16="http://schemas.microsoft.com/office/drawing/2014/main" id="{5A0BCC99-BFF3-2515-0634-2BBADF2F8677}"/>
+            </a:ext>
+          </a:extLst>
+        </p:cNvPr>
+        <p:cNvGrpSpPr/>
+        <p:nvPr/>
+      </p:nvGrpSpPr>
+      <p:grpSpPr>
+        <a:xfrm>
+          <a:off x="0" y="0"/>
+          <a:ext cx="0" cy="0"/>
+          <a:chOff x="0" y="0"/>
+          <a:chExt cx="0" cy="0"/>
+        </a:xfrm>
+      </p:grpSpPr>
+      <p:sp>
+        <p:nvSpPr>
+          <p:cNvPr id="64" name="Rounded Rectangle 63">
+            <a:extLst>
+              <a:ext uri="{FF2B5EF4-FFF2-40B4-BE49-F238E27FC236}">
+                <a16:creationId xmlns:a16="http://schemas.microsoft.com/office/drawing/2014/main" id="{C7F4E4D2-E099-F81C-A05E-4DDB135E817C}"/>
+              </a:ext>
+            </a:extLst>
+          </p:cNvPr>
+          <p:cNvSpPr/>
+          <p:nvPr/>
+        </p:nvSpPr>
+        <p:spPr>
+          <a:xfrm>
+            <a:off x="3716309" y="1061643"/>
+            <a:ext cx="2755941" cy="3705304"/>
+          </a:xfrm>
+          <a:prstGeom prst="roundRect">
+            <a:avLst>
+              <a:gd name="adj" fmla="val 20354"/>
+            </a:avLst>
+          </a:prstGeom>
+          <a:solidFill>
+            <a:schemeClr val="tx2">
+              <a:lumMod val="10000"/>
+              <a:lumOff val="90000"/>
+              <a:alpha val="34000"/>
+            </a:schemeClr>
+          </a:solidFill>
+          <a:ln>
+            <a:noFill/>
+          </a:ln>
+        </p:spPr>
+        <p:style>
+          <a:lnRef idx="2">
+            <a:schemeClr val="accent1">
+              <a:shade val="15000"/>
+            </a:schemeClr>
+          </a:lnRef>
+          <a:fillRef idx="1">
+            <a:schemeClr val="accent1"/>
+          </a:fillRef>
+          <a:effectRef idx="0">
+            <a:schemeClr val="accent1"/>
+          </a:effectRef>
+          <a:fontRef idx="minor">
+            <a:schemeClr val="lt1"/>
+          </a:fontRef>
+        </p:style>
+        <p:txBody>
+          <a:bodyPr rtlCol="0" anchor="ctr"/>
+          <a:lstStyle/>
+          <a:p>
+            <a:pPr algn="ctr"/>
+            <a:endParaRPr lang="en-US"/>
+          </a:p>
+        </p:txBody>
+      </p:sp>
+      <p:sp>
+        <p:nvSpPr>
+          <p:cNvPr id="10" name="Rounded Rectangle 9">
+            <a:extLst>
+              <a:ext uri="{FF2B5EF4-FFF2-40B4-BE49-F238E27FC236}">
+                <a16:creationId xmlns:a16="http://schemas.microsoft.com/office/drawing/2014/main" id="{69191552-C878-C93F-605F-DF57B0B30E03}"/>
+              </a:ext>
+            </a:extLst>
+          </p:cNvPr>
+          <p:cNvSpPr/>
+          <p:nvPr/>
+        </p:nvSpPr>
+        <p:spPr>
+          <a:xfrm>
+            <a:off x="525739" y="1090217"/>
+            <a:ext cx="2755941" cy="3705304"/>
+          </a:xfrm>
+          <a:prstGeom prst="roundRect">
+            <a:avLst>
+              <a:gd name="adj" fmla="val 20354"/>
+            </a:avLst>
+          </a:prstGeom>
+          <a:solidFill>
+            <a:schemeClr val="tx2">
+              <a:lumMod val="10000"/>
+              <a:lumOff val="90000"/>
+              <a:alpha val="34000"/>
+            </a:schemeClr>
+          </a:solidFill>
+          <a:ln>
+            <a:noFill/>
+          </a:ln>
+        </p:spPr>
+        <p:style>
+          <a:lnRef idx="2">
+            <a:schemeClr val="accent1">
+              <a:shade val="15000"/>
+            </a:schemeClr>
+          </a:lnRef>
+          <a:fillRef idx="1">
+            <a:schemeClr val="accent1"/>
+          </a:fillRef>
+          <a:effectRef idx="0">
+            <a:schemeClr val="accent1"/>
+          </a:effectRef>
+          <a:fontRef idx="minor">
+            <a:schemeClr val="lt1"/>
+          </a:fontRef>
+        </p:style>
+        <p:txBody>
+          <a:bodyPr rtlCol="0" anchor="ctr"/>
+          <a:lstStyle/>
+          <a:p>
+            <a:pPr algn="ctr"/>
+            <a:endParaRPr lang="en-US"/>
+          </a:p>
+        </p:txBody>
+      </p:sp>
+      <p:sp>
+        <p:nvSpPr>
+          <p:cNvPr id="4" name="TextBox 3">
+            <a:extLst>
+              <a:ext uri="{FF2B5EF4-FFF2-40B4-BE49-F238E27FC236}">
+                <a16:creationId xmlns:a16="http://schemas.microsoft.com/office/drawing/2014/main" id="{1DAA9EE6-11C5-A0A4-93B4-2D2087196CC4}"/>
+              </a:ext>
+            </a:extLst>
+          </p:cNvPr>
+          <p:cNvSpPr txBox="1"/>
+          <p:nvPr/>
+        </p:nvSpPr>
+        <p:spPr>
+          <a:xfrm>
+            <a:off x="640505" y="1428274"/>
+            <a:ext cx="2538465" cy="817245"/>
+          </a:xfrm>
+          <a:prstGeom prst="roundRect">
+            <a:avLst/>
+          </a:prstGeom>
+        </p:spPr>
+        <p:style>
+          <a:lnRef idx="2">
+            <a:schemeClr val="accent1"/>
+          </a:lnRef>
+          <a:fillRef idx="1">
+            <a:schemeClr val="lt1"/>
+          </a:fillRef>
+          <a:effectRef idx="0">
+            <a:schemeClr val="accent1"/>
+          </a:effectRef>
+          <a:fontRef idx="minor">
+            <a:schemeClr val="dk1"/>
+          </a:fontRef>
+        </p:style>
+        <p:txBody>
+          <a:bodyPr wrap="square" rtlCol="0">
+            <a:spAutoFit/>
+          </a:bodyPr>
+          <a:lstStyle/>
+          <a:p>
+            <a:r>
+              <a:rPr lang="en-US" sz="1000" dirty="0"/>
+              <a:t>1. Random Boolean Function Generators</a:t>
+            </a:r>
+          </a:p>
+          <a:p>
+            <a:r>
+              <a:rPr lang="en-US" sz="800" dirty="0" err="1"/>
+              <a:t>random_non_degenerated_function</a:t>
+            </a:r>
+            <a:r>
+              <a:rPr lang="en-US" sz="800" dirty="0"/>
+              <a:t>(n, bias)</a:t>
+            </a:r>
+          </a:p>
+          <a:p>
+            <a:r>
+              <a:rPr lang="en-US" sz="800" dirty="0" err="1"/>
+              <a:t>random_k_canalizing_function</a:t>
+            </a:r>
+            <a:r>
+              <a:rPr lang="en-US" sz="800" dirty="0"/>
+              <a:t>(n, k)</a:t>
+            </a:r>
+          </a:p>
+          <a:p>
+            <a:r>
+              <a:rPr lang="en-US" sz="800" dirty="0" err="1"/>
+              <a:t>random_NCF</a:t>
+            </a:r>
+            <a:r>
+              <a:rPr lang="en-US" sz="800" dirty="0"/>
+              <a:t>(n, </a:t>
+            </a:r>
+            <a:r>
+              <a:rPr lang="en-US" sz="800" dirty="0" err="1"/>
+              <a:t>layer_structure</a:t>
+            </a:r>
+            <a:r>
+              <a:rPr lang="en-US" sz="800" dirty="0"/>
+              <a:t>)</a:t>
+            </a:r>
+          </a:p>
+          <a:p>
+            <a:r>
+              <a:rPr lang="en-US" sz="800" dirty="0"/>
+              <a:t>…</a:t>
+            </a:r>
+          </a:p>
+        </p:txBody>
+      </p:sp>
+      <p:sp>
+        <p:nvSpPr>
+          <p:cNvPr id="5" name="TextBox 4">
+            <a:extLst>
+              <a:ext uri="{FF2B5EF4-FFF2-40B4-BE49-F238E27FC236}">
+                <a16:creationId xmlns:a16="http://schemas.microsoft.com/office/drawing/2014/main" id="{AA2A4C3D-B737-AE2F-71F6-77FDC7733A53}"/>
+              </a:ext>
+            </a:extLst>
+          </p:cNvPr>
+          <p:cNvSpPr txBox="1"/>
+          <p:nvPr/>
+        </p:nvSpPr>
+        <p:spPr>
+          <a:xfrm>
+            <a:off x="640505" y="3558222"/>
+            <a:ext cx="2538464" cy="987504"/>
+          </a:xfrm>
+          <a:prstGeom prst="roundRect">
+            <a:avLst/>
+          </a:prstGeom>
+        </p:spPr>
+        <p:style>
+          <a:lnRef idx="2">
+            <a:schemeClr val="accent1"/>
+          </a:lnRef>
+          <a:fillRef idx="1">
+            <a:schemeClr val="lt1"/>
+          </a:fillRef>
+          <a:effectRef idx="0">
+            <a:schemeClr val="accent1"/>
+          </a:effectRef>
+          <a:fontRef idx="minor">
+            <a:schemeClr val="dk1"/>
+          </a:fontRef>
+        </p:style>
+        <p:txBody>
+          <a:bodyPr wrap="square" rtlCol="0">
+            <a:spAutoFit/>
+          </a:bodyPr>
+          <a:lstStyle/>
+          <a:p>
+            <a:r>
+              <a:rPr lang="en-US" sz="1000" dirty="0"/>
+              <a:t>3. Boolean Function Analysis</a:t>
+            </a:r>
+          </a:p>
+          <a:p>
+            <a:r>
+              <a:rPr lang="en-US" sz="800" dirty="0" err="1"/>
+              <a:t>is_monotonic</a:t>
+            </a:r>
+            <a:r>
+              <a:rPr lang="en-US" sz="800" dirty="0"/>
+              <a:t>()	</a:t>
+            </a:r>
+            <a:r>
+              <a:rPr lang="en-US" sz="800" dirty="0" err="1"/>
+              <a:t>get_symmetry_groups</a:t>
+            </a:r>
+            <a:r>
+              <a:rPr lang="en-US" sz="800" dirty="0"/>
+              <a:t>()</a:t>
+            </a:r>
+          </a:p>
+          <a:p>
+            <a:r>
+              <a:rPr lang="en-US" sz="800" dirty="0" err="1"/>
+              <a:t>is_degenerated</a:t>
+            </a:r>
+            <a:r>
+              <a:rPr lang="en-US" sz="800" dirty="0"/>
+              <a:t>()	</a:t>
+            </a:r>
+            <a:r>
+              <a:rPr lang="en-US" sz="800" dirty="0" err="1"/>
+              <a:t>get_sensitivity</a:t>
+            </a:r>
+            <a:r>
+              <a:rPr lang="en-US" sz="800" dirty="0"/>
+              <a:t>()</a:t>
+            </a:r>
+          </a:p>
+          <a:p>
+            <a:r>
+              <a:rPr lang="en-US" sz="800" dirty="0" err="1"/>
+              <a:t>Is_k_canalizing</a:t>
+            </a:r>
+            <a:r>
+              <a:rPr lang="en-US" sz="800" dirty="0"/>
+              <a:t>()	</a:t>
+            </a:r>
+            <a:r>
+              <a:rPr lang="en-US" sz="800" dirty="0" err="1"/>
+              <a:t>get_layer_structure</a:t>
+            </a:r>
+            <a:r>
+              <a:rPr lang="en-US" sz="800" dirty="0"/>
+              <a:t>()</a:t>
+            </a:r>
+          </a:p>
+          <a:p>
+            <a:r>
+              <a:rPr lang="en-US" sz="800" dirty="0" err="1"/>
+              <a:t>Is_kset_canalizing</a:t>
+            </a:r>
+            <a:r>
+              <a:rPr lang="en-US" sz="800" dirty="0"/>
+              <a:t>()	</a:t>
+            </a:r>
+            <a:r>
+              <a:rPr lang="en-US" sz="800" dirty="0" err="1"/>
+              <a:t>get_canalizing_strength</a:t>
+            </a:r>
+            <a:r>
+              <a:rPr lang="en-US" sz="800" dirty="0"/>
+              <a:t>()</a:t>
+            </a:r>
+          </a:p>
+          <a:p>
+            <a:r>
+              <a:rPr lang="en-US" sz="800" dirty="0"/>
+              <a:t>…</a:t>
+            </a:r>
+          </a:p>
+        </p:txBody>
+      </p:sp>
+      <p:sp>
+        <p:nvSpPr>
+          <p:cNvPr id="6" name="TextBox 5">
+            <a:extLst>
+              <a:ext uri="{FF2B5EF4-FFF2-40B4-BE49-F238E27FC236}">
+                <a16:creationId xmlns:a16="http://schemas.microsoft.com/office/drawing/2014/main" id="{3F12174E-88D6-19D5-3E11-09A4E62118FD}"/>
+              </a:ext>
+            </a:extLst>
+          </p:cNvPr>
+          <p:cNvSpPr txBox="1"/>
+          <p:nvPr/>
+        </p:nvSpPr>
+        <p:spPr>
+          <a:xfrm>
+            <a:off x="3825048" y="3574573"/>
+            <a:ext cx="2538463" cy="953453"/>
+          </a:xfrm>
+          <a:prstGeom prst="roundRect">
+            <a:avLst/>
+          </a:prstGeom>
+        </p:spPr>
+        <p:style>
+          <a:lnRef idx="2">
+            <a:schemeClr val="accent1"/>
+          </a:lnRef>
+          <a:fillRef idx="1">
+            <a:schemeClr val="lt1"/>
+          </a:fillRef>
+          <a:effectRef idx="0">
+            <a:schemeClr val="accent1"/>
+          </a:effectRef>
+          <a:fontRef idx="minor">
+            <a:schemeClr val="dk1"/>
+          </a:fontRef>
+        </p:style>
+        <p:txBody>
+          <a:bodyPr wrap="square" rtlCol="0">
+            <a:spAutoFit/>
+          </a:bodyPr>
+          <a:lstStyle/>
+          <a:p>
+            <a:r>
+              <a:rPr lang="en-US" sz="1000" dirty="0"/>
+              <a:t>4. Boolean Network Analysis</a:t>
+            </a:r>
+          </a:p>
+          <a:p>
+            <a:r>
+              <a:rPr lang="en-US" sz="800" dirty="0" err="1"/>
+              <a:t>get_steady_states_asynchronous</a:t>
+            </a:r>
+            <a:r>
+              <a:rPr lang="en-US" sz="800" dirty="0"/>
+              <a:t>()</a:t>
+            </a:r>
+          </a:p>
+          <a:p>
+            <a:r>
+              <a:rPr lang="en-US" sz="800" dirty="0" err="1"/>
+              <a:t>get_attractors_and_robustness_synchronous</a:t>
+            </a:r>
+            <a:r>
+              <a:rPr lang="en-US" sz="800" dirty="0"/>
+              <a:t>()</a:t>
+            </a:r>
+          </a:p>
+          <a:p>
+            <a:r>
+              <a:rPr lang="en-US" sz="800" dirty="0" err="1"/>
+              <a:t>get_modular_structure</a:t>
+            </a:r>
+            <a:r>
+              <a:rPr lang="en-US" sz="800" dirty="0"/>
+              <a:t>()</a:t>
+            </a:r>
+          </a:p>
+          <a:p>
+            <a:r>
+              <a:rPr lang="en-US" sz="800" dirty="0" err="1"/>
+              <a:t>get_edge_controlled_network</a:t>
+            </a:r>
+            <a:r>
+              <a:rPr lang="en-US" sz="800" dirty="0"/>
+              <a:t>()</a:t>
+            </a:r>
+          </a:p>
+          <a:p>
+            <a:r>
+              <a:rPr lang="en-US" sz="800" dirty="0"/>
+              <a:t>…</a:t>
+            </a:r>
+          </a:p>
+        </p:txBody>
+      </p:sp>
+      <p:sp>
+        <p:nvSpPr>
+          <p:cNvPr id="7" name="TextBox 6">
+            <a:extLst>
+              <a:ext uri="{FF2B5EF4-FFF2-40B4-BE49-F238E27FC236}">
+                <a16:creationId xmlns:a16="http://schemas.microsoft.com/office/drawing/2014/main" id="{8E32BCFE-5A74-DD22-B5A0-DF806E4478F3}"/>
+              </a:ext>
+            </a:extLst>
+          </p:cNvPr>
+          <p:cNvSpPr txBox="1"/>
+          <p:nvPr/>
+        </p:nvSpPr>
+        <p:spPr>
+          <a:xfrm>
+            <a:off x="3825048" y="1428274"/>
+            <a:ext cx="2538465" cy="817245"/>
+          </a:xfrm>
+          <a:prstGeom prst="roundRect">
+            <a:avLst/>
+          </a:prstGeom>
+        </p:spPr>
+        <p:style>
+          <a:lnRef idx="2">
+            <a:schemeClr val="accent1"/>
+          </a:lnRef>
+          <a:fillRef idx="1">
+            <a:schemeClr val="lt1"/>
+          </a:fillRef>
+          <a:effectRef idx="0">
+            <a:schemeClr val="accent1"/>
+          </a:effectRef>
+          <a:fontRef idx="minor">
+            <a:schemeClr val="dk1"/>
+          </a:fontRef>
+        </p:style>
+        <p:txBody>
+          <a:bodyPr wrap="square" rtlCol="0">
+            <a:spAutoFit/>
+          </a:bodyPr>
+          <a:lstStyle/>
+          <a:p>
+            <a:r>
+              <a:rPr lang="en-US" sz="1000" dirty="0"/>
+              <a:t>2. Random Boolean Network Generators</a:t>
+            </a:r>
+          </a:p>
+          <a:p>
+            <a:r>
+              <a:rPr lang="en-US" sz="800" dirty="0"/>
+              <a:t>Generate random Boolean networks of defined size, degree distribution, canalizing depth or layer structure, bias, …</a:t>
+            </a:r>
+          </a:p>
+          <a:p>
+            <a:endParaRPr lang="en-US" sz="800" dirty="0"/>
+          </a:p>
+        </p:txBody>
+      </p:sp>
+      <p:sp>
+        <p:nvSpPr>
+          <p:cNvPr id="8" name="TextBox 7">
+            <a:extLst>
+              <a:ext uri="{FF2B5EF4-FFF2-40B4-BE49-F238E27FC236}">
+                <a16:creationId xmlns:a16="http://schemas.microsoft.com/office/drawing/2014/main" id="{82D1E615-0133-8E7A-494F-891A03D4F713}"/>
+              </a:ext>
+            </a:extLst>
+          </p:cNvPr>
+          <p:cNvSpPr txBox="1"/>
+          <p:nvPr/>
+        </p:nvSpPr>
+        <p:spPr>
+          <a:xfrm>
+            <a:off x="2196399" y="2575672"/>
+            <a:ext cx="2538465" cy="681038"/>
+          </a:xfrm>
+          <a:prstGeom prst="roundRect">
+            <a:avLst/>
+          </a:prstGeom>
+        </p:spPr>
+        <p:style>
+          <a:lnRef idx="2">
+            <a:schemeClr val="accent1"/>
+          </a:lnRef>
+          <a:fillRef idx="1">
+            <a:schemeClr val="lt1"/>
+          </a:fillRef>
+          <a:effectRef idx="0">
+            <a:schemeClr val="accent1"/>
+          </a:effectRef>
+          <a:fontRef idx="minor">
+            <a:schemeClr val="dk1"/>
+          </a:fontRef>
+        </p:style>
+        <p:txBody>
+          <a:bodyPr wrap="square" rtlCol="0">
+            <a:spAutoFit/>
+          </a:bodyPr>
+          <a:lstStyle/>
+          <a:p>
+            <a:r>
+              <a:rPr lang="en-US" sz="1000" dirty="0"/>
+              <a:t>5. Ensemble experiments</a:t>
+            </a:r>
+          </a:p>
+          <a:p>
+            <a:r>
+              <a:rPr lang="en-US" sz="800" dirty="0"/>
+              <a:t>Build reproducible pipelines for systematic studies:</a:t>
+            </a:r>
+          </a:p>
+          <a:p>
+            <a:r>
+              <a:rPr lang="en-US" sz="800" dirty="0"/>
+              <a:t>vary parameters and study function and network properties across ensembles</a:t>
+            </a:r>
+          </a:p>
+        </p:txBody>
+      </p:sp>
+      <p:cxnSp>
+        <p:nvCxnSpPr>
+          <p:cNvPr id="11" name="Straight Arrow Connector 10">
+            <a:extLst>
+              <a:ext uri="{FF2B5EF4-FFF2-40B4-BE49-F238E27FC236}">
+                <a16:creationId xmlns:a16="http://schemas.microsoft.com/office/drawing/2014/main" id="{06148DE3-88FE-2E45-57BC-6D81D3479281}"/>
+              </a:ext>
+            </a:extLst>
+          </p:cNvPr>
+          <p:cNvCxnSpPr>
+            <a:cxnSpLocks/>
+            <a:stCxn id="4" idx="2"/>
+            <a:endCxn id="5" idx="0"/>
+          </p:cNvCxnSpPr>
+          <p:nvPr/>
+        </p:nvCxnSpPr>
+        <p:spPr>
+          <a:xfrm flipH="1">
+            <a:off x="1909737" y="2245519"/>
+            <a:ext cx="1" cy="1312703"/>
+          </a:xfrm>
+          <a:prstGeom prst="straightConnector1">
+            <a:avLst/>
+          </a:prstGeom>
+          <a:ln>
+            <a:tailEnd type="triangle" w="lg" len="lg"/>
+          </a:ln>
+        </p:spPr>
+        <p:style>
+          <a:lnRef idx="2">
+            <a:schemeClr val="accent1"/>
+          </a:lnRef>
+          <a:fillRef idx="0">
+            <a:schemeClr val="accent1"/>
+          </a:fillRef>
+          <a:effectRef idx="1">
+            <a:schemeClr val="accent1"/>
+          </a:effectRef>
+          <a:fontRef idx="minor">
+            <a:schemeClr val="tx1"/>
+          </a:fontRef>
+        </p:style>
+      </p:cxnSp>
+      <p:cxnSp>
+        <p:nvCxnSpPr>
+          <p:cNvPr id="12" name="Straight Arrow Connector 11">
+            <a:extLst>
+              <a:ext uri="{FF2B5EF4-FFF2-40B4-BE49-F238E27FC236}">
+                <a16:creationId xmlns:a16="http://schemas.microsoft.com/office/drawing/2014/main" id="{08EC6788-9327-107F-F0BF-636E61972058}"/>
+              </a:ext>
+            </a:extLst>
+          </p:cNvPr>
+          <p:cNvCxnSpPr>
+            <a:cxnSpLocks/>
+          </p:cNvCxnSpPr>
+          <p:nvPr/>
+        </p:nvCxnSpPr>
+        <p:spPr>
+          <a:xfrm>
+            <a:off x="5018225" y="2246476"/>
+            <a:ext cx="0" cy="1310787"/>
+          </a:xfrm>
+          <a:prstGeom prst="straightConnector1">
+            <a:avLst/>
+          </a:prstGeom>
+          <a:ln>
+            <a:tailEnd type="triangle" w="lg" len="lg"/>
+          </a:ln>
+        </p:spPr>
+        <p:style>
+          <a:lnRef idx="2">
+            <a:schemeClr val="accent1"/>
+          </a:lnRef>
+          <a:fillRef idx="0">
+            <a:schemeClr val="accent1"/>
+          </a:fillRef>
+          <a:effectRef idx="1">
+            <a:schemeClr val="accent1"/>
+          </a:effectRef>
+          <a:fontRef idx="minor">
+            <a:schemeClr val="tx1"/>
+          </a:fontRef>
+        </p:style>
+      </p:cxnSp>
+      <p:cxnSp>
+        <p:nvCxnSpPr>
+          <p:cNvPr id="22" name="Straight Arrow Connector 21">
+            <a:extLst>
+              <a:ext uri="{FF2B5EF4-FFF2-40B4-BE49-F238E27FC236}">
+                <a16:creationId xmlns:a16="http://schemas.microsoft.com/office/drawing/2014/main" id="{4943056B-8E7C-22AC-384B-F6BFEC18C1FA}"/>
+              </a:ext>
+            </a:extLst>
+          </p:cNvPr>
+          <p:cNvCxnSpPr>
+            <a:cxnSpLocks/>
+            <a:stCxn id="4" idx="3"/>
+            <a:endCxn id="7" idx="1"/>
+          </p:cNvCxnSpPr>
+          <p:nvPr/>
+        </p:nvCxnSpPr>
+        <p:spPr>
+          <a:xfrm>
+            <a:off x="3178970" y="1836897"/>
+            <a:ext cx="646078" cy="0"/>
+          </a:xfrm>
+          <a:prstGeom prst="straightConnector1">
+            <a:avLst/>
+          </a:prstGeom>
+          <a:ln>
+            <a:tailEnd type="triangle" w="lg" len="lg"/>
+          </a:ln>
+        </p:spPr>
+        <p:style>
+          <a:lnRef idx="2">
+            <a:schemeClr val="accent1"/>
+          </a:lnRef>
+          <a:fillRef idx="0">
+            <a:schemeClr val="accent1"/>
+          </a:fillRef>
+          <a:effectRef idx="1">
+            <a:schemeClr val="accent1"/>
+          </a:effectRef>
+          <a:fontRef idx="minor">
+            <a:schemeClr val="tx1"/>
+          </a:fontRef>
+        </p:style>
+      </p:cxnSp>
+      <p:cxnSp>
+        <p:nvCxnSpPr>
+          <p:cNvPr id="25" name="Straight Arrow Connector 24">
+            <a:extLst>
+              <a:ext uri="{FF2B5EF4-FFF2-40B4-BE49-F238E27FC236}">
+                <a16:creationId xmlns:a16="http://schemas.microsoft.com/office/drawing/2014/main" id="{3800CD7F-F1D7-D141-A669-1C1E7121E604}"/>
+              </a:ext>
+            </a:extLst>
+          </p:cNvPr>
+          <p:cNvCxnSpPr>
+            <a:cxnSpLocks/>
+            <a:stCxn id="5" idx="3"/>
+            <a:endCxn id="6" idx="1"/>
+          </p:cNvCxnSpPr>
+          <p:nvPr/>
+        </p:nvCxnSpPr>
+        <p:spPr>
+          <a:xfrm flipV="1">
+            <a:off x="3178969" y="4051300"/>
+            <a:ext cx="646079" cy="674"/>
+          </a:xfrm>
+          <a:prstGeom prst="straightConnector1">
+            <a:avLst/>
+          </a:prstGeom>
+          <a:ln>
+            <a:tailEnd type="triangle" w="lg" len="lg"/>
+          </a:ln>
+        </p:spPr>
+        <p:style>
+          <a:lnRef idx="2">
+            <a:schemeClr val="accent1"/>
+          </a:lnRef>
+          <a:fillRef idx="0">
+            <a:schemeClr val="accent1"/>
+          </a:fillRef>
+          <a:effectRef idx="1">
+            <a:schemeClr val="accent1"/>
+          </a:effectRef>
+          <a:fontRef idx="minor">
+            <a:schemeClr val="tx1"/>
+          </a:fontRef>
+        </p:style>
+      </p:cxnSp>
+      <p:cxnSp>
+        <p:nvCxnSpPr>
+          <p:cNvPr id="27" name="Straight Arrow Connector 26">
+            <a:extLst>
+              <a:ext uri="{FF2B5EF4-FFF2-40B4-BE49-F238E27FC236}">
+                <a16:creationId xmlns:a16="http://schemas.microsoft.com/office/drawing/2014/main" id="{301BE3EE-4B2B-B9E9-807C-1432898E854C}"/>
+              </a:ext>
+            </a:extLst>
+          </p:cNvPr>
+          <p:cNvCxnSpPr>
+            <a:cxnSpLocks/>
+            <a:stCxn id="4" idx="2"/>
+          </p:cNvCxnSpPr>
+          <p:nvPr/>
+        </p:nvCxnSpPr>
+        <p:spPr>
+          <a:xfrm>
+            <a:off x="1909738" y="2245519"/>
+            <a:ext cx="308329" cy="333553"/>
+          </a:xfrm>
+          <a:prstGeom prst="straightConnector1">
+            <a:avLst/>
+          </a:prstGeom>
+          <a:ln>
+            <a:tailEnd type="triangle" w="lg" len="lg"/>
+          </a:ln>
+        </p:spPr>
+        <p:style>
+          <a:lnRef idx="2">
+            <a:schemeClr val="accent1"/>
+          </a:lnRef>
+          <a:fillRef idx="0">
+            <a:schemeClr val="accent1"/>
+          </a:fillRef>
+          <a:effectRef idx="1">
+            <a:schemeClr val="accent1"/>
+          </a:effectRef>
+          <a:fontRef idx="minor">
+            <a:schemeClr val="tx1"/>
+          </a:fontRef>
+        </p:style>
+      </p:cxnSp>
+      <p:cxnSp>
+        <p:nvCxnSpPr>
+          <p:cNvPr id="30" name="Straight Arrow Connector 29">
+            <a:extLst>
+              <a:ext uri="{FF2B5EF4-FFF2-40B4-BE49-F238E27FC236}">
+                <a16:creationId xmlns:a16="http://schemas.microsoft.com/office/drawing/2014/main" id="{B4D7F1A8-D56F-696A-F251-AB5438B83349}"/>
+              </a:ext>
+            </a:extLst>
+          </p:cNvPr>
+          <p:cNvCxnSpPr>
+            <a:cxnSpLocks/>
+            <a:stCxn id="5" idx="0"/>
+          </p:cNvCxnSpPr>
+          <p:nvPr/>
+        </p:nvCxnSpPr>
+        <p:spPr>
+          <a:xfrm flipV="1">
+            <a:off x="1909737" y="3265436"/>
+            <a:ext cx="308330" cy="292786"/>
+          </a:xfrm>
+          <a:prstGeom prst="straightConnector1">
+            <a:avLst/>
+          </a:prstGeom>
+          <a:ln>
+            <a:tailEnd type="triangle" w="lg" len="lg"/>
+          </a:ln>
+        </p:spPr>
+        <p:style>
+          <a:lnRef idx="2">
+            <a:schemeClr val="accent1"/>
+          </a:lnRef>
+          <a:fillRef idx="0">
+            <a:schemeClr val="accent1"/>
+          </a:fillRef>
+          <a:effectRef idx="1">
+            <a:schemeClr val="accent1"/>
+          </a:effectRef>
+          <a:fontRef idx="minor">
+            <a:schemeClr val="tx1"/>
+          </a:fontRef>
+        </p:style>
+      </p:cxnSp>
+      <p:cxnSp>
+        <p:nvCxnSpPr>
+          <p:cNvPr id="34" name="Straight Arrow Connector 33">
+            <a:extLst>
+              <a:ext uri="{FF2B5EF4-FFF2-40B4-BE49-F238E27FC236}">
+                <a16:creationId xmlns:a16="http://schemas.microsoft.com/office/drawing/2014/main" id="{8A92518D-6DA3-2B2A-CB61-817B8558B963}"/>
+              </a:ext>
+            </a:extLst>
+          </p:cNvPr>
+          <p:cNvCxnSpPr>
+            <a:cxnSpLocks/>
+          </p:cNvCxnSpPr>
+          <p:nvPr/>
+        </p:nvCxnSpPr>
+        <p:spPr>
+          <a:xfrm flipH="1" flipV="1">
+            <a:off x="4725699" y="3241020"/>
+            <a:ext cx="299965" cy="338721"/>
+          </a:xfrm>
+          <a:prstGeom prst="straightConnector1">
+            <a:avLst/>
+          </a:prstGeom>
+          <a:ln>
+            <a:tailEnd type="triangle" w="lg" len="lg"/>
+          </a:ln>
+        </p:spPr>
+        <p:style>
+          <a:lnRef idx="2">
+            <a:schemeClr val="accent1"/>
+          </a:lnRef>
+          <a:fillRef idx="0">
+            <a:schemeClr val="accent1"/>
+          </a:fillRef>
+          <a:effectRef idx="1">
+            <a:schemeClr val="accent1"/>
+          </a:effectRef>
+          <a:fontRef idx="minor">
+            <a:schemeClr val="tx1"/>
+          </a:fontRef>
+        </p:style>
+      </p:cxnSp>
+      <p:cxnSp>
+        <p:nvCxnSpPr>
+          <p:cNvPr id="38" name="Straight Arrow Connector 37">
+            <a:extLst>
+              <a:ext uri="{FF2B5EF4-FFF2-40B4-BE49-F238E27FC236}">
+                <a16:creationId xmlns:a16="http://schemas.microsoft.com/office/drawing/2014/main" id="{EF19AB48-8110-2536-48CE-AB5D6500F3EC}"/>
+              </a:ext>
+            </a:extLst>
+          </p:cNvPr>
+          <p:cNvCxnSpPr>
+            <a:cxnSpLocks/>
+          </p:cNvCxnSpPr>
+          <p:nvPr/>
+        </p:nvCxnSpPr>
+        <p:spPr>
+          <a:xfrm flipH="1">
+            <a:off x="4692254" y="2245519"/>
+            <a:ext cx="329366" cy="333553"/>
+          </a:xfrm>
+          <a:prstGeom prst="straightConnector1">
+            <a:avLst/>
+          </a:prstGeom>
+          <a:ln>
+            <a:tailEnd type="triangle" w="lg" len="lg"/>
+          </a:ln>
+        </p:spPr>
+        <p:style>
+          <a:lnRef idx="2">
+            <a:schemeClr val="accent1"/>
+          </a:lnRef>
+          <a:fillRef idx="0">
+            <a:schemeClr val="accent1"/>
+          </a:fillRef>
+          <a:effectRef idx="1">
+            <a:schemeClr val="accent1"/>
+          </a:effectRef>
+          <a:fontRef idx="minor">
+            <a:schemeClr val="tx1"/>
+          </a:fontRef>
+        </p:style>
+      </p:cxnSp>
+      <p:sp>
+        <p:nvSpPr>
+          <p:cNvPr id="3" name="TextBox 2">
+            <a:extLst>
+              <a:ext uri="{FF2B5EF4-FFF2-40B4-BE49-F238E27FC236}">
+                <a16:creationId xmlns:a16="http://schemas.microsoft.com/office/drawing/2014/main" id="{9C2D3A4E-CD9B-2F16-65A6-5F750E1EC401}"/>
+              </a:ext>
+            </a:extLst>
+          </p:cNvPr>
+          <p:cNvSpPr txBox="1"/>
+          <p:nvPr/>
+        </p:nvSpPr>
+        <p:spPr>
+          <a:xfrm>
+            <a:off x="3912362" y="1153099"/>
+            <a:ext cx="1431802" cy="246221"/>
+          </a:xfrm>
+          <a:prstGeom prst="rect">
+            <a:avLst/>
+          </a:prstGeom>
+          <a:noFill/>
+        </p:spPr>
+        <p:txBody>
+          <a:bodyPr wrap="none" rtlCol="0">
+            <a:spAutoFit/>
+          </a:bodyPr>
+          <a:lstStyle/>
+          <a:p>
+            <a:r>
+              <a:rPr lang="en-US" sz="1000" dirty="0">
+                <a:solidFill>
+                  <a:schemeClr val="accent1"/>
+                </a:solidFill>
+              </a:rPr>
+              <a:t>class </a:t>
+            </a:r>
+            <a:r>
+              <a:rPr lang="en-US" sz="1000" dirty="0" err="1">
+                <a:solidFill>
+                  <a:schemeClr val="accent1"/>
+                </a:solidFill>
+              </a:rPr>
+              <a:t>BooleanNetwork</a:t>
+            </a:r>
+            <a:endParaRPr lang="en-US" sz="1000" dirty="0">
+              <a:solidFill>
+                <a:schemeClr val="accent1"/>
+              </a:solidFill>
+            </a:endParaRPr>
+          </a:p>
+        </p:txBody>
+      </p:sp>
+      <p:sp>
+        <p:nvSpPr>
+          <p:cNvPr id="9" name="TextBox 8">
+            <a:extLst>
+              <a:ext uri="{FF2B5EF4-FFF2-40B4-BE49-F238E27FC236}">
+                <a16:creationId xmlns:a16="http://schemas.microsoft.com/office/drawing/2014/main" id="{530460BE-3EB7-DDD9-1615-745592F348E6}"/>
+              </a:ext>
+            </a:extLst>
+          </p:cNvPr>
+          <p:cNvSpPr txBox="1"/>
+          <p:nvPr/>
+        </p:nvSpPr>
+        <p:spPr>
+          <a:xfrm>
+            <a:off x="715476" y="1153100"/>
+            <a:ext cx="1454244" cy="246221"/>
+          </a:xfrm>
+          <a:prstGeom prst="rect">
+            <a:avLst/>
+          </a:prstGeom>
+          <a:noFill/>
+        </p:spPr>
+        <p:txBody>
+          <a:bodyPr wrap="none" rtlCol="0">
+            <a:spAutoFit/>
+          </a:bodyPr>
+          <a:lstStyle/>
+          <a:p>
+            <a:r>
+              <a:rPr lang="en-US" sz="1000" dirty="0">
+                <a:solidFill>
+                  <a:schemeClr val="accent1"/>
+                </a:solidFill>
+              </a:rPr>
+              <a:t>class </a:t>
+            </a:r>
+            <a:r>
+              <a:rPr lang="en-US" sz="1000" dirty="0" err="1">
+                <a:solidFill>
+                  <a:schemeClr val="accent1"/>
+                </a:solidFill>
+              </a:rPr>
+              <a:t>BooleanFunction</a:t>
+            </a:r>
+            <a:endParaRPr lang="en-US" sz="1000" dirty="0">
+              <a:solidFill>
+                <a:schemeClr val="accent1"/>
+              </a:solidFill>
+            </a:endParaRPr>
+          </a:p>
+        </p:txBody>
+      </p:sp>
+      <p:sp>
+        <p:nvSpPr>
+          <p:cNvPr id="14" name="TextBox 13">
+            <a:extLst>
+              <a:ext uri="{FF2B5EF4-FFF2-40B4-BE49-F238E27FC236}">
+                <a16:creationId xmlns:a16="http://schemas.microsoft.com/office/drawing/2014/main" id="{64715B86-B7FF-611D-0EC6-4ACE7C5D2932}"/>
+              </a:ext>
+            </a:extLst>
+          </p:cNvPr>
+          <p:cNvSpPr txBox="1"/>
+          <p:nvPr/>
+        </p:nvSpPr>
+        <p:spPr>
+          <a:xfrm>
+            <a:off x="5084467" y="2641880"/>
+            <a:ext cx="1279037" cy="544830"/>
+          </a:xfrm>
+          <a:prstGeom prst="roundRect">
+            <a:avLst/>
+          </a:prstGeom>
+        </p:spPr>
+        <p:style>
+          <a:lnRef idx="2">
+            <a:schemeClr val="accent1"/>
+          </a:lnRef>
+          <a:fillRef idx="1">
+            <a:schemeClr val="lt1"/>
+          </a:fillRef>
+          <a:effectRef idx="0">
+            <a:schemeClr val="accent1"/>
+          </a:effectRef>
+          <a:fontRef idx="minor">
+            <a:schemeClr val="dk1"/>
+          </a:fontRef>
+        </p:style>
+        <p:txBody>
+          <a:bodyPr wrap="square" rtlCol="0">
+            <a:spAutoFit/>
+          </a:bodyPr>
+          <a:lstStyle/>
+          <a:p>
+            <a:r>
+              <a:rPr lang="en-US" sz="1000" dirty="0"/>
+              <a:t>6. Interoperability</a:t>
+            </a:r>
+          </a:p>
+          <a:p>
+            <a:r>
+              <a:rPr lang="en-US" sz="800" dirty="0"/>
+              <a:t>Export/Import </a:t>
+            </a:r>
+            <a:r>
+              <a:rPr lang="en-US" sz="800" dirty="0">
+                <a:sym typeface="Wingdings" pitchFamily="2" charset="2"/>
+              </a:rPr>
+              <a:t></a:t>
+            </a:r>
+            <a:br>
+              <a:rPr lang="en-US" sz="800" dirty="0">
+                <a:sym typeface="Wingdings" pitchFamily="2" charset="2"/>
+              </a:rPr>
+            </a:br>
+            <a:r>
+              <a:rPr lang="en-US" sz="800" dirty="0">
+                <a:sym typeface="Wingdings" pitchFamily="2" charset="2"/>
+              </a:rPr>
+              <a:t>CANA, </a:t>
+            </a:r>
+            <a:r>
+              <a:rPr lang="en-US" sz="800" dirty="0" err="1">
+                <a:sym typeface="Wingdings" pitchFamily="2" charset="2"/>
+              </a:rPr>
+              <a:t>PyBoolNet</a:t>
+            </a:r>
+            <a:r>
+              <a:rPr lang="en-US" sz="800" dirty="0">
+                <a:sym typeface="Wingdings" pitchFamily="2" charset="2"/>
+              </a:rPr>
+              <a:t>, …</a:t>
+            </a:r>
+            <a:endParaRPr lang="en-US" sz="800" dirty="0"/>
+          </a:p>
+        </p:txBody>
+      </p:sp>
+      <p:cxnSp>
+        <p:nvCxnSpPr>
+          <p:cNvPr id="15" name="Straight Arrow Connector 14">
+            <a:extLst>
+              <a:ext uri="{FF2B5EF4-FFF2-40B4-BE49-F238E27FC236}">
+                <a16:creationId xmlns:a16="http://schemas.microsoft.com/office/drawing/2014/main" id="{4F164AEA-7EA9-8E24-5FA2-BB0FEB00F400}"/>
+              </a:ext>
+            </a:extLst>
+          </p:cNvPr>
+          <p:cNvCxnSpPr>
+            <a:cxnSpLocks/>
+            <a:endCxn id="14" idx="0"/>
+          </p:cNvCxnSpPr>
+          <p:nvPr/>
+        </p:nvCxnSpPr>
+        <p:spPr>
+          <a:xfrm>
+            <a:off x="5723986" y="2245519"/>
+            <a:ext cx="0" cy="396361"/>
+          </a:xfrm>
+          <a:prstGeom prst="straightConnector1">
+            <a:avLst/>
+          </a:prstGeom>
+          <a:ln>
+            <a:tailEnd type="triangle" w="lg" len="lg"/>
+          </a:ln>
+        </p:spPr>
+        <p:style>
+          <a:lnRef idx="2">
+            <a:schemeClr val="accent1"/>
+          </a:lnRef>
+          <a:fillRef idx="0">
+            <a:schemeClr val="accent1"/>
+          </a:fillRef>
+          <a:effectRef idx="1">
+            <a:schemeClr val="accent1"/>
+          </a:effectRef>
+          <a:fontRef idx="minor">
+            <a:schemeClr val="tx1"/>
+          </a:fontRef>
+        </p:style>
+      </p:cxnSp>
+      <p:cxnSp>
+        <p:nvCxnSpPr>
+          <p:cNvPr id="59" name="Straight Arrow Connector 58">
+            <a:extLst>
+              <a:ext uri="{FF2B5EF4-FFF2-40B4-BE49-F238E27FC236}">
+                <a16:creationId xmlns:a16="http://schemas.microsoft.com/office/drawing/2014/main" id="{2519C661-BC02-A57D-0B10-50C9B361B8D5}"/>
+              </a:ext>
+            </a:extLst>
+          </p:cNvPr>
+          <p:cNvCxnSpPr>
+            <a:cxnSpLocks/>
+          </p:cNvCxnSpPr>
+          <p:nvPr/>
+        </p:nvCxnSpPr>
+        <p:spPr>
+          <a:xfrm>
+            <a:off x="5743399" y="3186710"/>
+            <a:ext cx="0" cy="396361"/>
+          </a:xfrm>
+          <a:prstGeom prst="straightConnector1">
+            <a:avLst/>
+          </a:prstGeom>
+          <a:ln>
+            <a:tailEnd type="triangle" w="lg" len="lg"/>
+          </a:ln>
+        </p:spPr>
+        <p:style>
+          <a:lnRef idx="2">
+            <a:schemeClr val="accent1"/>
+          </a:lnRef>
+          <a:fillRef idx="0">
+            <a:schemeClr val="accent1"/>
+          </a:fillRef>
+          <a:effectRef idx="1">
+            <a:schemeClr val="accent1"/>
+          </a:effectRef>
+          <a:fontRef idx="minor">
+            <a:schemeClr val="tx1"/>
+          </a:fontRef>
+        </p:style>
+      </p:cxnSp>
+    </p:spTree>
+    <p:extLst>
+      <p:ext uri="{BB962C8B-B14F-4D97-AF65-F5344CB8AC3E}">
+        <p14:creationId xmlns:p14="http://schemas.microsoft.com/office/powerpoint/2010/main" val="3842302640"/>
       </p:ext>
     </p:extLst>
   </p:cSld>

</xml_diff>

<commit_message>
deleted all caps variables
</commit_message>
<xml_diff>
--- a/paper/figures.pptx
+++ b/paper/figures.pptx
@@ -110,7 +110,129 @@
       </a:defRPr>
     </a:lvl9pPr>
   </p:defaultTextStyle>
+  <p:extLst>
+    <p:ext uri="{EFAFB233-063F-42B5-8137-9DF3F51BA10A}">
+      <p15:sldGuideLst xmlns:p15="http://schemas.microsoft.com/office/powerpoint/2012/main"/>
+    </p:ext>
+  </p:extLst>
 </p:presentation>
+</file>
+
+<file path=ppt/revisionInfo.xml><?xml version="1.0" encoding="utf-8"?>
+<p1510:revInfo xmlns:a="http://schemas.openxmlformats.org/drawingml/2006/main" xmlns:r="http://schemas.openxmlformats.org/officeDocument/2006/relationships" xmlns:p1510="http://schemas.microsoft.com/office/powerpoint/2015/10/main">
+  <p1510:revLst>
+    <p1510:client id="{58176077-7511-DA4D-8290-77F28AB65BEC}" v="4" dt="2026-02-10T05:59:23.904"/>
+  </p1510:revLst>
+</p1510:revInfo>
+</file>
+
+<file path=ppt/changesInfos/changesInfo1.xml><?xml version="1.0" encoding="utf-8"?>
+<pc:chgInfo xmlns:a="http://schemas.openxmlformats.org/drawingml/2006/main" xmlns:r="http://schemas.openxmlformats.org/officeDocument/2006/relationships" xmlns:ac="http://schemas.microsoft.com/office/drawing/2013/main/command" xmlns:pc="http://schemas.microsoft.com/office/powerpoint/2013/main/command">
+  <pc:docChgLst>
+    <pc:chgData name="Kadelka, Claus [MATH]" userId="3587954921_tp_box_2" providerId="OAuth2" clId="{3A5D34D3-13CC-588F-87D8-4157F9E149E9}"/>
+    <pc:docChg chg="undo custSel modSld">
+      <pc:chgData name="Kadelka, Claus [MATH]" userId="3587954921_tp_box_2" providerId="OAuth2" clId="{3A5D34D3-13CC-588F-87D8-4157F9E149E9}" dt="2026-02-10T05:59:23.904" v="67"/>
+      <pc:docMkLst>
+        <pc:docMk/>
+      </pc:docMkLst>
+      <pc:sldChg chg="modSp mod">
+        <pc:chgData name="Kadelka, Claus [MATH]" userId="3587954921_tp_box_2" providerId="OAuth2" clId="{3A5D34D3-13CC-588F-87D8-4157F9E149E9}" dt="2026-02-10T05:59:23.904" v="67"/>
+        <pc:sldMkLst>
+          <pc:docMk/>
+          <pc:sldMk cId="3842302640" sldId="262"/>
+        </pc:sldMkLst>
+        <pc:spChg chg="mod">
+          <ac:chgData name="Kadelka, Claus [MATH]" userId="3587954921_tp_box_2" providerId="OAuth2" clId="{3A5D34D3-13CC-588F-87D8-4157F9E149E9}" dt="2026-02-10T05:55:03.707" v="33" actId="20577"/>
+          <ac:spMkLst>
+            <pc:docMk/>
+            <pc:sldMk cId="3842302640" sldId="262"/>
+            <ac:spMk id="4" creationId="{1DAA9EE6-11C5-A0A4-93B4-2D2087196CC4}"/>
+          </ac:spMkLst>
+        </pc:spChg>
+        <pc:spChg chg="mod">
+          <ac:chgData name="Kadelka, Claus [MATH]" userId="3587954921_tp_box_2" providerId="OAuth2" clId="{3A5D34D3-13CC-588F-87D8-4157F9E149E9}" dt="2026-02-10T05:54:43.476" v="30" actId="20577"/>
+          <ac:spMkLst>
+            <pc:docMk/>
+            <pc:sldMk cId="3842302640" sldId="262"/>
+            <ac:spMk id="5" creationId="{AA2A4C3D-B737-AE2F-71F6-77FDC7733A53}"/>
+          </ac:spMkLst>
+        </pc:spChg>
+        <pc:spChg chg="mod">
+          <ac:chgData name="Kadelka, Claus [MATH]" userId="3587954921_tp_box_2" providerId="OAuth2" clId="{3A5D34D3-13CC-588F-87D8-4157F9E149E9}" dt="2026-02-10T05:59:23.904" v="67"/>
+          <ac:spMkLst>
+            <pc:docMk/>
+            <pc:sldMk cId="3842302640" sldId="262"/>
+            <ac:spMk id="6" creationId="{3F12174E-88D6-19D5-3E11-09A4E62118FD}"/>
+          </ac:spMkLst>
+        </pc:spChg>
+        <pc:spChg chg="mod">
+          <ac:chgData name="Kadelka, Claus [MATH]" userId="3587954921_tp_box_2" providerId="OAuth2" clId="{3A5D34D3-13CC-588F-87D8-4157F9E149E9}" dt="2026-02-10T05:55:28.436" v="38" actId="14100"/>
+          <ac:spMkLst>
+            <pc:docMk/>
+            <pc:sldMk cId="3842302640" sldId="262"/>
+            <ac:spMk id="7" creationId="{8E32BCFE-5A74-DD22-B5A0-DF806E4478F3}"/>
+          </ac:spMkLst>
+        </pc:spChg>
+        <pc:spChg chg="mod">
+          <ac:chgData name="Kadelka, Claus [MATH]" userId="3587954921_tp_box_2" providerId="OAuth2" clId="{3A5D34D3-13CC-588F-87D8-4157F9E149E9}" dt="2026-02-10T05:54:11.731" v="19" actId="20577"/>
+          <ac:spMkLst>
+            <pc:docMk/>
+            <pc:sldMk cId="3842302640" sldId="262"/>
+            <ac:spMk id="8" creationId="{82D1E615-0133-8E7A-494F-891A03D4F713}"/>
+          </ac:spMkLst>
+        </pc:spChg>
+        <pc:spChg chg="mod">
+          <ac:chgData name="Kadelka, Claus [MATH]" userId="3587954921_tp_box_2" providerId="OAuth2" clId="{3A5D34D3-13CC-588F-87D8-4157F9E149E9}" dt="2026-02-10T05:53:59.593" v="14" actId="20577"/>
+          <ac:spMkLst>
+            <pc:docMk/>
+            <pc:sldMk cId="3842302640" sldId="262"/>
+            <ac:spMk id="14" creationId="{64715B86-B7FF-611D-0EC6-4ACE7C5D2932}"/>
+          </ac:spMkLst>
+        </pc:spChg>
+        <pc:spChg chg="mod">
+          <ac:chgData name="Kadelka, Claus [MATH]" userId="3587954921_tp_box_2" providerId="OAuth2" clId="{3A5D34D3-13CC-588F-87D8-4157F9E149E9}" dt="2026-02-10T05:55:35.647" v="40" actId="14100"/>
+          <ac:spMkLst>
+            <pc:docMk/>
+            <pc:sldMk cId="3842302640" sldId="262"/>
+            <ac:spMk id="64" creationId="{C7F4E4D2-E099-F81C-A05E-4DDB135E817C}"/>
+          </ac:spMkLst>
+        </pc:spChg>
+        <pc:cxnChg chg="mod">
+          <ac:chgData name="Kadelka, Claus [MATH]" userId="3587954921_tp_box_2" providerId="OAuth2" clId="{3A5D34D3-13CC-588F-87D8-4157F9E149E9}" dt="2026-02-10T05:54:28.558" v="21" actId="20578"/>
+          <ac:cxnSpMkLst>
+            <pc:docMk/>
+            <pc:sldMk cId="3842302640" sldId="262"/>
+            <ac:cxnSpMk id="11" creationId="{06148DE3-88FE-2E45-57BC-6D81D3479281}"/>
+          </ac:cxnSpMkLst>
+        </pc:cxnChg>
+        <pc:cxnChg chg="mod">
+          <ac:chgData name="Kadelka, Claus [MATH]" userId="3587954921_tp_box_2" providerId="OAuth2" clId="{3A5D34D3-13CC-588F-87D8-4157F9E149E9}" dt="2026-02-10T05:55:28.436" v="38" actId="14100"/>
+          <ac:cxnSpMkLst>
+            <pc:docMk/>
+            <pc:sldMk cId="3842302640" sldId="262"/>
+            <ac:cxnSpMk id="22" creationId="{4943056B-8E7C-22AC-384B-F6BFEC18C1FA}"/>
+          </ac:cxnSpMkLst>
+        </pc:cxnChg>
+        <pc:cxnChg chg="mod">
+          <ac:chgData name="Kadelka, Claus [MATH]" userId="3587954921_tp_box_2" providerId="OAuth2" clId="{3A5D34D3-13CC-588F-87D8-4157F9E149E9}" dt="2026-02-10T05:59:23.904" v="67"/>
+          <ac:cxnSpMkLst>
+            <pc:docMk/>
+            <pc:sldMk cId="3842302640" sldId="262"/>
+            <ac:cxnSpMk id="25" creationId="{3800CD7F-F1D7-D141-A669-1C1E7121E604}"/>
+          </ac:cxnSpMkLst>
+        </pc:cxnChg>
+        <pc:cxnChg chg="mod">
+          <ac:chgData name="Kadelka, Claus [MATH]" userId="3587954921_tp_box_2" providerId="OAuth2" clId="{3A5D34D3-13CC-588F-87D8-4157F9E149E9}" dt="2026-02-10T05:54:28.558" v="21" actId="20578"/>
+          <ac:cxnSpMkLst>
+            <pc:docMk/>
+            <pc:sldMk cId="3842302640" sldId="262"/>
+            <ac:cxnSpMk id="30" creationId="{B4D7F1A8-D56F-696A-F251-AB5438B83349}"/>
+          </ac:cxnSpMkLst>
+        </pc:cxnChg>
+      </pc:sldChg>
+    </pc:docChg>
+  </pc:docChgLst>
+</pc:chgInfo>
 </file>
 
 <file path=ppt/slideLayouts/slideLayout1.xml><?xml version="1.0" encoding="utf-8"?>
@@ -260,7 +382,7 @@
           <a:p>
             <a:fld id="{ABBB5E58-55BA-1E41-8676-D73EB213C571}" type="datetimeFigureOut">
               <a:rPr lang="en-US" smtClean="0"/>
-              <a:t>8/21/25</a:t>
+              <a:t>2/9/26</a:t>
             </a:fld>
             <a:endParaRPr lang="en-US"/>
           </a:p>
@@ -458,7 +580,7 @@
           <a:p>
             <a:fld id="{ABBB5E58-55BA-1E41-8676-D73EB213C571}" type="datetimeFigureOut">
               <a:rPr lang="en-US" smtClean="0"/>
-              <a:t>8/21/25</a:t>
+              <a:t>2/9/26</a:t>
             </a:fld>
             <a:endParaRPr lang="en-US"/>
           </a:p>
@@ -666,7 +788,7 @@
           <a:p>
             <a:fld id="{ABBB5E58-55BA-1E41-8676-D73EB213C571}" type="datetimeFigureOut">
               <a:rPr lang="en-US" smtClean="0"/>
-              <a:t>8/21/25</a:t>
+              <a:t>2/9/26</a:t>
             </a:fld>
             <a:endParaRPr lang="en-US"/>
           </a:p>
@@ -864,7 +986,7 @@
           <a:p>
             <a:fld id="{ABBB5E58-55BA-1E41-8676-D73EB213C571}" type="datetimeFigureOut">
               <a:rPr lang="en-US" smtClean="0"/>
-              <a:t>8/21/25</a:t>
+              <a:t>2/9/26</a:t>
             </a:fld>
             <a:endParaRPr lang="en-US"/>
           </a:p>
@@ -1139,7 +1261,7 @@
           <a:p>
             <a:fld id="{ABBB5E58-55BA-1E41-8676-D73EB213C571}" type="datetimeFigureOut">
               <a:rPr lang="en-US" smtClean="0"/>
-              <a:t>8/21/25</a:t>
+              <a:t>2/9/26</a:t>
             </a:fld>
             <a:endParaRPr lang="en-US"/>
           </a:p>
@@ -1404,7 +1526,7 @@
           <a:p>
             <a:fld id="{ABBB5E58-55BA-1E41-8676-D73EB213C571}" type="datetimeFigureOut">
               <a:rPr lang="en-US" smtClean="0"/>
-              <a:t>8/21/25</a:t>
+              <a:t>2/9/26</a:t>
             </a:fld>
             <a:endParaRPr lang="en-US"/>
           </a:p>
@@ -1816,7 +1938,7 @@
           <a:p>
             <a:fld id="{ABBB5E58-55BA-1E41-8676-D73EB213C571}" type="datetimeFigureOut">
               <a:rPr lang="en-US" smtClean="0"/>
-              <a:t>8/21/25</a:t>
+              <a:t>2/9/26</a:t>
             </a:fld>
             <a:endParaRPr lang="en-US"/>
           </a:p>
@@ -1957,7 +2079,7 @@
           <a:p>
             <a:fld id="{ABBB5E58-55BA-1E41-8676-D73EB213C571}" type="datetimeFigureOut">
               <a:rPr lang="en-US" smtClean="0"/>
-              <a:t>8/21/25</a:t>
+              <a:t>2/9/26</a:t>
             </a:fld>
             <a:endParaRPr lang="en-US"/>
           </a:p>
@@ -2070,7 +2192,7 @@
           <a:p>
             <a:fld id="{ABBB5E58-55BA-1E41-8676-D73EB213C571}" type="datetimeFigureOut">
               <a:rPr lang="en-US" smtClean="0"/>
-              <a:t>8/21/25</a:t>
+              <a:t>2/9/26</a:t>
             </a:fld>
             <a:endParaRPr lang="en-US"/>
           </a:p>
@@ -2381,7 +2503,7 @@
           <a:p>
             <a:fld id="{ABBB5E58-55BA-1E41-8676-D73EB213C571}" type="datetimeFigureOut">
               <a:rPr lang="en-US" smtClean="0"/>
-              <a:t>8/21/25</a:t>
+              <a:t>2/9/26</a:t>
             </a:fld>
             <a:endParaRPr lang="en-US"/>
           </a:p>
@@ -2669,7 +2791,7 @@
           <a:p>
             <a:fld id="{ABBB5E58-55BA-1E41-8676-D73EB213C571}" type="datetimeFigureOut">
               <a:rPr lang="en-US" smtClean="0"/>
-              <a:t>8/21/25</a:t>
+              <a:t>2/9/26</a:t>
             </a:fld>
             <a:endParaRPr lang="en-US"/>
           </a:p>
@@ -2910,7 +3032,7 @@
           <a:p>
             <a:fld id="{ABBB5E58-55BA-1E41-8676-D73EB213C571}" type="datetimeFigureOut">
               <a:rPr lang="en-US" smtClean="0"/>
-              <a:t>8/21/25</a:t>
+              <a:t>2/9/26</a:t>
             </a:fld>
             <a:endParaRPr lang="en-US"/>
           </a:p>
@@ -8103,13 +8225,13 @@
           <a:p>
             <a:r>
               <a:rPr lang="en-US" sz="1000" dirty="0"/>
-              <a:t>1. Random Boolean Function Generators</a:t>
+              <a:t>Random Boolean Function Generators</a:t>
             </a:r>
           </a:p>
           <a:p>
             <a:r>
               <a:rPr lang="en-US" sz="800" dirty="0" err="1"/>
-              <a:t>random_non_degenerated_function</a:t>
+              <a:t>random_non_degenerate_function</a:t>
             </a:r>
             <a:r>
               <a:rPr lang="en-US" sz="800" dirty="0"/>
@@ -8195,7 +8317,7 @@
           <a:p>
             <a:r>
               <a:rPr lang="en-US" sz="1000" dirty="0"/>
-              <a:t>3. Boolean Function Analysis</a:t>
+              <a:t>Boolean Function Analysis</a:t>
             </a:r>
           </a:p>
           <a:p>
@@ -8219,7 +8341,7 @@
           <a:p>
             <a:r>
               <a:rPr lang="en-US" sz="800" dirty="0" err="1"/>
-              <a:t>is_degenerated</a:t>
+              <a:t>is_degenerate</a:t>
             </a:r>
             <a:r>
               <a:rPr lang="en-US" sz="800" dirty="0"/>
@@ -8227,7 +8349,7 @@
             </a:r>
             <a:r>
               <a:rPr lang="en-US" sz="800" dirty="0" err="1"/>
-              <a:t>get_sensitivity</a:t>
+              <a:t>get_average_sensitivity</a:t>
             </a:r>
             <a:r>
               <a:rPr lang="en-US" sz="800" dirty="0"/>
@@ -8321,7 +8443,7 @@
           <a:p>
             <a:r>
               <a:rPr lang="en-US" sz="1000" dirty="0"/>
-              <a:t>4. Boolean Network Analysis</a:t>
+              <a:t>Boolean Network Analysis</a:t>
             </a:r>
           </a:p>
           <a:p>
@@ -8347,7 +8469,7 @@
           <a:p>
             <a:r>
               <a:rPr lang="en-US" sz="800" dirty="0" err="1"/>
-              <a:t>get_modular_structure</a:t>
+              <a:t>get_types_of_regulation</a:t>
             </a:r>
             <a:r>
               <a:rPr lang="en-US" sz="800" dirty="0"/>
@@ -8357,7 +8479,7 @@
           <a:p>
             <a:r>
               <a:rPr lang="en-US" sz="800" dirty="0" err="1"/>
-              <a:t>get_edge_controlled_network</a:t>
+              <a:t>get_ffls</a:t>
             </a:r>
             <a:r>
               <a:rPr lang="en-US" sz="800" dirty="0"/>
@@ -8386,8 +8508,8 @@
         </p:nvSpPr>
         <p:spPr>
           <a:xfrm>
-            <a:off x="3825048" y="1428274"/>
-            <a:ext cx="2538465" cy="817245"/>
+            <a:off x="3825049" y="1428274"/>
+            <a:ext cx="2538456" cy="817245"/>
           </a:xfrm>
           <a:prstGeom prst="roundRect">
             <a:avLst/>
@@ -8415,13 +8537,13 @@
           <a:p>
             <a:r>
               <a:rPr lang="en-US" sz="1000" dirty="0"/>
-              <a:t>2. Random Boolean Network Generators</a:t>
-            </a:r>
-          </a:p>
-          <a:p>
-            <a:r>
-              <a:rPr lang="en-US" sz="800" dirty="0"/>
-              <a:t>Generate random Boolean networks of defined size, degree distribution, canalizing depth or layer structure, bias, …</a:t>
+              <a:t>Random Boolean Network Generators</a:t>
+            </a:r>
+          </a:p>
+          <a:p>
+            <a:r>
+              <a:rPr lang="en-US" sz="800" dirty="0"/>
+              <a:t>Generate random Boolean networks of defined size, degree distribution, canalizing depth, layer structure, bias, …</a:t>
             </a:r>
           </a:p>
           <a:p>
@@ -8472,7 +8594,7 @@
           <a:p>
             <a:r>
               <a:rPr lang="en-US" sz="1000" dirty="0"/>
-              <a:t>5. Ensemble experiments</a:t>
+              <a:t>Ensemble Experiments</a:t>
             </a:r>
           </a:p>
           <a:p>
@@ -8592,7 +8714,7 @@
         <p:spPr>
           <a:xfrm>
             <a:off x="3178970" y="1836897"/>
-            <a:ext cx="646078" cy="0"/>
+            <a:ext cx="646079" cy="0"/>
           </a:xfrm>
           <a:prstGeom prst="straightConnector1">
             <a:avLst/>
@@ -8972,7 +9094,7 @@
           <a:p>
             <a:r>
               <a:rPr lang="en-US" sz="1000" dirty="0"/>
-              <a:t>6. Interoperability</a:t>
+              <a:t>Interoperability</a:t>
             </a:r>
           </a:p>
           <a:p>

</xml_diff>

<commit_message>
simplify_functions all the way through
</commit_message>
<xml_diff>
--- a/paper/figures.pptx
+++ b/paper/figures.pptx
@@ -12,6 +12,8 @@
     <p:sldId id="260" r:id="rId6"/>
     <p:sldId id="261" r:id="rId7"/>
     <p:sldId id="262" r:id="rId8"/>
+    <p:sldId id="263" r:id="rId9"/>
+    <p:sldId id="264" r:id="rId10"/>
   </p:sldIdLst>
   <p:sldSz cx="12192000" cy="6858000"/>
   <p:notesSz cx="6858000" cy="9144000"/>
@@ -121,7 +123,7 @@
 <file path=ppt/revisionInfo.xml><?xml version="1.0" encoding="utf-8"?>
 <p1510:revInfo xmlns:a="http://schemas.openxmlformats.org/drawingml/2006/main" xmlns:r="http://schemas.openxmlformats.org/officeDocument/2006/relationships" xmlns:p1510="http://schemas.microsoft.com/office/powerpoint/2015/10/main">
   <p1510:revLst>
-    <p1510:client id="{58176077-7511-DA4D-8290-77F28AB65BEC}" v="4" dt="2026-02-10T05:59:23.904"/>
+    <p1510:client id="{58176077-7511-DA4D-8290-77F28AB65BEC}" v="13" dt="2026-02-13T16:12:08.089"/>
   </p1510:revLst>
 </p1510:revInfo>
 </file>
@@ -130,8 +132,8 @@
 <pc:chgInfo xmlns:a="http://schemas.openxmlformats.org/drawingml/2006/main" xmlns:r="http://schemas.openxmlformats.org/officeDocument/2006/relationships" xmlns:ac="http://schemas.microsoft.com/office/drawing/2013/main/command" xmlns:pc="http://schemas.microsoft.com/office/powerpoint/2013/main/command">
   <pc:docChgLst>
     <pc:chgData name="Kadelka, Claus [MATH]" userId="3587954921_tp_box_2" providerId="OAuth2" clId="{3A5D34D3-13CC-588F-87D8-4157F9E149E9}"/>
-    <pc:docChg chg="undo custSel modSld">
-      <pc:chgData name="Kadelka, Claus [MATH]" userId="3587954921_tp_box_2" providerId="OAuth2" clId="{3A5D34D3-13CC-588F-87D8-4157F9E149E9}" dt="2026-02-10T05:59:23.904" v="67"/>
+    <pc:docChg chg="undo custSel addSld modSld">
+      <pc:chgData name="Kadelka, Claus [MATH]" userId="3587954921_tp_box_2" providerId="OAuth2" clId="{3A5D34D3-13CC-588F-87D8-4157F9E149E9}" dt="2026-02-13T16:12:11.065" v="655" actId="1076"/>
       <pc:docMkLst>
         <pc:docMk/>
       </pc:docMkLst>
@@ -229,6 +231,148 @@
             <ac:cxnSpMk id="30" creationId="{B4D7F1A8-D56F-696A-F251-AB5438B83349}"/>
           </ac:cxnSpMkLst>
         </pc:cxnChg>
+      </pc:sldChg>
+      <pc:sldChg chg="modSp add mod">
+        <pc:chgData name="Kadelka, Claus [MATH]" userId="3587954921_tp_box_2" providerId="OAuth2" clId="{3A5D34D3-13CC-588F-87D8-4157F9E149E9}" dt="2026-02-13T15:57:59.965" v="545" actId="15"/>
+        <pc:sldMkLst>
+          <pc:docMk/>
+          <pc:sldMk cId="3918560306" sldId="263"/>
+        </pc:sldMkLst>
+        <pc:spChg chg="mod">
+          <ac:chgData name="Kadelka, Claus [MATH]" userId="3587954921_tp_box_2" providerId="OAuth2" clId="{3A5D34D3-13CC-588F-87D8-4157F9E149E9}" dt="2026-02-13T15:53:13.497" v="513" actId="20577"/>
+          <ac:spMkLst>
+            <pc:docMk/>
+            <pc:sldMk cId="3918560306" sldId="263"/>
+            <ac:spMk id="4" creationId="{BDC52EDB-2031-7665-3923-E5B5993B1B7A}"/>
+          </ac:spMkLst>
+        </pc:spChg>
+        <pc:spChg chg="mod">
+          <ac:chgData name="Kadelka, Claus [MATH]" userId="3587954921_tp_box_2" providerId="OAuth2" clId="{3A5D34D3-13CC-588F-87D8-4157F9E149E9}" dt="2026-02-13T15:52:19.945" v="477" actId="14100"/>
+          <ac:spMkLst>
+            <pc:docMk/>
+            <pc:sldMk cId="3918560306" sldId="263"/>
+            <ac:spMk id="5" creationId="{7B0391BC-A567-4AA6-B146-24F684DC7C4B}"/>
+          </ac:spMkLst>
+        </pc:spChg>
+        <pc:spChg chg="mod">
+          <ac:chgData name="Kadelka, Claus [MATH]" userId="3587954921_tp_box_2" providerId="OAuth2" clId="{3A5D34D3-13CC-588F-87D8-4157F9E149E9}" dt="2026-02-13T15:54:15.372" v="544" actId="20577"/>
+          <ac:spMkLst>
+            <pc:docMk/>
+            <pc:sldMk cId="3918560306" sldId="263"/>
+            <ac:spMk id="6" creationId="{785A3C15-DA6E-0030-3CA8-281CD248ECEE}"/>
+          </ac:spMkLst>
+        </pc:spChg>
+        <pc:spChg chg="mod">
+          <ac:chgData name="Kadelka, Claus [MATH]" userId="3587954921_tp_box_2" providerId="OAuth2" clId="{3A5D34D3-13CC-588F-87D8-4157F9E149E9}" dt="2026-02-13T15:57:59.965" v="545" actId="15"/>
+          <ac:spMkLst>
+            <pc:docMk/>
+            <pc:sldMk cId="3918560306" sldId="263"/>
+            <ac:spMk id="7" creationId="{5DCA17D7-E1C9-6887-5A39-5E13A8559D88}"/>
+          </ac:spMkLst>
+        </pc:spChg>
+        <pc:spChg chg="mod">
+          <ac:chgData name="Kadelka, Claus [MATH]" userId="3587954921_tp_box_2" providerId="OAuth2" clId="{3A5D34D3-13CC-588F-87D8-4157F9E149E9}" dt="2026-02-13T15:53:38.794" v="516" actId="1076"/>
+          <ac:spMkLst>
+            <pc:docMk/>
+            <pc:sldMk cId="3918560306" sldId="263"/>
+            <ac:spMk id="8" creationId="{92DE0923-6F4C-9C47-EB15-6B708E8D13B7}"/>
+          </ac:spMkLst>
+        </pc:spChg>
+        <pc:cxnChg chg="mod">
+          <ac:chgData name="Kadelka, Claus [MATH]" userId="3587954921_tp_box_2" providerId="OAuth2" clId="{3A5D34D3-13CC-588F-87D8-4157F9E149E9}" dt="2026-02-13T15:52:19.945" v="477" actId="14100"/>
+          <ac:cxnSpMkLst>
+            <pc:docMk/>
+            <pc:sldMk cId="3918560306" sldId="263"/>
+            <ac:cxnSpMk id="11" creationId="{AF089599-FBE1-9120-0B48-5B67E543806C}"/>
+          </ac:cxnSpMkLst>
+        </pc:cxnChg>
+        <pc:cxnChg chg="mod">
+          <ac:chgData name="Kadelka, Claus [MATH]" userId="3587954921_tp_box_2" providerId="OAuth2" clId="{3A5D34D3-13CC-588F-87D8-4157F9E149E9}" dt="2026-02-13T15:57:59.965" v="545" actId="15"/>
+          <ac:cxnSpMkLst>
+            <pc:docMk/>
+            <pc:sldMk cId="3918560306" sldId="263"/>
+            <ac:cxnSpMk id="22" creationId="{C92BEAD4-AB3F-F6AD-6CDA-BED74B79A387}"/>
+          </ac:cxnSpMkLst>
+        </pc:cxnChg>
+        <pc:cxnChg chg="mod">
+          <ac:chgData name="Kadelka, Claus [MATH]" userId="3587954921_tp_box_2" providerId="OAuth2" clId="{3A5D34D3-13CC-588F-87D8-4157F9E149E9}" dt="2026-02-13T15:54:06.473" v="539" actId="20577"/>
+          <ac:cxnSpMkLst>
+            <pc:docMk/>
+            <pc:sldMk cId="3918560306" sldId="263"/>
+            <ac:cxnSpMk id="25" creationId="{5EDDB56A-C114-C385-569F-409B01C198DC}"/>
+          </ac:cxnSpMkLst>
+        </pc:cxnChg>
+        <pc:cxnChg chg="mod">
+          <ac:chgData name="Kadelka, Claus [MATH]" userId="3587954921_tp_box_2" providerId="OAuth2" clId="{3A5D34D3-13CC-588F-87D8-4157F9E149E9}" dt="2026-02-13T15:52:14.586" v="476" actId="14100"/>
+          <ac:cxnSpMkLst>
+            <pc:docMk/>
+            <pc:sldMk cId="3918560306" sldId="263"/>
+            <ac:cxnSpMk id="27" creationId="{BBF53E0A-B02D-112A-A7D2-4396469776D2}"/>
+          </ac:cxnSpMkLst>
+        </pc:cxnChg>
+        <pc:cxnChg chg="mod">
+          <ac:chgData name="Kadelka, Claus [MATH]" userId="3587954921_tp_box_2" providerId="OAuth2" clId="{3A5D34D3-13CC-588F-87D8-4157F9E149E9}" dt="2026-02-13T15:52:19.945" v="477" actId="14100"/>
+          <ac:cxnSpMkLst>
+            <pc:docMk/>
+            <pc:sldMk cId="3918560306" sldId="263"/>
+            <ac:cxnSpMk id="30" creationId="{5B489A06-47F0-6FF0-18B3-04BCBBF9F369}"/>
+          </ac:cxnSpMkLst>
+        </pc:cxnChg>
+      </pc:sldChg>
+      <pc:sldChg chg="addSp modSp add mod">
+        <pc:chgData name="Kadelka, Claus [MATH]" userId="3587954921_tp_box_2" providerId="OAuth2" clId="{3A5D34D3-13CC-588F-87D8-4157F9E149E9}" dt="2026-02-13T16:12:11.065" v="655" actId="1076"/>
+        <pc:sldMkLst>
+          <pc:docMk/>
+          <pc:sldMk cId="1824653240" sldId="264"/>
+        </pc:sldMkLst>
+        <pc:spChg chg="add mod">
+          <ac:chgData name="Kadelka, Claus [MATH]" userId="3587954921_tp_box_2" providerId="OAuth2" clId="{3A5D34D3-13CC-588F-87D8-4157F9E149E9}" dt="2026-02-13T16:12:03.886" v="653" actId="1076"/>
+          <ac:spMkLst>
+            <pc:docMk/>
+            <pc:sldMk cId="1824653240" sldId="264"/>
+            <ac:spMk id="2" creationId="{BBEF3BA4-62FE-10A2-F798-432A682F68A0}"/>
+          </ac:spMkLst>
+        </pc:spChg>
+        <pc:spChg chg="add">
+          <ac:chgData name="Kadelka, Claus [MATH]" userId="3587954921_tp_box_2" providerId="OAuth2" clId="{3A5D34D3-13CC-588F-87D8-4157F9E149E9}" dt="2026-02-13T16:07:09.399" v="563"/>
+          <ac:spMkLst>
+            <pc:docMk/>
+            <pc:sldMk cId="1824653240" sldId="264"/>
+            <ac:spMk id="13" creationId="{3D4BC458-63EF-D67C-42E7-40C425761186}"/>
+          </ac:spMkLst>
+        </pc:spChg>
+        <pc:spChg chg="add">
+          <ac:chgData name="Kadelka, Claus [MATH]" userId="3587954921_tp_box_2" providerId="OAuth2" clId="{3A5D34D3-13CC-588F-87D8-4157F9E149E9}" dt="2026-02-13T16:07:20.923" v="564"/>
+          <ac:spMkLst>
+            <pc:docMk/>
+            <pc:sldMk cId="1824653240" sldId="264"/>
+            <ac:spMk id="16" creationId="{2ACAC20C-179C-670B-8206-4900DE92CFBA}"/>
+          </ac:spMkLst>
+        </pc:spChg>
+        <pc:spChg chg="add mod">
+          <ac:chgData name="Kadelka, Claus [MATH]" userId="3587954921_tp_box_2" providerId="OAuth2" clId="{3A5D34D3-13CC-588F-87D8-4157F9E149E9}" dt="2026-02-13T16:12:03.886" v="653" actId="1076"/>
+          <ac:spMkLst>
+            <pc:docMk/>
+            <pc:sldMk cId="1824653240" sldId="264"/>
+            <ac:spMk id="17" creationId="{A6DFA139-0033-1D87-5965-1612A7046E0A}"/>
+          </ac:spMkLst>
+        </pc:spChg>
+        <pc:spChg chg="add mod">
+          <ac:chgData name="Kadelka, Claus [MATH]" userId="3587954921_tp_box_2" providerId="OAuth2" clId="{3A5D34D3-13CC-588F-87D8-4157F9E149E9}" dt="2026-02-13T16:12:03.886" v="653" actId="1076"/>
+          <ac:spMkLst>
+            <pc:docMk/>
+            <pc:sldMk cId="1824653240" sldId="264"/>
+            <ac:spMk id="18" creationId="{AAE02E2B-C70B-A642-1E2A-F43C49D2DC31}"/>
+          </ac:spMkLst>
+        </pc:spChg>
+        <pc:spChg chg="add mod">
+          <ac:chgData name="Kadelka, Claus [MATH]" userId="3587954921_tp_box_2" providerId="OAuth2" clId="{3A5D34D3-13CC-588F-87D8-4157F9E149E9}" dt="2026-02-13T16:12:11.065" v="655" actId="1076"/>
+          <ac:spMkLst>
+            <pc:docMk/>
+            <pc:sldMk cId="1824653240" sldId="264"/>
+            <ac:spMk id="19" creationId="{B127E6E4-2E41-6DC0-D66A-4CF32E7E8EBA}"/>
+          </ac:spMkLst>
+        </pc:spChg>
       </pc:sldChg>
     </pc:docChg>
   </pc:docChgLst>
@@ -9222,6 +9366,2444 @@
     <p:extLst>
       <p:ext uri="{BB962C8B-B14F-4D97-AF65-F5344CB8AC3E}">
         <p14:creationId xmlns:p14="http://schemas.microsoft.com/office/powerpoint/2010/main" val="3842302640"/>
+      </p:ext>
+    </p:extLst>
+  </p:cSld>
+  <p:clrMapOvr>
+    <a:masterClrMapping/>
+  </p:clrMapOvr>
+</p:sld>
+</file>
+
+<file path=ppt/slides/slide8.xml><?xml version="1.0" encoding="utf-8"?>
+<p:sld xmlns:a="http://schemas.openxmlformats.org/drawingml/2006/main" xmlns:r="http://schemas.openxmlformats.org/officeDocument/2006/relationships" xmlns:p="http://schemas.openxmlformats.org/presentationml/2006/main">
+  <p:cSld>
+    <p:spTree>
+      <p:nvGrpSpPr>
+        <p:cNvPr id="1" name="">
+          <a:extLst>
+            <a:ext uri="{FF2B5EF4-FFF2-40B4-BE49-F238E27FC236}">
+              <a16:creationId xmlns:a16="http://schemas.microsoft.com/office/drawing/2014/main" id="{5257EC9E-7322-44B4-DF74-47B0AD2CD101}"/>
+            </a:ext>
+          </a:extLst>
+        </p:cNvPr>
+        <p:cNvGrpSpPr/>
+        <p:nvPr/>
+      </p:nvGrpSpPr>
+      <p:grpSpPr>
+        <a:xfrm>
+          <a:off x="0" y="0"/>
+          <a:ext cx="0" cy="0"/>
+          <a:chOff x="0" y="0"/>
+          <a:chExt cx="0" cy="0"/>
+        </a:xfrm>
+      </p:grpSpPr>
+      <p:sp>
+        <p:nvSpPr>
+          <p:cNvPr id="64" name="Rounded Rectangle 63">
+            <a:extLst>
+              <a:ext uri="{FF2B5EF4-FFF2-40B4-BE49-F238E27FC236}">
+                <a16:creationId xmlns:a16="http://schemas.microsoft.com/office/drawing/2014/main" id="{07E38AE7-025E-3F1C-42EE-7EF17DAEBD02}"/>
+              </a:ext>
+            </a:extLst>
+          </p:cNvPr>
+          <p:cNvSpPr/>
+          <p:nvPr/>
+        </p:nvSpPr>
+        <p:spPr>
+          <a:xfrm>
+            <a:off x="3716309" y="1061643"/>
+            <a:ext cx="2755941" cy="3705304"/>
+          </a:xfrm>
+          <a:prstGeom prst="roundRect">
+            <a:avLst>
+              <a:gd name="adj" fmla="val 20354"/>
+            </a:avLst>
+          </a:prstGeom>
+          <a:solidFill>
+            <a:schemeClr val="tx2">
+              <a:lumMod val="10000"/>
+              <a:lumOff val="90000"/>
+              <a:alpha val="34000"/>
+            </a:schemeClr>
+          </a:solidFill>
+          <a:ln>
+            <a:noFill/>
+          </a:ln>
+        </p:spPr>
+        <p:style>
+          <a:lnRef idx="2">
+            <a:schemeClr val="accent1">
+              <a:shade val="15000"/>
+            </a:schemeClr>
+          </a:lnRef>
+          <a:fillRef idx="1">
+            <a:schemeClr val="accent1"/>
+          </a:fillRef>
+          <a:effectRef idx="0">
+            <a:schemeClr val="accent1"/>
+          </a:effectRef>
+          <a:fontRef idx="minor">
+            <a:schemeClr val="lt1"/>
+          </a:fontRef>
+        </p:style>
+        <p:txBody>
+          <a:bodyPr rtlCol="0" anchor="ctr"/>
+          <a:lstStyle/>
+          <a:p>
+            <a:pPr algn="ctr"/>
+            <a:endParaRPr lang="en-US"/>
+          </a:p>
+        </p:txBody>
+      </p:sp>
+      <p:sp>
+        <p:nvSpPr>
+          <p:cNvPr id="10" name="Rounded Rectangle 9">
+            <a:extLst>
+              <a:ext uri="{FF2B5EF4-FFF2-40B4-BE49-F238E27FC236}">
+                <a16:creationId xmlns:a16="http://schemas.microsoft.com/office/drawing/2014/main" id="{469E375E-7E20-2571-23BD-EBFDC5B52EDD}"/>
+              </a:ext>
+            </a:extLst>
+          </p:cNvPr>
+          <p:cNvSpPr/>
+          <p:nvPr/>
+        </p:nvSpPr>
+        <p:spPr>
+          <a:xfrm>
+            <a:off x="525739" y="1090217"/>
+            <a:ext cx="2755941" cy="3705304"/>
+          </a:xfrm>
+          <a:prstGeom prst="roundRect">
+            <a:avLst>
+              <a:gd name="adj" fmla="val 20354"/>
+            </a:avLst>
+          </a:prstGeom>
+          <a:solidFill>
+            <a:schemeClr val="tx2">
+              <a:lumMod val="10000"/>
+              <a:lumOff val="90000"/>
+              <a:alpha val="34000"/>
+            </a:schemeClr>
+          </a:solidFill>
+          <a:ln>
+            <a:noFill/>
+          </a:ln>
+        </p:spPr>
+        <p:style>
+          <a:lnRef idx="2">
+            <a:schemeClr val="accent1">
+              <a:shade val="15000"/>
+            </a:schemeClr>
+          </a:lnRef>
+          <a:fillRef idx="1">
+            <a:schemeClr val="accent1"/>
+          </a:fillRef>
+          <a:effectRef idx="0">
+            <a:schemeClr val="accent1"/>
+          </a:effectRef>
+          <a:fontRef idx="minor">
+            <a:schemeClr val="lt1"/>
+          </a:fontRef>
+        </p:style>
+        <p:txBody>
+          <a:bodyPr rtlCol="0" anchor="ctr"/>
+          <a:lstStyle/>
+          <a:p>
+            <a:pPr algn="ctr"/>
+            <a:endParaRPr lang="en-US"/>
+          </a:p>
+        </p:txBody>
+      </p:sp>
+      <p:sp>
+        <p:nvSpPr>
+          <p:cNvPr id="4" name="TextBox 3">
+            <a:extLst>
+              <a:ext uri="{FF2B5EF4-FFF2-40B4-BE49-F238E27FC236}">
+                <a16:creationId xmlns:a16="http://schemas.microsoft.com/office/drawing/2014/main" id="{BDC52EDB-2031-7665-3923-E5B5993B1B7A}"/>
+              </a:ext>
+            </a:extLst>
+          </p:cNvPr>
+          <p:cNvSpPr txBox="1"/>
+          <p:nvPr/>
+        </p:nvSpPr>
+        <p:spPr>
+          <a:xfrm>
+            <a:off x="640505" y="1428274"/>
+            <a:ext cx="2356083" cy="544830"/>
+          </a:xfrm>
+          <a:prstGeom prst="roundRect">
+            <a:avLst/>
+          </a:prstGeom>
+        </p:spPr>
+        <p:style>
+          <a:lnRef idx="2">
+            <a:schemeClr val="accent1"/>
+          </a:lnRef>
+          <a:fillRef idx="1">
+            <a:schemeClr val="lt1"/>
+          </a:fillRef>
+          <a:effectRef idx="0">
+            <a:schemeClr val="accent1"/>
+          </a:effectRef>
+          <a:fontRef idx="minor">
+            <a:schemeClr val="dk1"/>
+          </a:fontRef>
+        </p:style>
+        <p:txBody>
+          <a:bodyPr wrap="square" rtlCol="0">
+            <a:spAutoFit/>
+          </a:bodyPr>
+          <a:lstStyle/>
+          <a:p>
+            <a:r>
+              <a:rPr lang="en-US" sz="1000" dirty="0"/>
+              <a:t>Random Boolean Function Generators</a:t>
+            </a:r>
+          </a:p>
+          <a:p>
+            <a:r>
+              <a:rPr lang="en-US" sz="800" dirty="0"/>
+              <a:t>Sample functions with prescribed structural features uniformly at random</a:t>
+            </a:r>
+          </a:p>
+        </p:txBody>
+      </p:sp>
+      <p:sp>
+        <p:nvSpPr>
+          <p:cNvPr id="5" name="TextBox 4">
+            <a:extLst>
+              <a:ext uri="{FF2B5EF4-FFF2-40B4-BE49-F238E27FC236}">
+                <a16:creationId xmlns:a16="http://schemas.microsoft.com/office/drawing/2014/main" id="{7B0391BC-A567-4AA6-B146-24F684DC7C4B}"/>
+              </a:ext>
+            </a:extLst>
+          </p:cNvPr>
+          <p:cNvSpPr txBox="1"/>
+          <p:nvPr/>
+        </p:nvSpPr>
+        <p:spPr>
+          <a:xfrm>
+            <a:off x="640505" y="3558222"/>
+            <a:ext cx="2346954" cy="544830"/>
+          </a:xfrm>
+          <a:prstGeom prst="roundRect">
+            <a:avLst/>
+          </a:prstGeom>
+        </p:spPr>
+        <p:style>
+          <a:lnRef idx="2">
+            <a:schemeClr val="accent1"/>
+          </a:lnRef>
+          <a:fillRef idx="1">
+            <a:schemeClr val="lt1"/>
+          </a:fillRef>
+          <a:effectRef idx="0">
+            <a:schemeClr val="accent1"/>
+          </a:effectRef>
+          <a:fontRef idx="minor">
+            <a:schemeClr val="dk1"/>
+          </a:fontRef>
+        </p:style>
+        <p:txBody>
+          <a:bodyPr wrap="square" rtlCol="0">
+            <a:spAutoFit/>
+          </a:bodyPr>
+          <a:lstStyle/>
+          <a:p>
+            <a:r>
+              <a:rPr lang="en-US" sz="1000" dirty="0"/>
+              <a:t>Boolean Function Analysis</a:t>
+            </a:r>
+            <a:br>
+              <a:rPr lang="en-US" sz="1000" dirty="0"/>
+            </a:br>
+            <a:r>
+              <a:rPr lang="en-US" sz="800" dirty="0"/>
+              <a:t>canalization; collective canalization; symmetry; sensitivity; degeneracy; …</a:t>
+            </a:r>
+          </a:p>
+        </p:txBody>
+      </p:sp>
+      <p:sp>
+        <p:nvSpPr>
+          <p:cNvPr id="6" name="TextBox 5">
+            <a:extLst>
+              <a:ext uri="{FF2B5EF4-FFF2-40B4-BE49-F238E27FC236}">
+                <a16:creationId xmlns:a16="http://schemas.microsoft.com/office/drawing/2014/main" id="{785A3C15-DA6E-0030-3CA8-281CD248ECEE}"/>
+              </a:ext>
+            </a:extLst>
+          </p:cNvPr>
+          <p:cNvSpPr txBox="1"/>
+          <p:nvPr/>
+        </p:nvSpPr>
+        <p:spPr>
+          <a:xfrm>
+            <a:off x="3825048" y="3574573"/>
+            <a:ext cx="2538463" cy="544830"/>
+          </a:xfrm>
+          <a:prstGeom prst="roundRect">
+            <a:avLst/>
+          </a:prstGeom>
+        </p:spPr>
+        <p:style>
+          <a:lnRef idx="2">
+            <a:schemeClr val="accent1"/>
+          </a:lnRef>
+          <a:fillRef idx="1">
+            <a:schemeClr val="lt1"/>
+          </a:fillRef>
+          <a:effectRef idx="0">
+            <a:schemeClr val="accent1"/>
+          </a:effectRef>
+          <a:fontRef idx="minor">
+            <a:schemeClr val="dk1"/>
+          </a:fontRef>
+        </p:style>
+        <p:txBody>
+          <a:bodyPr wrap="square" rtlCol="0">
+            <a:spAutoFit/>
+          </a:bodyPr>
+          <a:lstStyle/>
+          <a:p>
+            <a:r>
+              <a:rPr lang="en-US" sz="1000" dirty="0"/>
+              <a:t>Boolean Network Analysis</a:t>
+            </a:r>
+          </a:p>
+          <a:p>
+            <a:r>
+              <a:rPr lang="en-US" sz="800" dirty="0"/>
+              <a:t>attractors under synchronous &amp; asynchronous update; network motifs; stability &amp; robustness; …</a:t>
+            </a:r>
+          </a:p>
+        </p:txBody>
+      </p:sp>
+      <p:sp>
+        <p:nvSpPr>
+          <p:cNvPr id="7" name="TextBox 6">
+            <a:extLst>
+              <a:ext uri="{FF2B5EF4-FFF2-40B4-BE49-F238E27FC236}">
+                <a16:creationId xmlns:a16="http://schemas.microsoft.com/office/drawing/2014/main" id="{5DCA17D7-E1C9-6887-5A39-5E13A8559D88}"/>
+              </a:ext>
+            </a:extLst>
+          </p:cNvPr>
+          <p:cNvSpPr txBox="1"/>
+          <p:nvPr/>
+        </p:nvSpPr>
+        <p:spPr>
+          <a:xfrm>
+            <a:off x="3825049" y="1428274"/>
+            <a:ext cx="2538456" cy="851297"/>
+          </a:xfrm>
+          <a:prstGeom prst="roundRect">
+            <a:avLst/>
+          </a:prstGeom>
+        </p:spPr>
+        <p:style>
+          <a:lnRef idx="2">
+            <a:schemeClr val="accent1"/>
+          </a:lnRef>
+          <a:fillRef idx="1">
+            <a:schemeClr val="lt1"/>
+          </a:fillRef>
+          <a:effectRef idx="0">
+            <a:schemeClr val="accent1"/>
+          </a:effectRef>
+          <a:fontRef idx="minor">
+            <a:schemeClr val="dk1"/>
+          </a:fontRef>
+        </p:style>
+        <p:txBody>
+          <a:bodyPr wrap="square" rtlCol="0">
+            <a:spAutoFit/>
+          </a:bodyPr>
+          <a:lstStyle/>
+          <a:p>
+            <a:pPr lvl="1"/>
+            <a:r>
+              <a:rPr lang="en-US" sz="1000" dirty="0"/>
+              <a:t>Random Boolean Network Generators</a:t>
+            </a:r>
+          </a:p>
+          <a:p>
+            <a:pPr lvl="1"/>
+            <a:r>
+              <a:rPr lang="en-US" sz="800" dirty="0"/>
+              <a:t>Generate random Boolean networks of defined size, degree distribution, canalizing properties, bias, …</a:t>
+            </a:r>
+          </a:p>
+        </p:txBody>
+      </p:sp>
+      <p:sp>
+        <p:nvSpPr>
+          <p:cNvPr id="8" name="TextBox 7">
+            <a:extLst>
+              <a:ext uri="{FF2B5EF4-FFF2-40B4-BE49-F238E27FC236}">
+                <a16:creationId xmlns:a16="http://schemas.microsoft.com/office/drawing/2014/main" id="{92DE0923-6F4C-9C47-EB15-6B708E8D13B7}"/>
+              </a:ext>
+            </a:extLst>
+          </p:cNvPr>
+          <p:cNvSpPr txBox="1"/>
+          <p:nvPr/>
+        </p:nvSpPr>
+        <p:spPr>
+          <a:xfrm>
+            <a:off x="2169720" y="2190509"/>
+            <a:ext cx="2538465" cy="408623"/>
+          </a:xfrm>
+          <a:prstGeom prst="roundRect">
+            <a:avLst/>
+          </a:prstGeom>
+        </p:spPr>
+        <p:style>
+          <a:lnRef idx="2">
+            <a:schemeClr val="accent1"/>
+          </a:lnRef>
+          <a:fillRef idx="1">
+            <a:schemeClr val="lt1"/>
+          </a:fillRef>
+          <a:effectRef idx="0">
+            <a:schemeClr val="accent1"/>
+          </a:effectRef>
+          <a:fontRef idx="minor">
+            <a:schemeClr val="dk1"/>
+          </a:fontRef>
+        </p:style>
+        <p:txBody>
+          <a:bodyPr wrap="square" rtlCol="0">
+            <a:spAutoFit/>
+          </a:bodyPr>
+          <a:lstStyle/>
+          <a:p>
+            <a:r>
+              <a:rPr lang="en-US" sz="1000" dirty="0"/>
+              <a:t>Ensemble Experiments</a:t>
+            </a:r>
+          </a:p>
+          <a:p>
+            <a:r>
+              <a:rPr lang="en-US" sz="800" dirty="0"/>
+              <a:t>Systematic analysis of </a:t>
+            </a:r>
+          </a:p>
+        </p:txBody>
+      </p:sp>
+      <p:cxnSp>
+        <p:nvCxnSpPr>
+          <p:cNvPr id="11" name="Straight Arrow Connector 10">
+            <a:extLst>
+              <a:ext uri="{FF2B5EF4-FFF2-40B4-BE49-F238E27FC236}">
+                <a16:creationId xmlns:a16="http://schemas.microsoft.com/office/drawing/2014/main" id="{AF089599-FBE1-9120-0B48-5B67E543806C}"/>
+              </a:ext>
+            </a:extLst>
+          </p:cNvPr>
+          <p:cNvCxnSpPr>
+            <a:cxnSpLocks/>
+            <a:stCxn id="4" idx="2"/>
+            <a:endCxn id="5" idx="0"/>
+          </p:cNvCxnSpPr>
+          <p:nvPr/>
+        </p:nvCxnSpPr>
+        <p:spPr>
+          <a:xfrm flipH="1">
+            <a:off x="1813982" y="1973104"/>
+            <a:ext cx="4565" cy="1585118"/>
+          </a:xfrm>
+          <a:prstGeom prst="straightConnector1">
+            <a:avLst/>
+          </a:prstGeom>
+          <a:ln>
+            <a:tailEnd type="triangle" w="lg" len="lg"/>
+          </a:ln>
+        </p:spPr>
+        <p:style>
+          <a:lnRef idx="2">
+            <a:schemeClr val="accent1"/>
+          </a:lnRef>
+          <a:fillRef idx="0">
+            <a:schemeClr val="accent1"/>
+          </a:fillRef>
+          <a:effectRef idx="1">
+            <a:schemeClr val="accent1"/>
+          </a:effectRef>
+          <a:fontRef idx="minor">
+            <a:schemeClr val="tx1"/>
+          </a:fontRef>
+        </p:style>
+      </p:cxnSp>
+      <p:cxnSp>
+        <p:nvCxnSpPr>
+          <p:cNvPr id="12" name="Straight Arrow Connector 11">
+            <a:extLst>
+              <a:ext uri="{FF2B5EF4-FFF2-40B4-BE49-F238E27FC236}">
+                <a16:creationId xmlns:a16="http://schemas.microsoft.com/office/drawing/2014/main" id="{FEF573A6-8AF2-4D88-EA9C-3FD69E919F1D}"/>
+              </a:ext>
+            </a:extLst>
+          </p:cNvPr>
+          <p:cNvCxnSpPr>
+            <a:cxnSpLocks/>
+          </p:cNvCxnSpPr>
+          <p:nvPr/>
+        </p:nvCxnSpPr>
+        <p:spPr>
+          <a:xfrm>
+            <a:off x="5018225" y="2246476"/>
+            <a:ext cx="0" cy="1310787"/>
+          </a:xfrm>
+          <a:prstGeom prst="straightConnector1">
+            <a:avLst/>
+          </a:prstGeom>
+          <a:ln>
+            <a:tailEnd type="triangle" w="lg" len="lg"/>
+          </a:ln>
+        </p:spPr>
+        <p:style>
+          <a:lnRef idx="2">
+            <a:schemeClr val="accent1"/>
+          </a:lnRef>
+          <a:fillRef idx="0">
+            <a:schemeClr val="accent1"/>
+          </a:fillRef>
+          <a:effectRef idx="1">
+            <a:schemeClr val="accent1"/>
+          </a:effectRef>
+          <a:fontRef idx="minor">
+            <a:schemeClr val="tx1"/>
+          </a:fontRef>
+        </p:style>
+      </p:cxnSp>
+      <p:cxnSp>
+        <p:nvCxnSpPr>
+          <p:cNvPr id="22" name="Straight Arrow Connector 21">
+            <a:extLst>
+              <a:ext uri="{FF2B5EF4-FFF2-40B4-BE49-F238E27FC236}">
+                <a16:creationId xmlns:a16="http://schemas.microsoft.com/office/drawing/2014/main" id="{C92BEAD4-AB3F-F6AD-6CDA-BED74B79A387}"/>
+              </a:ext>
+            </a:extLst>
+          </p:cNvPr>
+          <p:cNvCxnSpPr>
+            <a:cxnSpLocks/>
+            <a:stCxn id="4" idx="3"/>
+            <a:endCxn id="7" idx="1"/>
+          </p:cNvCxnSpPr>
+          <p:nvPr/>
+        </p:nvCxnSpPr>
+        <p:spPr>
+          <a:xfrm>
+            <a:off x="2996588" y="1700689"/>
+            <a:ext cx="828461" cy="153234"/>
+          </a:xfrm>
+          <a:prstGeom prst="straightConnector1">
+            <a:avLst/>
+          </a:prstGeom>
+          <a:ln>
+            <a:tailEnd type="triangle" w="lg" len="lg"/>
+          </a:ln>
+        </p:spPr>
+        <p:style>
+          <a:lnRef idx="2">
+            <a:schemeClr val="accent1"/>
+          </a:lnRef>
+          <a:fillRef idx="0">
+            <a:schemeClr val="accent1"/>
+          </a:fillRef>
+          <a:effectRef idx="1">
+            <a:schemeClr val="accent1"/>
+          </a:effectRef>
+          <a:fontRef idx="minor">
+            <a:schemeClr val="tx1"/>
+          </a:fontRef>
+        </p:style>
+      </p:cxnSp>
+      <p:cxnSp>
+        <p:nvCxnSpPr>
+          <p:cNvPr id="25" name="Straight Arrow Connector 24">
+            <a:extLst>
+              <a:ext uri="{FF2B5EF4-FFF2-40B4-BE49-F238E27FC236}">
+                <a16:creationId xmlns:a16="http://schemas.microsoft.com/office/drawing/2014/main" id="{5EDDB56A-C114-C385-569F-409B01C198DC}"/>
+              </a:ext>
+            </a:extLst>
+          </p:cNvPr>
+          <p:cNvCxnSpPr>
+            <a:cxnSpLocks/>
+            <a:stCxn id="5" idx="3"/>
+            <a:endCxn id="6" idx="1"/>
+          </p:cNvCxnSpPr>
+          <p:nvPr/>
+        </p:nvCxnSpPr>
+        <p:spPr>
+          <a:xfrm>
+            <a:off x="2987459" y="3830637"/>
+            <a:ext cx="837589" cy="16351"/>
+          </a:xfrm>
+          <a:prstGeom prst="straightConnector1">
+            <a:avLst/>
+          </a:prstGeom>
+          <a:ln>
+            <a:tailEnd type="triangle" w="lg" len="lg"/>
+          </a:ln>
+        </p:spPr>
+        <p:style>
+          <a:lnRef idx="2">
+            <a:schemeClr val="accent1"/>
+          </a:lnRef>
+          <a:fillRef idx="0">
+            <a:schemeClr val="accent1"/>
+          </a:fillRef>
+          <a:effectRef idx="1">
+            <a:schemeClr val="accent1"/>
+          </a:effectRef>
+          <a:fontRef idx="minor">
+            <a:schemeClr val="tx1"/>
+          </a:fontRef>
+        </p:style>
+      </p:cxnSp>
+      <p:cxnSp>
+        <p:nvCxnSpPr>
+          <p:cNvPr id="27" name="Straight Arrow Connector 26">
+            <a:extLst>
+              <a:ext uri="{FF2B5EF4-FFF2-40B4-BE49-F238E27FC236}">
+                <a16:creationId xmlns:a16="http://schemas.microsoft.com/office/drawing/2014/main" id="{BBF53E0A-B02D-112A-A7D2-4396469776D2}"/>
+              </a:ext>
+            </a:extLst>
+          </p:cNvPr>
+          <p:cNvCxnSpPr>
+            <a:cxnSpLocks/>
+            <a:stCxn id="4" idx="2"/>
+          </p:cNvCxnSpPr>
+          <p:nvPr/>
+        </p:nvCxnSpPr>
+        <p:spPr>
+          <a:xfrm>
+            <a:off x="1818547" y="1973104"/>
+            <a:ext cx="399520" cy="605968"/>
+          </a:xfrm>
+          <a:prstGeom prst="straightConnector1">
+            <a:avLst/>
+          </a:prstGeom>
+          <a:ln>
+            <a:tailEnd type="triangle" w="lg" len="lg"/>
+          </a:ln>
+        </p:spPr>
+        <p:style>
+          <a:lnRef idx="2">
+            <a:schemeClr val="accent1"/>
+          </a:lnRef>
+          <a:fillRef idx="0">
+            <a:schemeClr val="accent1"/>
+          </a:fillRef>
+          <a:effectRef idx="1">
+            <a:schemeClr val="accent1"/>
+          </a:effectRef>
+          <a:fontRef idx="minor">
+            <a:schemeClr val="tx1"/>
+          </a:fontRef>
+        </p:style>
+      </p:cxnSp>
+      <p:cxnSp>
+        <p:nvCxnSpPr>
+          <p:cNvPr id="30" name="Straight Arrow Connector 29">
+            <a:extLst>
+              <a:ext uri="{FF2B5EF4-FFF2-40B4-BE49-F238E27FC236}">
+                <a16:creationId xmlns:a16="http://schemas.microsoft.com/office/drawing/2014/main" id="{5B489A06-47F0-6FF0-18B3-04BCBBF9F369}"/>
+              </a:ext>
+            </a:extLst>
+          </p:cNvPr>
+          <p:cNvCxnSpPr>
+            <a:cxnSpLocks/>
+            <a:stCxn id="5" idx="0"/>
+          </p:cNvCxnSpPr>
+          <p:nvPr/>
+        </p:nvCxnSpPr>
+        <p:spPr>
+          <a:xfrm flipV="1">
+            <a:off x="1813982" y="3265436"/>
+            <a:ext cx="404085" cy="292786"/>
+          </a:xfrm>
+          <a:prstGeom prst="straightConnector1">
+            <a:avLst/>
+          </a:prstGeom>
+          <a:ln>
+            <a:tailEnd type="triangle" w="lg" len="lg"/>
+          </a:ln>
+        </p:spPr>
+        <p:style>
+          <a:lnRef idx="2">
+            <a:schemeClr val="accent1"/>
+          </a:lnRef>
+          <a:fillRef idx="0">
+            <a:schemeClr val="accent1"/>
+          </a:fillRef>
+          <a:effectRef idx="1">
+            <a:schemeClr val="accent1"/>
+          </a:effectRef>
+          <a:fontRef idx="minor">
+            <a:schemeClr val="tx1"/>
+          </a:fontRef>
+        </p:style>
+      </p:cxnSp>
+      <p:cxnSp>
+        <p:nvCxnSpPr>
+          <p:cNvPr id="34" name="Straight Arrow Connector 33">
+            <a:extLst>
+              <a:ext uri="{FF2B5EF4-FFF2-40B4-BE49-F238E27FC236}">
+                <a16:creationId xmlns:a16="http://schemas.microsoft.com/office/drawing/2014/main" id="{242C2428-94BC-9399-1EF7-32F96997761E}"/>
+              </a:ext>
+            </a:extLst>
+          </p:cNvPr>
+          <p:cNvCxnSpPr>
+            <a:cxnSpLocks/>
+          </p:cNvCxnSpPr>
+          <p:nvPr/>
+        </p:nvCxnSpPr>
+        <p:spPr>
+          <a:xfrm flipH="1" flipV="1">
+            <a:off x="4725699" y="3241020"/>
+            <a:ext cx="299965" cy="338721"/>
+          </a:xfrm>
+          <a:prstGeom prst="straightConnector1">
+            <a:avLst/>
+          </a:prstGeom>
+          <a:ln>
+            <a:tailEnd type="triangle" w="lg" len="lg"/>
+          </a:ln>
+        </p:spPr>
+        <p:style>
+          <a:lnRef idx="2">
+            <a:schemeClr val="accent1"/>
+          </a:lnRef>
+          <a:fillRef idx="0">
+            <a:schemeClr val="accent1"/>
+          </a:fillRef>
+          <a:effectRef idx="1">
+            <a:schemeClr val="accent1"/>
+          </a:effectRef>
+          <a:fontRef idx="minor">
+            <a:schemeClr val="tx1"/>
+          </a:fontRef>
+        </p:style>
+      </p:cxnSp>
+      <p:cxnSp>
+        <p:nvCxnSpPr>
+          <p:cNvPr id="38" name="Straight Arrow Connector 37">
+            <a:extLst>
+              <a:ext uri="{FF2B5EF4-FFF2-40B4-BE49-F238E27FC236}">
+                <a16:creationId xmlns:a16="http://schemas.microsoft.com/office/drawing/2014/main" id="{CD637304-8670-97DE-A479-776A5EFE60B2}"/>
+              </a:ext>
+            </a:extLst>
+          </p:cNvPr>
+          <p:cNvCxnSpPr>
+            <a:cxnSpLocks/>
+          </p:cNvCxnSpPr>
+          <p:nvPr/>
+        </p:nvCxnSpPr>
+        <p:spPr>
+          <a:xfrm flipH="1">
+            <a:off x="4692254" y="2245519"/>
+            <a:ext cx="329366" cy="333553"/>
+          </a:xfrm>
+          <a:prstGeom prst="straightConnector1">
+            <a:avLst/>
+          </a:prstGeom>
+          <a:ln>
+            <a:tailEnd type="triangle" w="lg" len="lg"/>
+          </a:ln>
+        </p:spPr>
+        <p:style>
+          <a:lnRef idx="2">
+            <a:schemeClr val="accent1"/>
+          </a:lnRef>
+          <a:fillRef idx="0">
+            <a:schemeClr val="accent1"/>
+          </a:fillRef>
+          <a:effectRef idx="1">
+            <a:schemeClr val="accent1"/>
+          </a:effectRef>
+          <a:fontRef idx="minor">
+            <a:schemeClr val="tx1"/>
+          </a:fontRef>
+        </p:style>
+      </p:cxnSp>
+      <p:sp>
+        <p:nvSpPr>
+          <p:cNvPr id="3" name="TextBox 2">
+            <a:extLst>
+              <a:ext uri="{FF2B5EF4-FFF2-40B4-BE49-F238E27FC236}">
+                <a16:creationId xmlns:a16="http://schemas.microsoft.com/office/drawing/2014/main" id="{AF424E94-092B-07C6-9A8F-8B9F8229CD77}"/>
+              </a:ext>
+            </a:extLst>
+          </p:cNvPr>
+          <p:cNvSpPr txBox="1"/>
+          <p:nvPr/>
+        </p:nvSpPr>
+        <p:spPr>
+          <a:xfrm>
+            <a:off x="3912362" y="1153099"/>
+            <a:ext cx="1431802" cy="246221"/>
+          </a:xfrm>
+          <a:prstGeom prst="rect">
+            <a:avLst/>
+          </a:prstGeom>
+          <a:noFill/>
+        </p:spPr>
+        <p:txBody>
+          <a:bodyPr wrap="none" rtlCol="0">
+            <a:spAutoFit/>
+          </a:bodyPr>
+          <a:lstStyle/>
+          <a:p>
+            <a:r>
+              <a:rPr lang="en-US" sz="1000" dirty="0">
+                <a:solidFill>
+                  <a:schemeClr val="accent1"/>
+                </a:solidFill>
+              </a:rPr>
+              <a:t>class </a:t>
+            </a:r>
+            <a:r>
+              <a:rPr lang="en-US" sz="1000" dirty="0" err="1">
+                <a:solidFill>
+                  <a:schemeClr val="accent1"/>
+                </a:solidFill>
+              </a:rPr>
+              <a:t>BooleanNetwork</a:t>
+            </a:r>
+            <a:endParaRPr lang="en-US" sz="1000" dirty="0">
+              <a:solidFill>
+                <a:schemeClr val="accent1"/>
+              </a:solidFill>
+            </a:endParaRPr>
+          </a:p>
+        </p:txBody>
+      </p:sp>
+      <p:sp>
+        <p:nvSpPr>
+          <p:cNvPr id="9" name="TextBox 8">
+            <a:extLst>
+              <a:ext uri="{FF2B5EF4-FFF2-40B4-BE49-F238E27FC236}">
+                <a16:creationId xmlns:a16="http://schemas.microsoft.com/office/drawing/2014/main" id="{C47915A2-B4AC-650F-E214-ABF8DA25ACC4}"/>
+              </a:ext>
+            </a:extLst>
+          </p:cNvPr>
+          <p:cNvSpPr txBox="1"/>
+          <p:nvPr/>
+        </p:nvSpPr>
+        <p:spPr>
+          <a:xfrm>
+            <a:off x="715476" y="1153100"/>
+            <a:ext cx="1454244" cy="246221"/>
+          </a:xfrm>
+          <a:prstGeom prst="rect">
+            <a:avLst/>
+          </a:prstGeom>
+          <a:noFill/>
+        </p:spPr>
+        <p:txBody>
+          <a:bodyPr wrap="none" rtlCol="0">
+            <a:spAutoFit/>
+          </a:bodyPr>
+          <a:lstStyle/>
+          <a:p>
+            <a:r>
+              <a:rPr lang="en-US" sz="1000" dirty="0">
+                <a:solidFill>
+                  <a:schemeClr val="accent1"/>
+                </a:solidFill>
+              </a:rPr>
+              <a:t>class </a:t>
+            </a:r>
+            <a:r>
+              <a:rPr lang="en-US" sz="1000" dirty="0" err="1">
+                <a:solidFill>
+                  <a:schemeClr val="accent1"/>
+                </a:solidFill>
+              </a:rPr>
+              <a:t>BooleanFunction</a:t>
+            </a:r>
+            <a:endParaRPr lang="en-US" sz="1000" dirty="0">
+              <a:solidFill>
+                <a:schemeClr val="accent1"/>
+              </a:solidFill>
+            </a:endParaRPr>
+          </a:p>
+        </p:txBody>
+      </p:sp>
+      <p:sp>
+        <p:nvSpPr>
+          <p:cNvPr id="14" name="TextBox 13">
+            <a:extLst>
+              <a:ext uri="{FF2B5EF4-FFF2-40B4-BE49-F238E27FC236}">
+                <a16:creationId xmlns:a16="http://schemas.microsoft.com/office/drawing/2014/main" id="{02C3FDDD-0928-63D0-8B7B-50CB28D80384}"/>
+              </a:ext>
+            </a:extLst>
+          </p:cNvPr>
+          <p:cNvSpPr txBox="1"/>
+          <p:nvPr/>
+        </p:nvSpPr>
+        <p:spPr>
+          <a:xfrm>
+            <a:off x="5084467" y="2641880"/>
+            <a:ext cx="1279037" cy="544830"/>
+          </a:xfrm>
+          <a:prstGeom prst="roundRect">
+            <a:avLst/>
+          </a:prstGeom>
+        </p:spPr>
+        <p:style>
+          <a:lnRef idx="2">
+            <a:schemeClr val="accent1"/>
+          </a:lnRef>
+          <a:fillRef idx="1">
+            <a:schemeClr val="lt1"/>
+          </a:fillRef>
+          <a:effectRef idx="0">
+            <a:schemeClr val="accent1"/>
+          </a:effectRef>
+          <a:fontRef idx="minor">
+            <a:schemeClr val="dk1"/>
+          </a:fontRef>
+        </p:style>
+        <p:txBody>
+          <a:bodyPr wrap="square" rtlCol="0">
+            <a:spAutoFit/>
+          </a:bodyPr>
+          <a:lstStyle/>
+          <a:p>
+            <a:r>
+              <a:rPr lang="en-US" sz="1000" dirty="0"/>
+              <a:t>Interoperability</a:t>
+            </a:r>
+          </a:p>
+          <a:p>
+            <a:r>
+              <a:rPr lang="en-US" sz="800" dirty="0"/>
+              <a:t>Export/Import </a:t>
+            </a:r>
+            <a:r>
+              <a:rPr lang="en-US" sz="800" dirty="0">
+                <a:sym typeface="Wingdings" pitchFamily="2" charset="2"/>
+              </a:rPr>
+              <a:t></a:t>
+            </a:r>
+            <a:br>
+              <a:rPr lang="en-US" sz="800" dirty="0">
+                <a:sym typeface="Wingdings" pitchFamily="2" charset="2"/>
+              </a:rPr>
+            </a:br>
+            <a:r>
+              <a:rPr lang="en-US" sz="800" dirty="0">
+                <a:sym typeface="Wingdings" pitchFamily="2" charset="2"/>
+              </a:rPr>
+              <a:t>CANA, </a:t>
+            </a:r>
+            <a:r>
+              <a:rPr lang="en-US" sz="800" dirty="0" err="1">
+                <a:sym typeface="Wingdings" pitchFamily="2" charset="2"/>
+              </a:rPr>
+              <a:t>PyBoolNet</a:t>
+            </a:r>
+            <a:r>
+              <a:rPr lang="en-US" sz="800" dirty="0">
+                <a:sym typeface="Wingdings" pitchFamily="2" charset="2"/>
+              </a:rPr>
+              <a:t>, …</a:t>
+            </a:r>
+            <a:endParaRPr lang="en-US" sz="800" dirty="0"/>
+          </a:p>
+        </p:txBody>
+      </p:sp>
+      <p:cxnSp>
+        <p:nvCxnSpPr>
+          <p:cNvPr id="15" name="Straight Arrow Connector 14">
+            <a:extLst>
+              <a:ext uri="{FF2B5EF4-FFF2-40B4-BE49-F238E27FC236}">
+                <a16:creationId xmlns:a16="http://schemas.microsoft.com/office/drawing/2014/main" id="{6BE4D534-C544-7AB6-AAE7-54BE79E438F5}"/>
+              </a:ext>
+            </a:extLst>
+          </p:cNvPr>
+          <p:cNvCxnSpPr>
+            <a:cxnSpLocks/>
+            <a:endCxn id="14" idx="0"/>
+          </p:cNvCxnSpPr>
+          <p:nvPr/>
+        </p:nvCxnSpPr>
+        <p:spPr>
+          <a:xfrm>
+            <a:off x="5723986" y="2245519"/>
+            <a:ext cx="0" cy="396361"/>
+          </a:xfrm>
+          <a:prstGeom prst="straightConnector1">
+            <a:avLst/>
+          </a:prstGeom>
+          <a:ln>
+            <a:tailEnd type="triangle" w="lg" len="lg"/>
+          </a:ln>
+        </p:spPr>
+        <p:style>
+          <a:lnRef idx="2">
+            <a:schemeClr val="accent1"/>
+          </a:lnRef>
+          <a:fillRef idx="0">
+            <a:schemeClr val="accent1"/>
+          </a:fillRef>
+          <a:effectRef idx="1">
+            <a:schemeClr val="accent1"/>
+          </a:effectRef>
+          <a:fontRef idx="minor">
+            <a:schemeClr val="tx1"/>
+          </a:fontRef>
+        </p:style>
+      </p:cxnSp>
+      <p:cxnSp>
+        <p:nvCxnSpPr>
+          <p:cNvPr id="59" name="Straight Arrow Connector 58">
+            <a:extLst>
+              <a:ext uri="{FF2B5EF4-FFF2-40B4-BE49-F238E27FC236}">
+                <a16:creationId xmlns:a16="http://schemas.microsoft.com/office/drawing/2014/main" id="{2685A585-E2F8-7127-FD1F-8B0AD9F7725F}"/>
+              </a:ext>
+            </a:extLst>
+          </p:cNvPr>
+          <p:cNvCxnSpPr>
+            <a:cxnSpLocks/>
+          </p:cNvCxnSpPr>
+          <p:nvPr/>
+        </p:nvCxnSpPr>
+        <p:spPr>
+          <a:xfrm>
+            <a:off x="5743399" y="3186710"/>
+            <a:ext cx="0" cy="396361"/>
+          </a:xfrm>
+          <a:prstGeom prst="straightConnector1">
+            <a:avLst/>
+          </a:prstGeom>
+          <a:ln>
+            <a:tailEnd type="triangle" w="lg" len="lg"/>
+          </a:ln>
+        </p:spPr>
+        <p:style>
+          <a:lnRef idx="2">
+            <a:schemeClr val="accent1"/>
+          </a:lnRef>
+          <a:fillRef idx="0">
+            <a:schemeClr val="accent1"/>
+          </a:fillRef>
+          <a:effectRef idx="1">
+            <a:schemeClr val="accent1"/>
+          </a:effectRef>
+          <a:fontRef idx="minor">
+            <a:schemeClr val="tx1"/>
+          </a:fontRef>
+        </p:style>
+      </p:cxnSp>
+    </p:spTree>
+    <p:extLst>
+      <p:ext uri="{BB962C8B-B14F-4D97-AF65-F5344CB8AC3E}">
+        <p14:creationId xmlns:p14="http://schemas.microsoft.com/office/powerpoint/2010/main" val="3918560306"/>
+      </p:ext>
+    </p:extLst>
+  </p:cSld>
+  <p:clrMapOvr>
+    <a:masterClrMapping/>
+  </p:clrMapOvr>
+</p:sld>
+</file>
+
+<file path=ppt/slides/slide9.xml><?xml version="1.0" encoding="utf-8"?>
+<p:sld xmlns:a="http://schemas.openxmlformats.org/drawingml/2006/main" xmlns:r="http://schemas.openxmlformats.org/officeDocument/2006/relationships" xmlns:p="http://schemas.openxmlformats.org/presentationml/2006/main">
+  <p:cSld>
+    <p:spTree>
+      <p:nvGrpSpPr>
+        <p:cNvPr id="1" name="">
+          <a:extLst>
+            <a:ext uri="{FF2B5EF4-FFF2-40B4-BE49-F238E27FC236}">
+              <a16:creationId xmlns:a16="http://schemas.microsoft.com/office/drawing/2014/main" id="{F889A9A4-1082-FBC0-54AE-FE2376B692BA}"/>
+            </a:ext>
+          </a:extLst>
+        </p:cNvPr>
+        <p:cNvGrpSpPr/>
+        <p:nvPr/>
+      </p:nvGrpSpPr>
+      <p:grpSpPr>
+        <a:xfrm>
+          <a:off x="0" y="0"/>
+          <a:ext cx="0" cy="0"/>
+          <a:chOff x="0" y="0"/>
+          <a:chExt cx="0" cy="0"/>
+        </a:xfrm>
+      </p:grpSpPr>
+      <p:sp>
+        <p:nvSpPr>
+          <p:cNvPr id="64" name="Rounded Rectangle 63">
+            <a:extLst>
+              <a:ext uri="{FF2B5EF4-FFF2-40B4-BE49-F238E27FC236}">
+                <a16:creationId xmlns:a16="http://schemas.microsoft.com/office/drawing/2014/main" id="{DAE05BDB-37EF-1776-CE64-E37C4D5AB336}"/>
+              </a:ext>
+            </a:extLst>
+          </p:cNvPr>
+          <p:cNvSpPr/>
+          <p:nvPr/>
+        </p:nvSpPr>
+        <p:spPr>
+          <a:xfrm>
+            <a:off x="3716309" y="1061643"/>
+            <a:ext cx="2755941" cy="3705304"/>
+          </a:xfrm>
+          <a:prstGeom prst="roundRect">
+            <a:avLst>
+              <a:gd name="adj" fmla="val 20354"/>
+            </a:avLst>
+          </a:prstGeom>
+          <a:solidFill>
+            <a:schemeClr val="tx2">
+              <a:lumMod val="10000"/>
+              <a:lumOff val="90000"/>
+              <a:alpha val="34000"/>
+            </a:schemeClr>
+          </a:solidFill>
+          <a:ln>
+            <a:noFill/>
+          </a:ln>
+        </p:spPr>
+        <p:style>
+          <a:lnRef idx="2">
+            <a:schemeClr val="accent1">
+              <a:shade val="15000"/>
+            </a:schemeClr>
+          </a:lnRef>
+          <a:fillRef idx="1">
+            <a:schemeClr val="accent1"/>
+          </a:fillRef>
+          <a:effectRef idx="0">
+            <a:schemeClr val="accent1"/>
+          </a:effectRef>
+          <a:fontRef idx="minor">
+            <a:schemeClr val="lt1"/>
+          </a:fontRef>
+        </p:style>
+        <p:txBody>
+          <a:bodyPr rtlCol="0" anchor="ctr"/>
+          <a:lstStyle/>
+          <a:p>
+            <a:pPr algn="ctr"/>
+            <a:endParaRPr lang="en-US"/>
+          </a:p>
+        </p:txBody>
+      </p:sp>
+      <p:sp>
+        <p:nvSpPr>
+          <p:cNvPr id="10" name="Rounded Rectangle 9">
+            <a:extLst>
+              <a:ext uri="{FF2B5EF4-FFF2-40B4-BE49-F238E27FC236}">
+                <a16:creationId xmlns:a16="http://schemas.microsoft.com/office/drawing/2014/main" id="{3EDE5DB8-D1DE-5625-9952-54C8436DF443}"/>
+              </a:ext>
+            </a:extLst>
+          </p:cNvPr>
+          <p:cNvSpPr/>
+          <p:nvPr/>
+        </p:nvSpPr>
+        <p:spPr>
+          <a:xfrm>
+            <a:off x="525739" y="1090217"/>
+            <a:ext cx="2755941" cy="3705304"/>
+          </a:xfrm>
+          <a:prstGeom prst="roundRect">
+            <a:avLst>
+              <a:gd name="adj" fmla="val 20354"/>
+            </a:avLst>
+          </a:prstGeom>
+          <a:solidFill>
+            <a:schemeClr val="tx2">
+              <a:lumMod val="10000"/>
+              <a:lumOff val="90000"/>
+              <a:alpha val="34000"/>
+            </a:schemeClr>
+          </a:solidFill>
+          <a:ln>
+            <a:noFill/>
+          </a:ln>
+        </p:spPr>
+        <p:style>
+          <a:lnRef idx="2">
+            <a:schemeClr val="accent1">
+              <a:shade val="15000"/>
+            </a:schemeClr>
+          </a:lnRef>
+          <a:fillRef idx="1">
+            <a:schemeClr val="accent1"/>
+          </a:fillRef>
+          <a:effectRef idx="0">
+            <a:schemeClr val="accent1"/>
+          </a:effectRef>
+          <a:fontRef idx="minor">
+            <a:schemeClr val="lt1"/>
+          </a:fontRef>
+        </p:style>
+        <p:txBody>
+          <a:bodyPr rtlCol="0" anchor="ctr"/>
+          <a:lstStyle/>
+          <a:p>
+            <a:pPr algn="ctr"/>
+            <a:endParaRPr lang="en-US"/>
+          </a:p>
+        </p:txBody>
+      </p:sp>
+      <p:sp>
+        <p:nvSpPr>
+          <p:cNvPr id="4" name="TextBox 3">
+            <a:extLst>
+              <a:ext uri="{FF2B5EF4-FFF2-40B4-BE49-F238E27FC236}">
+                <a16:creationId xmlns:a16="http://schemas.microsoft.com/office/drawing/2014/main" id="{0369CE56-7B43-38DB-A4D7-2CC68BD4AF2F}"/>
+              </a:ext>
+            </a:extLst>
+          </p:cNvPr>
+          <p:cNvSpPr txBox="1"/>
+          <p:nvPr/>
+        </p:nvSpPr>
+        <p:spPr>
+          <a:xfrm>
+            <a:off x="640505" y="1428274"/>
+            <a:ext cx="2356083" cy="544830"/>
+          </a:xfrm>
+          <a:prstGeom prst="roundRect">
+            <a:avLst/>
+          </a:prstGeom>
+        </p:spPr>
+        <p:style>
+          <a:lnRef idx="2">
+            <a:schemeClr val="accent1"/>
+          </a:lnRef>
+          <a:fillRef idx="1">
+            <a:schemeClr val="lt1"/>
+          </a:fillRef>
+          <a:effectRef idx="0">
+            <a:schemeClr val="accent1"/>
+          </a:effectRef>
+          <a:fontRef idx="minor">
+            <a:schemeClr val="dk1"/>
+          </a:fontRef>
+        </p:style>
+        <p:txBody>
+          <a:bodyPr wrap="square" rtlCol="0">
+            <a:spAutoFit/>
+          </a:bodyPr>
+          <a:lstStyle/>
+          <a:p>
+            <a:r>
+              <a:rPr lang="en-US" sz="1000" dirty="0"/>
+              <a:t>Random Boolean Function Generators</a:t>
+            </a:r>
+          </a:p>
+          <a:p>
+            <a:r>
+              <a:rPr lang="en-US" sz="800" dirty="0"/>
+              <a:t>Sample functions with prescribed structural features uniformly at random</a:t>
+            </a:r>
+          </a:p>
+        </p:txBody>
+      </p:sp>
+      <p:sp>
+        <p:nvSpPr>
+          <p:cNvPr id="5" name="TextBox 4">
+            <a:extLst>
+              <a:ext uri="{FF2B5EF4-FFF2-40B4-BE49-F238E27FC236}">
+                <a16:creationId xmlns:a16="http://schemas.microsoft.com/office/drawing/2014/main" id="{EDBEDA5E-92FC-4ED3-B196-392579CE3D88}"/>
+              </a:ext>
+            </a:extLst>
+          </p:cNvPr>
+          <p:cNvSpPr txBox="1"/>
+          <p:nvPr/>
+        </p:nvSpPr>
+        <p:spPr>
+          <a:xfrm>
+            <a:off x="640505" y="3558222"/>
+            <a:ext cx="2346954" cy="544830"/>
+          </a:xfrm>
+          <a:prstGeom prst="roundRect">
+            <a:avLst/>
+          </a:prstGeom>
+        </p:spPr>
+        <p:style>
+          <a:lnRef idx="2">
+            <a:schemeClr val="accent1"/>
+          </a:lnRef>
+          <a:fillRef idx="1">
+            <a:schemeClr val="lt1"/>
+          </a:fillRef>
+          <a:effectRef idx="0">
+            <a:schemeClr val="accent1"/>
+          </a:effectRef>
+          <a:fontRef idx="minor">
+            <a:schemeClr val="dk1"/>
+          </a:fontRef>
+        </p:style>
+        <p:txBody>
+          <a:bodyPr wrap="square" rtlCol="0">
+            <a:spAutoFit/>
+          </a:bodyPr>
+          <a:lstStyle/>
+          <a:p>
+            <a:r>
+              <a:rPr lang="en-US" sz="1000" dirty="0"/>
+              <a:t>Boolean Function Analysis</a:t>
+            </a:r>
+            <a:br>
+              <a:rPr lang="en-US" sz="1000" dirty="0"/>
+            </a:br>
+            <a:r>
+              <a:rPr lang="en-US" sz="800" dirty="0"/>
+              <a:t>canalization; collective canalization; symmetry; sensitivity; degeneracy; …</a:t>
+            </a:r>
+          </a:p>
+        </p:txBody>
+      </p:sp>
+      <p:sp>
+        <p:nvSpPr>
+          <p:cNvPr id="6" name="TextBox 5">
+            <a:extLst>
+              <a:ext uri="{FF2B5EF4-FFF2-40B4-BE49-F238E27FC236}">
+                <a16:creationId xmlns:a16="http://schemas.microsoft.com/office/drawing/2014/main" id="{073F7244-04F4-800D-28DE-68B66325DF9D}"/>
+              </a:ext>
+            </a:extLst>
+          </p:cNvPr>
+          <p:cNvSpPr txBox="1"/>
+          <p:nvPr/>
+        </p:nvSpPr>
+        <p:spPr>
+          <a:xfrm>
+            <a:off x="3825048" y="3574573"/>
+            <a:ext cx="2538463" cy="544830"/>
+          </a:xfrm>
+          <a:prstGeom prst="roundRect">
+            <a:avLst/>
+          </a:prstGeom>
+        </p:spPr>
+        <p:style>
+          <a:lnRef idx="2">
+            <a:schemeClr val="accent1"/>
+          </a:lnRef>
+          <a:fillRef idx="1">
+            <a:schemeClr val="lt1"/>
+          </a:fillRef>
+          <a:effectRef idx="0">
+            <a:schemeClr val="accent1"/>
+          </a:effectRef>
+          <a:fontRef idx="minor">
+            <a:schemeClr val="dk1"/>
+          </a:fontRef>
+        </p:style>
+        <p:txBody>
+          <a:bodyPr wrap="square" rtlCol="0">
+            <a:spAutoFit/>
+          </a:bodyPr>
+          <a:lstStyle/>
+          <a:p>
+            <a:r>
+              <a:rPr lang="en-US" sz="1000" dirty="0"/>
+              <a:t>Boolean Network Analysis</a:t>
+            </a:r>
+          </a:p>
+          <a:p>
+            <a:r>
+              <a:rPr lang="en-US" sz="800" dirty="0"/>
+              <a:t>attractors under synchronous &amp; asynchronous update; network motifs; stability &amp; robustness; …</a:t>
+            </a:r>
+          </a:p>
+        </p:txBody>
+      </p:sp>
+      <p:sp>
+        <p:nvSpPr>
+          <p:cNvPr id="7" name="TextBox 6">
+            <a:extLst>
+              <a:ext uri="{FF2B5EF4-FFF2-40B4-BE49-F238E27FC236}">
+                <a16:creationId xmlns:a16="http://schemas.microsoft.com/office/drawing/2014/main" id="{24FE043E-DFBC-160A-7040-D5B8CD3BEC3C}"/>
+              </a:ext>
+            </a:extLst>
+          </p:cNvPr>
+          <p:cNvSpPr txBox="1"/>
+          <p:nvPr/>
+        </p:nvSpPr>
+        <p:spPr>
+          <a:xfrm>
+            <a:off x="3825049" y="1428274"/>
+            <a:ext cx="2538456" cy="851297"/>
+          </a:xfrm>
+          <a:prstGeom prst="roundRect">
+            <a:avLst/>
+          </a:prstGeom>
+        </p:spPr>
+        <p:style>
+          <a:lnRef idx="2">
+            <a:schemeClr val="accent1"/>
+          </a:lnRef>
+          <a:fillRef idx="1">
+            <a:schemeClr val="lt1"/>
+          </a:fillRef>
+          <a:effectRef idx="0">
+            <a:schemeClr val="accent1"/>
+          </a:effectRef>
+          <a:fontRef idx="minor">
+            <a:schemeClr val="dk1"/>
+          </a:fontRef>
+        </p:style>
+        <p:txBody>
+          <a:bodyPr wrap="square" rtlCol="0">
+            <a:spAutoFit/>
+          </a:bodyPr>
+          <a:lstStyle/>
+          <a:p>
+            <a:pPr lvl="1"/>
+            <a:r>
+              <a:rPr lang="en-US" sz="1000" dirty="0"/>
+              <a:t>Random Boolean Network Generators</a:t>
+            </a:r>
+          </a:p>
+          <a:p>
+            <a:pPr lvl="1"/>
+            <a:r>
+              <a:rPr lang="en-US" sz="800" dirty="0"/>
+              <a:t>Generate random Boolean networks of defined size, degree distribution, canalizing properties, bias, …</a:t>
+            </a:r>
+          </a:p>
+        </p:txBody>
+      </p:sp>
+      <p:sp>
+        <p:nvSpPr>
+          <p:cNvPr id="8" name="TextBox 7">
+            <a:extLst>
+              <a:ext uri="{FF2B5EF4-FFF2-40B4-BE49-F238E27FC236}">
+                <a16:creationId xmlns:a16="http://schemas.microsoft.com/office/drawing/2014/main" id="{BF352D68-4734-1AC7-EF41-5FF1ED52B734}"/>
+              </a:ext>
+            </a:extLst>
+          </p:cNvPr>
+          <p:cNvSpPr txBox="1"/>
+          <p:nvPr/>
+        </p:nvSpPr>
+        <p:spPr>
+          <a:xfrm>
+            <a:off x="2169720" y="2190509"/>
+            <a:ext cx="2538465" cy="408623"/>
+          </a:xfrm>
+          <a:prstGeom prst="roundRect">
+            <a:avLst/>
+          </a:prstGeom>
+        </p:spPr>
+        <p:style>
+          <a:lnRef idx="2">
+            <a:schemeClr val="accent1"/>
+          </a:lnRef>
+          <a:fillRef idx="1">
+            <a:schemeClr val="lt1"/>
+          </a:fillRef>
+          <a:effectRef idx="0">
+            <a:schemeClr val="accent1"/>
+          </a:effectRef>
+          <a:fontRef idx="minor">
+            <a:schemeClr val="dk1"/>
+          </a:fontRef>
+        </p:style>
+        <p:txBody>
+          <a:bodyPr wrap="square" rtlCol="0">
+            <a:spAutoFit/>
+          </a:bodyPr>
+          <a:lstStyle/>
+          <a:p>
+            <a:r>
+              <a:rPr lang="en-US" sz="1000" dirty="0"/>
+              <a:t>Ensemble Experiments</a:t>
+            </a:r>
+          </a:p>
+          <a:p>
+            <a:r>
+              <a:rPr lang="en-US" sz="800" dirty="0"/>
+              <a:t>Systematic analysis of </a:t>
+            </a:r>
+          </a:p>
+        </p:txBody>
+      </p:sp>
+      <p:cxnSp>
+        <p:nvCxnSpPr>
+          <p:cNvPr id="11" name="Straight Arrow Connector 10">
+            <a:extLst>
+              <a:ext uri="{FF2B5EF4-FFF2-40B4-BE49-F238E27FC236}">
+                <a16:creationId xmlns:a16="http://schemas.microsoft.com/office/drawing/2014/main" id="{B835776B-8BD5-A5F9-944D-10ADCB069A1E}"/>
+              </a:ext>
+            </a:extLst>
+          </p:cNvPr>
+          <p:cNvCxnSpPr>
+            <a:cxnSpLocks/>
+            <a:stCxn id="4" idx="2"/>
+            <a:endCxn id="5" idx="0"/>
+          </p:cNvCxnSpPr>
+          <p:nvPr/>
+        </p:nvCxnSpPr>
+        <p:spPr>
+          <a:xfrm flipH="1">
+            <a:off x="1813982" y="1973104"/>
+            <a:ext cx="4565" cy="1585118"/>
+          </a:xfrm>
+          <a:prstGeom prst="straightConnector1">
+            <a:avLst/>
+          </a:prstGeom>
+          <a:ln>
+            <a:tailEnd type="triangle" w="lg" len="lg"/>
+          </a:ln>
+        </p:spPr>
+        <p:style>
+          <a:lnRef idx="2">
+            <a:schemeClr val="accent1"/>
+          </a:lnRef>
+          <a:fillRef idx="0">
+            <a:schemeClr val="accent1"/>
+          </a:fillRef>
+          <a:effectRef idx="1">
+            <a:schemeClr val="accent1"/>
+          </a:effectRef>
+          <a:fontRef idx="minor">
+            <a:schemeClr val="tx1"/>
+          </a:fontRef>
+        </p:style>
+      </p:cxnSp>
+      <p:cxnSp>
+        <p:nvCxnSpPr>
+          <p:cNvPr id="12" name="Straight Arrow Connector 11">
+            <a:extLst>
+              <a:ext uri="{FF2B5EF4-FFF2-40B4-BE49-F238E27FC236}">
+                <a16:creationId xmlns:a16="http://schemas.microsoft.com/office/drawing/2014/main" id="{44249617-F85A-F2CA-FC1A-9A7F3A914A49}"/>
+              </a:ext>
+            </a:extLst>
+          </p:cNvPr>
+          <p:cNvCxnSpPr>
+            <a:cxnSpLocks/>
+          </p:cNvCxnSpPr>
+          <p:nvPr/>
+        </p:nvCxnSpPr>
+        <p:spPr>
+          <a:xfrm>
+            <a:off x="5018225" y="2246476"/>
+            <a:ext cx="0" cy="1310787"/>
+          </a:xfrm>
+          <a:prstGeom prst="straightConnector1">
+            <a:avLst/>
+          </a:prstGeom>
+          <a:ln>
+            <a:tailEnd type="triangle" w="lg" len="lg"/>
+          </a:ln>
+        </p:spPr>
+        <p:style>
+          <a:lnRef idx="2">
+            <a:schemeClr val="accent1"/>
+          </a:lnRef>
+          <a:fillRef idx="0">
+            <a:schemeClr val="accent1"/>
+          </a:fillRef>
+          <a:effectRef idx="1">
+            <a:schemeClr val="accent1"/>
+          </a:effectRef>
+          <a:fontRef idx="minor">
+            <a:schemeClr val="tx1"/>
+          </a:fontRef>
+        </p:style>
+      </p:cxnSp>
+      <p:cxnSp>
+        <p:nvCxnSpPr>
+          <p:cNvPr id="22" name="Straight Arrow Connector 21">
+            <a:extLst>
+              <a:ext uri="{FF2B5EF4-FFF2-40B4-BE49-F238E27FC236}">
+                <a16:creationId xmlns:a16="http://schemas.microsoft.com/office/drawing/2014/main" id="{081F11BA-7BA2-5C58-2F84-994EB087396E}"/>
+              </a:ext>
+            </a:extLst>
+          </p:cNvPr>
+          <p:cNvCxnSpPr>
+            <a:cxnSpLocks/>
+            <a:stCxn id="4" idx="3"/>
+            <a:endCxn id="7" idx="1"/>
+          </p:cNvCxnSpPr>
+          <p:nvPr/>
+        </p:nvCxnSpPr>
+        <p:spPr>
+          <a:xfrm>
+            <a:off x="2996588" y="1700689"/>
+            <a:ext cx="828461" cy="153234"/>
+          </a:xfrm>
+          <a:prstGeom prst="straightConnector1">
+            <a:avLst/>
+          </a:prstGeom>
+          <a:ln>
+            <a:tailEnd type="triangle" w="lg" len="lg"/>
+          </a:ln>
+        </p:spPr>
+        <p:style>
+          <a:lnRef idx="2">
+            <a:schemeClr val="accent1"/>
+          </a:lnRef>
+          <a:fillRef idx="0">
+            <a:schemeClr val="accent1"/>
+          </a:fillRef>
+          <a:effectRef idx="1">
+            <a:schemeClr val="accent1"/>
+          </a:effectRef>
+          <a:fontRef idx="minor">
+            <a:schemeClr val="tx1"/>
+          </a:fontRef>
+        </p:style>
+      </p:cxnSp>
+      <p:cxnSp>
+        <p:nvCxnSpPr>
+          <p:cNvPr id="25" name="Straight Arrow Connector 24">
+            <a:extLst>
+              <a:ext uri="{FF2B5EF4-FFF2-40B4-BE49-F238E27FC236}">
+                <a16:creationId xmlns:a16="http://schemas.microsoft.com/office/drawing/2014/main" id="{E724C952-B33C-AB8B-42B8-2E3ED9A9A978}"/>
+              </a:ext>
+            </a:extLst>
+          </p:cNvPr>
+          <p:cNvCxnSpPr>
+            <a:cxnSpLocks/>
+            <a:stCxn id="5" idx="3"/>
+            <a:endCxn id="6" idx="1"/>
+          </p:cNvCxnSpPr>
+          <p:nvPr/>
+        </p:nvCxnSpPr>
+        <p:spPr>
+          <a:xfrm>
+            <a:off x="2987459" y="3830637"/>
+            <a:ext cx="837589" cy="16351"/>
+          </a:xfrm>
+          <a:prstGeom prst="straightConnector1">
+            <a:avLst/>
+          </a:prstGeom>
+          <a:ln>
+            <a:tailEnd type="triangle" w="lg" len="lg"/>
+          </a:ln>
+        </p:spPr>
+        <p:style>
+          <a:lnRef idx="2">
+            <a:schemeClr val="accent1"/>
+          </a:lnRef>
+          <a:fillRef idx="0">
+            <a:schemeClr val="accent1"/>
+          </a:fillRef>
+          <a:effectRef idx="1">
+            <a:schemeClr val="accent1"/>
+          </a:effectRef>
+          <a:fontRef idx="minor">
+            <a:schemeClr val="tx1"/>
+          </a:fontRef>
+        </p:style>
+      </p:cxnSp>
+      <p:cxnSp>
+        <p:nvCxnSpPr>
+          <p:cNvPr id="27" name="Straight Arrow Connector 26">
+            <a:extLst>
+              <a:ext uri="{FF2B5EF4-FFF2-40B4-BE49-F238E27FC236}">
+                <a16:creationId xmlns:a16="http://schemas.microsoft.com/office/drawing/2014/main" id="{5C9E2167-B8B5-36AB-956E-44977017B8B5}"/>
+              </a:ext>
+            </a:extLst>
+          </p:cNvPr>
+          <p:cNvCxnSpPr>
+            <a:cxnSpLocks/>
+            <a:stCxn id="4" idx="2"/>
+          </p:cNvCxnSpPr>
+          <p:nvPr/>
+        </p:nvCxnSpPr>
+        <p:spPr>
+          <a:xfrm>
+            <a:off x="1818547" y="1973104"/>
+            <a:ext cx="399520" cy="605968"/>
+          </a:xfrm>
+          <a:prstGeom prst="straightConnector1">
+            <a:avLst/>
+          </a:prstGeom>
+          <a:ln>
+            <a:tailEnd type="triangle" w="lg" len="lg"/>
+          </a:ln>
+        </p:spPr>
+        <p:style>
+          <a:lnRef idx="2">
+            <a:schemeClr val="accent1"/>
+          </a:lnRef>
+          <a:fillRef idx="0">
+            <a:schemeClr val="accent1"/>
+          </a:fillRef>
+          <a:effectRef idx="1">
+            <a:schemeClr val="accent1"/>
+          </a:effectRef>
+          <a:fontRef idx="minor">
+            <a:schemeClr val="tx1"/>
+          </a:fontRef>
+        </p:style>
+      </p:cxnSp>
+      <p:cxnSp>
+        <p:nvCxnSpPr>
+          <p:cNvPr id="30" name="Straight Arrow Connector 29">
+            <a:extLst>
+              <a:ext uri="{FF2B5EF4-FFF2-40B4-BE49-F238E27FC236}">
+                <a16:creationId xmlns:a16="http://schemas.microsoft.com/office/drawing/2014/main" id="{5E37970C-1A2B-A40D-F3A5-1E4D8821A173}"/>
+              </a:ext>
+            </a:extLst>
+          </p:cNvPr>
+          <p:cNvCxnSpPr>
+            <a:cxnSpLocks/>
+            <a:stCxn id="5" idx="0"/>
+          </p:cNvCxnSpPr>
+          <p:nvPr/>
+        </p:nvCxnSpPr>
+        <p:spPr>
+          <a:xfrm flipV="1">
+            <a:off x="1813982" y="3265436"/>
+            <a:ext cx="404085" cy="292786"/>
+          </a:xfrm>
+          <a:prstGeom prst="straightConnector1">
+            <a:avLst/>
+          </a:prstGeom>
+          <a:ln>
+            <a:tailEnd type="triangle" w="lg" len="lg"/>
+          </a:ln>
+        </p:spPr>
+        <p:style>
+          <a:lnRef idx="2">
+            <a:schemeClr val="accent1"/>
+          </a:lnRef>
+          <a:fillRef idx="0">
+            <a:schemeClr val="accent1"/>
+          </a:fillRef>
+          <a:effectRef idx="1">
+            <a:schemeClr val="accent1"/>
+          </a:effectRef>
+          <a:fontRef idx="minor">
+            <a:schemeClr val="tx1"/>
+          </a:fontRef>
+        </p:style>
+      </p:cxnSp>
+      <p:cxnSp>
+        <p:nvCxnSpPr>
+          <p:cNvPr id="34" name="Straight Arrow Connector 33">
+            <a:extLst>
+              <a:ext uri="{FF2B5EF4-FFF2-40B4-BE49-F238E27FC236}">
+                <a16:creationId xmlns:a16="http://schemas.microsoft.com/office/drawing/2014/main" id="{D5B12348-E175-0CDF-9E26-CA48940B3B42}"/>
+              </a:ext>
+            </a:extLst>
+          </p:cNvPr>
+          <p:cNvCxnSpPr>
+            <a:cxnSpLocks/>
+          </p:cNvCxnSpPr>
+          <p:nvPr/>
+        </p:nvCxnSpPr>
+        <p:spPr>
+          <a:xfrm flipH="1" flipV="1">
+            <a:off x="4725699" y="3241020"/>
+            <a:ext cx="299965" cy="338721"/>
+          </a:xfrm>
+          <a:prstGeom prst="straightConnector1">
+            <a:avLst/>
+          </a:prstGeom>
+          <a:ln>
+            <a:tailEnd type="triangle" w="lg" len="lg"/>
+          </a:ln>
+        </p:spPr>
+        <p:style>
+          <a:lnRef idx="2">
+            <a:schemeClr val="accent1"/>
+          </a:lnRef>
+          <a:fillRef idx="0">
+            <a:schemeClr val="accent1"/>
+          </a:fillRef>
+          <a:effectRef idx="1">
+            <a:schemeClr val="accent1"/>
+          </a:effectRef>
+          <a:fontRef idx="minor">
+            <a:schemeClr val="tx1"/>
+          </a:fontRef>
+        </p:style>
+      </p:cxnSp>
+      <p:cxnSp>
+        <p:nvCxnSpPr>
+          <p:cNvPr id="38" name="Straight Arrow Connector 37">
+            <a:extLst>
+              <a:ext uri="{FF2B5EF4-FFF2-40B4-BE49-F238E27FC236}">
+                <a16:creationId xmlns:a16="http://schemas.microsoft.com/office/drawing/2014/main" id="{37F8B623-0783-D5FD-2821-D2A152F65454}"/>
+              </a:ext>
+            </a:extLst>
+          </p:cNvPr>
+          <p:cNvCxnSpPr>
+            <a:cxnSpLocks/>
+          </p:cNvCxnSpPr>
+          <p:nvPr/>
+        </p:nvCxnSpPr>
+        <p:spPr>
+          <a:xfrm flipH="1">
+            <a:off x="4692254" y="2245519"/>
+            <a:ext cx="329366" cy="333553"/>
+          </a:xfrm>
+          <a:prstGeom prst="straightConnector1">
+            <a:avLst/>
+          </a:prstGeom>
+          <a:ln>
+            <a:tailEnd type="triangle" w="lg" len="lg"/>
+          </a:ln>
+        </p:spPr>
+        <p:style>
+          <a:lnRef idx="2">
+            <a:schemeClr val="accent1"/>
+          </a:lnRef>
+          <a:fillRef idx="0">
+            <a:schemeClr val="accent1"/>
+          </a:fillRef>
+          <a:effectRef idx="1">
+            <a:schemeClr val="accent1"/>
+          </a:effectRef>
+          <a:fontRef idx="minor">
+            <a:schemeClr val="tx1"/>
+          </a:fontRef>
+        </p:style>
+      </p:cxnSp>
+      <p:sp>
+        <p:nvSpPr>
+          <p:cNvPr id="3" name="TextBox 2">
+            <a:extLst>
+              <a:ext uri="{FF2B5EF4-FFF2-40B4-BE49-F238E27FC236}">
+                <a16:creationId xmlns:a16="http://schemas.microsoft.com/office/drawing/2014/main" id="{795B80F1-D9E0-8617-5C32-65544A6D8B73}"/>
+              </a:ext>
+            </a:extLst>
+          </p:cNvPr>
+          <p:cNvSpPr txBox="1"/>
+          <p:nvPr/>
+        </p:nvSpPr>
+        <p:spPr>
+          <a:xfrm>
+            <a:off x="3912362" y="1153099"/>
+            <a:ext cx="1431802" cy="246221"/>
+          </a:xfrm>
+          <a:prstGeom prst="rect">
+            <a:avLst/>
+          </a:prstGeom>
+          <a:noFill/>
+        </p:spPr>
+        <p:txBody>
+          <a:bodyPr wrap="none" rtlCol="0">
+            <a:spAutoFit/>
+          </a:bodyPr>
+          <a:lstStyle/>
+          <a:p>
+            <a:r>
+              <a:rPr lang="en-US" sz="1000" dirty="0">
+                <a:solidFill>
+                  <a:schemeClr val="accent1"/>
+                </a:solidFill>
+              </a:rPr>
+              <a:t>class </a:t>
+            </a:r>
+            <a:r>
+              <a:rPr lang="en-US" sz="1000" dirty="0" err="1">
+                <a:solidFill>
+                  <a:schemeClr val="accent1"/>
+                </a:solidFill>
+              </a:rPr>
+              <a:t>BooleanNetwork</a:t>
+            </a:r>
+            <a:endParaRPr lang="en-US" sz="1000" dirty="0">
+              <a:solidFill>
+                <a:schemeClr val="accent1"/>
+              </a:solidFill>
+            </a:endParaRPr>
+          </a:p>
+        </p:txBody>
+      </p:sp>
+      <p:sp>
+        <p:nvSpPr>
+          <p:cNvPr id="9" name="TextBox 8">
+            <a:extLst>
+              <a:ext uri="{FF2B5EF4-FFF2-40B4-BE49-F238E27FC236}">
+                <a16:creationId xmlns:a16="http://schemas.microsoft.com/office/drawing/2014/main" id="{E2B8648D-EE53-7ABF-C3D6-83E81490D0DF}"/>
+              </a:ext>
+            </a:extLst>
+          </p:cNvPr>
+          <p:cNvSpPr txBox="1"/>
+          <p:nvPr/>
+        </p:nvSpPr>
+        <p:spPr>
+          <a:xfrm>
+            <a:off x="715476" y="1153100"/>
+            <a:ext cx="1454244" cy="246221"/>
+          </a:xfrm>
+          <a:prstGeom prst="rect">
+            <a:avLst/>
+          </a:prstGeom>
+          <a:noFill/>
+        </p:spPr>
+        <p:txBody>
+          <a:bodyPr wrap="none" rtlCol="0">
+            <a:spAutoFit/>
+          </a:bodyPr>
+          <a:lstStyle/>
+          <a:p>
+            <a:r>
+              <a:rPr lang="en-US" sz="1000" dirty="0">
+                <a:solidFill>
+                  <a:schemeClr val="accent1"/>
+                </a:solidFill>
+              </a:rPr>
+              <a:t>class </a:t>
+            </a:r>
+            <a:r>
+              <a:rPr lang="en-US" sz="1000" dirty="0" err="1">
+                <a:solidFill>
+                  <a:schemeClr val="accent1"/>
+                </a:solidFill>
+              </a:rPr>
+              <a:t>BooleanFunction</a:t>
+            </a:r>
+            <a:endParaRPr lang="en-US" sz="1000" dirty="0">
+              <a:solidFill>
+                <a:schemeClr val="accent1"/>
+              </a:solidFill>
+            </a:endParaRPr>
+          </a:p>
+        </p:txBody>
+      </p:sp>
+      <p:sp>
+        <p:nvSpPr>
+          <p:cNvPr id="14" name="TextBox 13">
+            <a:extLst>
+              <a:ext uri="{FF2B5EF4-FFF2-40B4-BE49-F238E27FC236}">
+                <a16:creationId xmlns:a16="http://schemas.microsoft.com/office/drawing/2014/main" id="{2C14E69B-95C9-B191-43C8-A733B2A30931}"/>
+              </a:ext>
+            </a:extLst>
+          </p:cNvPr>
+          <p:cNvSpPr txBox="1"/>
+          <p:nvPr/>
+        </p:nvSpPr>
+        <p:spPr>
+          <a:xfrm>
+            <a:off x="5084467" y="2641880"/>
+            <a:ext cx="1279037" cy="544830"/>
+          </a:xfrm>
+          <a:prstGeom prst="roundRect">
+            <a:avLst/>
+          </a:prstGeom>
+        </p:spPr>
+        <p:style>
+          <a:lnRef idx="2">
+            <a:schemeClr val="accent1"/>
+          </a:lnRef>
+          <a:fillRef idx="1">
+            <a:schemeClr val="lt1"/>
+          </a:fillRef>
+          <a:effectRef idx="0">
+            <a:schemeClr val="accent1"/>
+          </a:effectRef>
+          <a:fontRef idx="minor">
+            <a:schemeClr val="dk1"/>
+          </a:fontRef>
+        </p:style>
+        <p:txBody>
+          <a:bodyPr wrap="square" rtlCol="0">
+            <a:spAutoFit/>
+          </a:bodyPr>
+          <a:lstStyle/>
+          <a:p>
+            <a:r>
+              <a:rPr lang="en-US" sz="1000" dirty="0"/>
+              <a:t>Interoperability</a:t>
+            </a:r>
+          </a:p>
+          <a:p>
+            <a:r>
+              <a:rPr lang="en-US" sz="800" dirty="0"/>
+              <a:t>Export/Import </a:t>
+            </a:r>
+            <a:r>
+              <a:rPr lang="en-US" sz="800" dirty="0">
+                <a:sym typeface="Wingdings" pitchFamily="2" charset="2"/>
+              </a:rPr>
+              <a:t></a:t>
+            </a:r>
+            <a:br>
+              <a:rPr lang="en-US" sz="800" dirty="0">
+                <a:sym typeface="Wingdings" pitchFamily="2" charset="2"/>
+              </a:rPr>
+            </a:br>
+            <a:r>
+              <a:rPr lang="en-US" sz="800" dirty="0">
+                <a:sym typeface="Wingdings" pitchFamily="2" charset="2"/>
+              </a:rPr>
+              <a:t>CANA, </a:t>
+            </a:r>
+            <a:r>
+              <a:rPr lang="en-US" sz="800" dirty="0" err="1">
+                <a:sym typeface="Wingdings" pitchFamily="2" charset="2"/>
+              </a:rPr>
+              <a:t>PyBoolNet</a:t>
+            </a:r>
+            <a:r>
+              <a:rPr lang="en-US" sz="800" dirty="0">
+                <a:sym typeface="Wingdings" pitchFamily="2" charset="2"/>
+              </a:rPr>
+              <a:t>, …</a:t>
+            </a:r>
+            <a:endParaRPr lang="en-US" sz="800" dirty="0"/>
+          </a:p>
+        </p:txBody>
+      </p:sp>
+      <p:cxnSp>
+        <p:nvCxnSpPr>
+          <p:cNvPr id="15" name="Straight Arrow Connector 14">
+            <a:extLst>
+              <a:ext uri="{FF2B5EF4-FFF2-40B4-BE49-F238E27FC236}">
+                <a16:creationId xmlns:a16="http://schemas.microsoft.com/office/drawing/2014/main" id="{74C6DA81-A99A-379C-C36C-C58F7162FFC6}"/>
+              </a:ext>
+            </a:extLst>
+          </p:cNvPr>
+          <p:cNvCxnSpPr>
+            <a:cxnSpLocks/>
+            <a:endCxn id="14" idx="0"/>
+          </p:cNvCxnSpPr>
+          <p:nvPr/>
+        </p:nvCxnSpPr>
+        <p:spPr>
+          <a:xfrm>
+            <a:off x="5723986" y="2245519"/>
+            <a:ext cx="0" cy="396361"/>
+          </a:xfrm>
+          <a:prstGeom prst="straightConnector1">
+            <a:avLst/>
+          </a:prstGeom>
+          <a:ln>
+            <a:tailEnd type="triangle" w="lg" len="lg"/>
+          </a:ln>
+        </p:spPr>
+        <p:style>
+          <a:lnRef idx="2">
+            <a:schemeClr val="accent1"/>
+          </a:lnRef>
+          <a:fillRef idx="0">
+            <a:schemeClr val="accent1"/>
+          </a:fillRef>
+          <a:effectRef idx="1">
+            <a:schemeClr val="accent1"/>
+          </a:effectRef>
+          <a:fontRef idx="minor">
+            <a:schemeClr val="tx1"/>
+          </a:fontRef>
+        </p:style>
+      </p:cxnSp>
+      <p:cxnSp>
+        <p:nvCxnSpPr>
+          <p:cNvPr id="59" name="Straight Arrow Connector 58">
+            <a:extLst>
+              <a:ext uri="{FF2B5EF4-FFF2-40B4-BE49-F238E27FC236}">
+                <a16:creationId xmlns:a16="http://schemas.microsoft.com/office/drawing/2014/main" id="{20C0977D-BEE6-D88B-FDCB-5A58A8EBEB63}"/>
+              </a:ext>
+            </a:extLst>
+          </p:cNvPr>
+          <p:cNvCxnSpPr>
+            <a:cxnSpLocks/>
+          </p:cNvCxnSpPr>
+          <p:nvPr/>
+        </p:nvCxnSpPr>
+        <p:spPr>
+          <a:xfrm>
+            <a:off x="5743399" y="3186710"/>
+            <a:ext cx="0" cy="396361"/>
+          </a:xfrm>
+          <a:prstGeom prst="straightConnector1">
+            <a:avLst/>
+          </a:prstGeom>
+          <a:ln>
+            <a:tailEnd type="triangle" w="lg" len="lg"/>
+          </a:ln>
+        </p:spPr>
+        <p:style>
+          <a:lnRef idx="2">
+            <a:schemeClr val="accent1"/>
+          </a:lnRef>
+          <a:fillRef idx="0">
+            <a:schemeClr val="accent1"/>
+          </a:fillRef>
+          <a:effectRef idx="1">
+            <a:schemeClr val="accent1"/>
+          </a:effectRef>
+          <a:fontRef idx="minor">
+            <a:schemeClr val="tx1"/>
+          </a:fontRef>
+        </p:style>
+      </p:cxnSp>
+      <p:sp>
+        <p:nvSpPr>
+          <p:cNvPr id="2" name="TextBox 1">
+            <a:extLst>
+              <a:ext uri="{FF2B5EF4-FFF2-40B4-BE49-F238E27FC236}">
+                <a16:creationId xmlns:a16="http://schemas.microsoft.com/office/drawing/2014/main" id="{BBEF3BA4-62FE-10A2-F798-432A682F68A0}"/>
+              </a:ext>
+            </a:extLst>
+          </p:cNvPr>
+          <p:cNvSpPr txBox="1"/>
+          <p:nvPr/>
+        </p:nvSpPr>
+        <p:spPr>
+          <a:xfrm>
+            <a:off x="6782291" y="2510287"/>
+            <a:ext cx="2356083" cy="817245"/>
+          </a:xfrm>
+          <a:prstGeom prst="roundRect">
+            <a:avLst/>
+          </a:prstGeom>
+        </p:spPr>
+        <p:style>
+          <a:lnRef idx="2">
+            <a:schemeClr val="accent1"/>
+          </a:lnRef>
+          <a:fillRef idx="1">
+            <a:schemeClr val="lt1"/>
+          </a:fillRef>
+          <a:effectRef idx="0">
+            <a:schemeClr val="accent1"/>
+          </a:effectRef>
+          <a:fontRef idx="minor">
+            <a:schemeClr val="dk1"/>
+          </a:fontRef>
+        </p:style>
+        <p:txBody>
+          <a:bodyPr wrap="square" rtlCol="0">
+            <a:spAutoFit/>
+          </a:bodyPr>
+          <a:lstStyle/>
+          <a:p>
+            <a:r>
+              <a:rPr lang="en-US" sz="1000" b="1" dirty="0"/>
+              <a:t>User Input</a:t>
+            </a:r>
+          </a:p>
+          <a:p>
+            <a:pPr marL="171450" indent="-171450">
+              <a:buFont typeface="Arial" panose="020B0604020202020204" pitchFamily="34" charset="0"/>
+              <a:buChar char="•"/>
+            </a:pPr>
+            <a:r>
+              <a:rPr lang="en-US" sz="800" dirty="0"/>
+              <a:t>Network parameters</a:t>
+            </a:r>
+          </a:p>
+          <a:p>
+            <a:pPr marL="171450" indent="-171450">
+              <a:buFont typeface="Arial" panose="020B0604020202020204" pitchFamily="34" charset="0"/>
+              <a:buChar char="•"/>
+            </a:pPr>
+            <a:r>
+              <a:rPr lang="en-US" sz="800" dirty="0"/>
+              <a:t>Constraints on topology</a:t>
+            </a:r>
+          </a:p>
+          <a:p>
+            <a:pPr marL="171450" indent="-171450">
+              <a:buFont typeface="Arial" panose="020B0604020202020204" pitchFamily="34" charset="0"/>
+              <a:buChar char="•"/>
+            </a:pPr>
+            <a:r>
+              <a:rPr lang="en-US" sz="800" dirty="0"/>
+              <a:t>Constraints on functions</a:t>
+            </a:r>
+          </a:p>
+          <a:p>
+            <a:pPr marL="171450" indent="-171450">
+              <a:buFont typeface="Arial" panose="020B0604020202020204" pitchFamily="34" charset="0"/>
+              <a:buChar char="•"/>
+            </a:pPr>
+            <a:r>
+              <a:rPr lang="en-US" sz="800" dirty="0"/>
+              <a:t>Optional: Network for null model matching</a:t>
+            </a:r>
+          </a:p>
+        </p:txBody>
+      </p:sp>
+      <p:sp>
+        <p:nvSpPr>
+          <p:cNvPr id="17" name="TextBox 16">
+            <a:extLst>
+              <a:ext uri="{FF2B5EF4-FFF2-40B4-BE49-F238E27FC236}">
+                <a16:creationId xmlns:a16="http://schemas.microsoft.com/office/drawing/2014/main" id="{A6DFA139-0033-1D87-5965-1612A7046E0A}"/>
+              </a:ext>
+            </a:extLst>
+          </p:cNvPr>
+          <p:cNvSpPr txBox="1"/>
+          <p:nvPr/>
+        </p:nvSpPr>
+        <p:spPr>
+          <a:xfrm>
+            <a:off x="6782290" y="3492690"/>
+            <a:ext cx="2356083" cy="1362075"/>
+          </a:xfrm>
+          <a:prstGeom prst="roundRect">
+            <a:avLst/>
+          </a:prstGeom>
+        </p:spPr>
+        <p:style>
+          <a:lnRef idx="2">
+            <a:schemeClr val="accent1"/>
+          </a:lnRef>
+          <a:fillRef idx="1">
+            <a:schemeClr val="lt1"/>
+          </a:fillRef>
+          <a:effectRef idx="0">
+            <a:schemeClr val="accent1"/>
+          </a:effectRef>
+          <a:fontRef idx="minor">
+            <a:schemeClr val="dk1"/>
+          </a:fontRef>
+        </p:style>
+        <p:txBody>
+          <a:bodyPr wrap="square" rtlCol="0">
+            <a:spAutoFit/>
+          </a:bodyPr>
+          <a:lstStyle/>
+          <a:p>
+            <a:r>
+              <a:rPr lang="en-US" sz="1000" b="1" dirty="0"/>
+              <a:t>Generation</a:t>
+            </a:r>
+            <a:r>
+              <a:rPr lang="en-US" sz="800" dirty="0"/>
+              <a:t> </a:t>
+            </a:r>
+          </a:p>
+          <a:p>
+            <a:pPr marL="171450" indent="-171450">
+              <a:buFont typeface="Arial" panose="020B0604020202020204" pitchFamily="34" charset="0"/>
+              <a:buChar char="•"/>
+            </a:pPr>
+            <a:r>
+              <a:rPr lang="en-US" sz="800" b="1" dirty="0"/>
+              <a:t>Random Boolean Function Generators </a:t>
+            </a:r>
+            <a:br>
+              <a:rPr lang="en-US" sz="800" dirty="0"/>
+            </a:br>
+            <a:r>
+              <a:rPr lang="en-US" sz="800" i="1" dirty="0"/>
+              <a:t>Sample functions with prescribed structural features</a:t>
+            </a:r>
+          </a:p>
+          <a:p>
+            <a:pPr marL="171450" indent="-171450">
+              <a:buFont typeface="Arial" panose="020B0604020202020204" pitchFamily="34" charset="0"/>
+              <a:buChar char="•"/>
+            </a:pPr>
+            <a:r>
+              <a:rPr lang="en-US" sz="800" b="1" dirty="0"/>
+              <a:t>Random Boolean Network Generators</a:t>
+            </a:r>
+            <a:br>
+              <a:rPr lang="en-US" sz="800" dirty="0"/>
+            </a:br>
+            <a:r>
+              <a:rPr lang="en-US" sz="800" i="1" dirty="0"/>
+              <a:t>Generate networks with controlled properties</a:t>
+            </a:r>
+            <a:r>
+              <a:rPr lang="en-US" sz="800" dirty="0"/>
+              <a:t> </a:t>
+            </a:r>
+          </a:p>
+          <a:p>
+            <a:pPr marL="171450" indent="-171450">
+              <a:buFont typeface="Arial" panose="020B0604020202020204" pitchFamily="34" charset="0"/>
+              <a:buChar char="•"/>
+            </a:pPr>
+            <a:r>
+              <a:rPr lang="en-US" sz="800" dirty="0"/>
+              <a:t>Output: Single networks, large ensembles, or customized null models</a:t>
+            </a:r>
+          </a:p>
+        </p:txBody>
+      </p:sp>
+      <p:sp>
+        <p:nvSpPr>
+          <p:cNvPr id="18" name="TextBox 17">
+            <a:extLst>
+              <a:ext uri="{FF2B5EF4-FFF2-40B4-BE49-F238E27FC236}">
+                <a16:creationId xmlns:a16="http://schemas.microsoft.com/office/drawing/2014/main" id="{AAE02E2B-C70B-A642-1E2A-F43C49D2DC31}"/>
+              </a:ext>
+            </a:extLst>
+          </p:cNvPr>
+          <p:cNvSpPr txBox="1"/>
+          <p:nvPr/>
+        </p:nvSpPr>
+        <p:spPr>
+          <a:xfrm>
+            <a:off x="9448370" y="3866458"/>
+            <a:ext cx="2356083" cy="953453"/>
+          </a:xfrm>
+          <a:prstGeom prst="roundRect">
+            <a:avLst/>
+          </a:prstGeom>
+        </p:spPr>
+        <p:style>
+          <a:lnRef idx="2">
+            <a:schemeClr val="accent1"/>
+          </a:lnRef>
+          <a:fillRef idx="1">
+            <a:schemeClr val="lt1"/>
+          </a:fillRef>
+          <a:effectRef idx="0">
+            <a:schemeClr val="accent1"/>
+          </a:effectRef>
+          <a:fontRef idx="minor">
+            <a:schemeClr val="dk1"/>
+          </a:fontRef>
+        </p:style>
+        <p:txBody>
+          <a:bodyPr wrap="square" rtlCol="0">
+            <a:spAutoFit/>
+          </a:bodyPr>
+          <a:lstStyle/>
+          <a:p>
+            <a:r>
+              <a:rPr lang="en-US" sz="1000" b="1" dirty="0"/>
+              <a:t>Analysis</a:t>
+            </a:r>
+            <a:r>
+              <a:rPr lang="en-US" sz="800" dirty="0"/>
+              <a:t> </a:t>
+            </a:r>
+          </a:p>
+          <a:p>
+            <a:pPr marL="171450" indent="-171450">
+              <a:buFont typeface="Arial" panose="020B0604020202020204" pitchFamily="34" charset="0"/>
+              <a:buChar char="•"/>
+            </a:pPr>
+            <a:r>
+              <a:rPr lang="en-US" sz="800" dirty="0"/>
+              <a:t>Function-level metrics </a:t>
+            </a:r>
+            <a:br>
+              <a:rPr lang="en-US" sz="800" dirty="0"/>
+            </a:br>
+            <a:r>
+              <a:rPr lang="en-US" sz="800" i="1" dirty="0"/>
+              <a:t>canalization, redundancy, symmetry, sensitivity</a:t>
+            </a:r>
+          </a:p>
+          <a:p>
+            <a:pPr marL="171450" indent="-171450">
+              <a:buFont typeface="Arial" panose="020B0604020202020204" pitchFamily="34" charset="0"/>
+              <a:buChar char="•"/>
+            </a:pPr>
+            <a:r>
+              <a:rPr lang="en-US" sz="800" dirty="0"/>
+              <a:t>Network-level metrics </a:t>
+            </a:r>
+            <a:br>
+              <a:rPr lang="en-US" sz="800" dirty="0"/>
+            </a:br>
+            <a:r>
+              <a:rPr lang="en-US" sz="800" i="1" dirty="0"/>
+              <a:t>attractors, robustness, motifs, coherence</a:t>
+            </a:r>
+          </a:p>
+        </p:txBody>
+      </p:sp>
+      <p:sp>
+        <p:nvSpPr>
+          <p:cNvPr id="19" name="TextBox 18">
+            <a:extLst>
+              <a:ext uri="{FF2B5EF4-FFF2-40B4-BE49-F238E27FC236}">
+                <a16:creationId xmlns:a16="http://schemas.microsoft.com/office/drawing/2014/main" id="{B127E6E4-2E41-6DC0-D66A-4CF32E7E8EBA}"/>
+              </a:ext>
+            </a:extLst>
+          </p:cNvPr>
+          <p:cNvSpPr txBox="1"/>
+          <p:nvPr/>
+        </p:nvSpPr>
+        <p:spPr>
+          <a:xfrm>
+            <a:off x="9448369" y="2337766"/>
+            <a:ext cx="2356083" cy="1362075"/>
+          </a:xfrm>
+          <a:prstGeom prst="roundRect">
+            <a:avLst/>
+          </a:prstGeom>
+        </p:spPr>
+        <p:style>
+          <a:lnRef idx="2">
+            <a:schemeClr val="accent1"/>
+          </a:lnRef>
+          <a:fillRef idx="1">
+            <a:schemeClr val="lt1"/>
+          </a:fillRef>
+          <a:effectRef idx="0">
+            <a:schemeClr val="accent1"/>
+          </a:effectRef>
+          <a:fontRef idx="minor">
+            <a:schemeClr val="dk1"/>
+          </a:fontRef>
+        </p:style>
+        <p:txBody>
+          <a:bodyPr wrap="square" rtlCol="0">
+            <a:spAutoFit/>
+          </a:bodyPr>
+          <a:lstStyle/>
+          <a:p>
+            <a:r>
+              <a:rPr lang="en-US" sz="1000" b="1" dirty="0"/>
+              <a:t>Generation</a:t>
+            </a:r>
+            <a:r>
+              <a:rPr lang="en-US" sz="800" dirty="0"/>
+              <a:t> </a:t>
+            </a:r>
+          </a:p>
+          <a:p>
+            <a:pPr marL="171450" indent="-171450">
+              <a:buFont typeface="Arial" panose="020B0604020202020204" pitchFamily="34" charset="0"/>
+              <a:buChar char="•"/>
+            </a:pPr>
+            <a:r>
+              <a:rPr lang="en-US" sz="800" b="1" dirty="0"/>
+              <a:t>Random Boolean Function Generators </a:t>
+            </a:r>
+            <a:br>
+              <a:rPr lang="en-US" sz="800" dirty="0"/>
+            </a:br>
+            <a:r>
+              <a:rPr lang="en-US" sz="800" i="1" dirty="0"/>
+              <a:t>Sample functions with prescribed structural features</a:t>
+            </a:r>
+          </a:p>
+          <a:p>
+            <a:pPr marL="171450" indent="-171450">
+              <a:buFont typeface="Arial" panose="020B0604020202020204" pitchFamily="34" charset="0"/>
+              <a:buChar char="•"/>
+            </a:pPr>
+            <a:r>
+              <a:rPr lang="en-US" sz="800" b="1" dirty="0"/>
+              <a:t>Random Boolean Network Generators</a:t>
+            </a:r>
+            <a:br>
+              <a:rPr lang="en-US" sz="800" dirty="0"/>
+            </a:br>
+            <a:r>
+              <a:rPr lang="en-US" sz="800" i="1" dirty="0"/>
+              <a:t>Generate networks with controlled properties</a:t>
+            </a:r>
+            <a:r>
+              <a:rPr lang="en-US" sz="800" dirty="0"/>
+              <a:t> </a:t>
+            </a:r>
+          </a:p>
+          <a:p>
+            <a:pPr marL="171450" indent="-171450">
+              <a:buFont typeface="Arial" panose="020B0604020202020204" pitchFamily="34" charset="0"/>
+              <a:buChar char="•"/>
+            </a:pPr>
+            <a:r>
+              <a:rPr lang="en-US" sz="800" dirty="0"/>
+              <a:t>Output: Single networks, large ensembles, or customized null models</a:t>
+            </a:r>
+          </a:p>
+        </p:txBody>
+      </p:sp>
+    </p:spTree>
+    <p:extLst>
+      <p:ext uri="{BB962C8B-B14F-4D97-AF65-F5344CB8AC3E}">
+        <p14:creationId xmlns:p14="http://schemas.microsoft.com/office/powerpoint/2010/main" val="1824653240"/>
       </p:ext>
     </p:extLst>
   </p:cSld>

</xml_diff>